<commit_message>
moved image folder from images/ to img/ and added more images
</commit_message>
<xml_diff>
--- a/docs/img/icds_docs_images.pptx
+++ b/docs/img/icds_docs_images.pptx
@@ -5,12 +5,15 @@
     <p:sldMasterId id="2147483697" r:id="rId4"/>
   </p:sldMasterIdLst>
   <p:notesMasterIdLst>
-    <p:notesMasterId r:id="rId8"/>
+    <p:notesMasterId r:id="rId11"/>
   </p:notesMasterIdLst>
   <p:sldIdLst>
     <p:sldId id="298" r:id="rId5"/>
     <p:sldId id="1011" r:id="rId6"/>
-    <p:sldId id="918" r:id="rId7"/>
+    <p:sldId id="1037" r:id="rId7"/>
+    <p:sldId id="918" r:id="rId8"/>
+    <p:sldId id="1038" r:id="rId9"/>
+    <p:sldId id="1039" r:id="rId10"/>
   </p:sldIdLst>
   <p:sldSz cx="12192000" cy="6858000"/>
   <p:notesSz cx="6858000" cy="9144000"/>
@@ -205,7 +208,7 @@
           <a:p>
             <a:fld id="{8F25345D-83D0-4643-B4BC-44C238B5A8CF}" type="datetimeFigureOut">
               <a:rPr lang="en-US" smtClean="0"/>
-              <a:t>5/1/24</a:t>
+              <a:t>10/9/24</a:t>
             </a:fld>
             <a:endParaRPr lang="en-US"/>
           </a:p>
@@ -621,7 +624,7 @@
           <a:p>
             <a:fld id="{C5E9F7F4-92E3-494D-952E-CED9FE2475BB}" type="slidenum">
               <a:rPr lang="en-US" smtClean="0"/>
-              <a:t>3</a:t>
+              <a:t>4</a:t>
             </a:fld>
             <a:endParaRPr lang="en-US"/>
           </a:p>
@@ -787,7 +790,7 @@
           <a:p>
             <a:fld id="{06F6D09A-9F42-C649-A6EB-DC34432B03F0}" type="datetimeFigureOut">
               <a:rPr lang="en-US" smtClean="0"/>
-              <a:t>5/1/24</a:t>
+              <a:t>10/9/24</a:t>
             </a:fld>
             <a:endParaRPr lang="en-US"/>
           </a:p>
@@ -985,7 +988,7 @@
           <a:p>
             <a:fld id="{06F6D09A-9F42-C649-A6EB-DC34432B03F0}" type="datetimeFigureOut">
               <a:rPr lang="en-US" smtClean="0"/>
-              <a:t>5/1/24</a:t>
+              <a:t>10/9/24</a:t>
             </a:fld>
             <a:endParaRPr lang="en-US"/>
           </a:p>
@@ -1193,7 +1196,7 @@
           <a:p>
             <a:fld id="{06F6D09A-9F42-C649-A6EB-DC34432B03F0}" type="datetimeFigureOut">
               <a:rPr lang="en-US" smtClean="0"/>
-              <a:t>5/1/24</a:t>
+              <a:t>10/9/24</a:t>
             </a:fld>
             <a:endParaRPr lang="en-US"/>
           </a:p>
@@ -1391,7 +1394,7 @@
           <a:p>
             <a:fld id="{06F6D09A-9F42-C649-A6EB-DC34432B03F0}" type="datetimeFigureOut">
               <a:rPr lang="en-US" smtClean="0"/>
-              <a:t>5/1/24</a:t>
+              <a:t>10/9/24</a:t>
             </a:fld>
             <a:endParaRPr lang="en-US"/>
           </a:p>
@@ -1666,7 +1669,7 @@
           <a:p>
             <a:fld id="{06F6D09A-9F42-C649-A6EB-DC34432B03F0}" type="datetimeFigureOut">
               <a:rPr lang="en-US" smtClean="0"/>
-              <a:t>5/1/24</a:t>
+              <a:t>10/9/24</a:t>
             </a:fld>
             <a:endParaRPr lang="en-US"/>
           </a:p>
@@ -1931,7 +1934,7 @@
           <a:p>
             <a:fld id="{06F6D09A-9F42-C649-A6EB-DC34432B03F0}" type="datetimeFigureOut">
               <a:rPr lang="en-US" smtClean="0"/>
-              <a:t>5/1/24</a:t>
+              <a:t>10/9/24</a:t>
             </a:fld>
             <a:endParaRPr lang="en-US"/>
           </a:p>
@@ -2343,7 +2346,7 @@
           <a:p>
             <a:fld id="{06F6D09A-9F42-C649-A6EB-DC34432B03F0}" type="datetimeFigureOut">
               <a:rPr lang="en-US" smtClean="0"/>
-              <a:t>5/1/24</a:t>
+              <a:t>10/9/24</a:t>
             </a:fld>
             <a:endParaRPr lang="en-US"/>
           </a:p>
@@ -2484,7 +2487,7 @@
           <a:p>
             <a:fld id="{06F6D09A-9F42-C649-A6EB-DC34432B03F0}" type="datetimeFigureOut">
               <a:rPr lang="en-US" smtClean="0"/>
-              <a:t>5/1/24</a:t>
+              <a:t>10/9/24</a:t>
             </a:fld>
             <a:endParaRPr lang="en-US"/>
           </a:p>
@@ -2597,7 +2600,7 @@
           <a:p>
             <a:fld id="{06F6D09A-9F42-C649-A6EB-DC34432B03F0}" type="datetimeFigureOut">
               <a:rPr lang="en-US" smtClean="0"/>
-              <a:t>5/1/24</a:t>
+              <a:t>10/9/24</a:t>
             </a:fld>
             <a:endParaRPr lang="en-US"/>
           </a:p>
@@ -2908,7 +2911,7 @@
           <a:p>
             <a:fld id="{06F6D09A-9F42-C649-A6EB-DC34432B03F0}" type="datetimeFigureOut">
               <a:rPr lang="en-US" smtClean="0"/>
-              <a:t>5/1/24</a:t>
+              <a:t>10/9/24</a:t>
             </a:fld>
             <a:endParaRPr lang="en-US"/>
           </a:p>
@@ -3200,7 +3203,7 @@
           <a:p>
             <a:fld id="{06F6D09A-9F42-C649-A6EB-DC34432B03F0}" type="datetimeFigureOut">
               <a:rPr lang="en-US" smtClean="0"/>
-              <a:t>5/1/24</a:t>
+              <a:t>10/9/24</a:t>
             </a:fld>
             <a:endParaRPr lang="en-US"/>
           </a:p>
@@ -3441,7 +3444,7 @@
           <a:p>
             <a:fld id="{06F6D09A-9F42-C649-A6EB-DC34432B03F0}" type="datetimeFigureOut">
               <a:rPr lang="en-US" smtClean="0"/>
-              <a:t>5/1/24</a:t>
+              <a:t>10/9/24</a:t>
             </a:fld>
             <a:endParaRPr lang="en-US"/>
           </a:p>
@@ -5660,6 +5663,1479 @@
           <a:chExt cx="0" cy="0"/>
         </a:xfrm>
       </p:grpSpPr>
+      <p:grpSp>
+        <p:nvGrpSpPr>
+          <p:cNvPr id="2" name="Group 1">
+            <a:extLst>
+              <a:ext uri="{FF2B5EF4-FFF2-40B4-BE49-F238E27FC236}">
+                <a16:creationId xmlns:a16="http://schemas.microsoft.com/office/drawing/2014/main" id="{3E54031D-11BB-3134-D148-0439498E70A4}"/>
+              </a:ext>
+            </a:extLst>
+          </p:cNvPr>
+          <p:cNvGrpSpPr/>
+          <p:nvPr/>
+        </p:nvGrpSpPr>
+        <p:grpSpPr>
+          <a:xfrm>
+            <a:off x="344220" y="114294"/>
+            <a:ext cx="11169336" cy="5853493"/>
+            <a:chOff x="1296700" y="516487"/>
+            <a:chExt cx="9267082" cy="4824531"/>
+          </a:xfrm>
+        </p:grpSpPr>
+        <p:sp>
+          <p:nvSpPr>
+            <p:cNvPr id="101" name="Rounded Rectangle 100">
+              <a:extLst>
+                <a:ext uri="{FF2B5EF4-FFF2-40B4-BE49-F238E27FC236}">
+                  <a16:creationId xmlns:a16="http://schemas.microsoft.com/office/drawing/2014/main" id="{CE7D2B25-C5BA-9B6D-E46E-CAA108D7BB64}"/>
+                </a:ext>
+              </a:extLst>
+            </p:cNvPr>
+            <p:cNvSpPr/>
+            <p:nvPr/>
+          </p:nvSpPr>
+          <p:spPr>
+            <a:xfrm>
+              <a:off x="2954334" y="743485"/>
+              <a:ext cx="7609448" cy="4592548"/>
+            </a:xfrm>
+            <a:prstGeom prst="roundRect">
+              <a:avLst>
+                <a:gd name="adj" fmla="val 3390"/>
+              </a:avLst>
+            </a:prstGeom>
+            <a:solidFill>
+              <a:schemeClr val="bg1">
+                <a:lumMod val="75000"/>
+              </a:schemeClr>
+            </a:solidFill>
+            <a:ln w="76200">
+              <a:solidFill>
+                <a:schemeClr val="bg1">
+                  <a:lumMod val="50000"/>
+                </a:schemeClr>
+              </a:solidFill>
+            </a:ln>
+          </p:spPr>
+          <p:style>
+            <a:lnRef idx="2">
+              <a:schemeClr val="accent1">
+                <a:shade val="50000"/>
+              </a:schemeClr>
+            </a:lnRef>
+            <a:fillRef idx="1">
+              <a:schemeClr val="accent1"/>
+            </a:fillRef>
+            <a:effectRef idx="0">
+              <a:schemeClr val="accent1"/>
+            </a:effectRef>
+            <a:fontRef idx="minor">
+              <a:schemeClr val="lt1"/>
+            </a:fontRef>
+          </p:style>
+          <p:txBody>
+            <a:bodyPr rtlCol="0" anchor="ctr"/>
+            <a:lstStyle/>
+            <a:p>
+              <a:pPr algn="ctr"/>
+              <a:endParaRPr lang="en-US"/>
+            </a:p>
+          </p:txBody>
+        </p:sp>
+        <p:sp>
+          <p:nvSpPr>
+            <p:cNvPr id="116" name="Rounded Rectangle 115">
+              <a:extLst>
+                <a:ext uri="{FF2B5EF4-FFF2-40B4-BE49-F238E27FC236}">
+                  <a16:creationId xmlns:a16="http://schemas.microsoft.com/office/drawing/2014/main" id="{20A9C292-F88E-CFAF-E42D-14E5EA1477AA}"/>
+                </a:ext>
+              </a:extLst>
+            </p:cNvPr>
+            <p:cNvSpPr/>
+            <p:nvPr/>
+          </p:nvSpPr>
+          <p:spPr>
+            <a:xfrm>
+              <a:off x="5830738" y="1703464"/>
+              <a:ext cx="3301800" cy="2715769"/>
+            </a:xfrm>
+            <a:prstGeom prst="roundRect">
+              <a:avLst/>
+            </a:prstGeom>
+            <a:solidFill>
+              <a:schemeClr val="accent5">
+                <a:lumMod val="60000"/>
+                <a:lumOff val="40000"/>
+              </a:schemeClr>
+            </a:solidFill>
+            <a:ln w="38100">
+              <a:solidFill>
+                <a:schemeClr val="accent5">
+                  <a:lumMod val="50000"/>
+                </a:schemeClr>
+              </a:solidFill>
+              <a:prstDash val="sysDash"/>
+            </a:ln>
+          </p:spPr>
+          <p:style>
+            <a:lnRef idx="2">
+              <a:schemeClr val="accent1">
+                <a:shade val="50000"/>
+              </a:schemeClr>
+            </a:lnRef>
+            <a:fillRef idx="1">
+              <a:schemeClr val="accent1"/>
+            </a:fillRef>
+            <a:effectRef idx="0">
+              <a:schemeClr val="accent1"/>
+            </a:effectRef>
+            <a:fontRef idx="minor">
+              <a:schemeClr val="lt1"/>
+            </a:fontRef>
+          </p:style>
+          <p:txBody>
+            <a:bodyPr rtlCol="0" anchor="ctr"/>
+            <a:lstStyle/>
+            <a:p>
+              <a:pPr algn="ctr"/>
+              <a:endParaRPr lang="en-US"/>
+            </a:p>
+          </p:txBody>
+        </p:sp>
+        <p:cxnSp>
+          <p:nvCxnSpPr>
+            <p:cNvPr id="28" name="Straight Arrow Connector 27">
+              <a:extLst>
+                <a:ext uri="{FF2B5EF4-FFF2-40B4-BE49-F238E27FC236}">
+                  <a16:creationId xmlns:a16="http://schemas.microsoft.com/office/drawing/2014/main" id="{EFD0C24E-69E1-19E3-CF7C-C47F0681842A}"/>
+                </a:ext>
+              </a:extLst>
+            </p:cNvPr>
+            <p:cNvCxnSpPr>
+              <a:cxnSpLocks/>
+              <a:stCxn id="4" idx="3"/>
+              <a:endCxn id="10" idx="1"/>
+            </p:cNvCxnSpPr>
+            <p:nvPr/>
+          </p:nvCxnSpPr>
+          <p:spPr>
+            <a:xfrm>
+              <a:off x="2341158" y="1215861"/>
+              <a:ext cx="1370384" cy="2"/>
+            </a:xfrm>
+            <a:prstGeom prst="straightConnector1">
+              <a:avLst/>
+            </a:prstGeom>
+            <a:ln w="38100">
+              <a:solidFill>
+                <a:schemeClr val="tx1"/>
+              </a:solidFill>
+              <a:tailEnd type="triangle"/>
+            </a:ln>
+          </p:spPr>
+          <p:style>
+            <a:lnRef idx="1">
+              <a:schemeClr val="accent1"/>
+            </a:lnRef>
+            <a:fillRef idx="0">
+              <a:schemeClr val="accent1"/>
+            </a:fillRef>
+            <a:effectRef idx="0">
+              <a:schemeClr val="accent1"/>
+            </a:effectRef>
+            <a:fontRef idx="minor">
+              <a:schemeClr val="tx1"/>
+            </a:fontRef>
+          </p:style>
+        </p:cxnSp>
+        <p:cxnSp>
+          <p:nvCxnSpPr>
+            <p:cNvPr id="34" name="Straight Arrow Connector 33">
+              <a:extLst>
+                <a:ext uri="{FF2B5EF4-FFF2-40B4-BE49-F238E27FC236}">
+                  <a16:creationId xmlns:a16="http://schemas.microsoft.com/office/drawing/2014/main" id="{392D6AD1-6665-61BA-EF5A-D65958F175EC}"/>
+                </a:ext>
+              </a:extLst>
+            </p:cNvPr>
+            <p:cNvCxnSpPr>
+              <a:cxnSpLocks/>
+              <a:stCxn id="13" idx="0"/>
+              <a:endCxn id="4" idx="2"/>
+            </p:cNvCxnSpPr>
+            <p:nvPr/>
+          </p:nvCxnSpPr>
+          <p:spPr>
+            <a:xfrm flipH="1" flipV="1">
+              <a:off x="2072135" y="1483988"/>
+              <a:ext cx="236" cy="1312917"/>
+            </a:xfrm>
+            <a:prstGeom prst="straightConnector1">
+              <a:avLst/>
+            </a:prstGeom>
+            <a:ln w="38100">
+              <a:solidFill>
+                <a:schemeClr val="tx1"/>
+              </a:solidFill>
+              <a:tailEnd type="triangle"/>
+            </a:ln>
+          </p:spPr>
+          <p:style>
+            <a:lnRef idx="1">
+              <a:schemeClr val="accent1"/>
+            </a:lnRef>
+            <a:fillRef idx="0">
+              <a:schemeClr val="accent1"/>
+            </a:fillRef>
+            <a:effectRef idx="0">
+              <a:schemeClr val="accent1"/>
+            </a:effectRef>
+            <a:fontRef idx="minor">
+              <a:schemeClr val="tx1"/>
+            </a:fontRef>
+          </p:style>
+        </p:cxnSp>
+        <p:cxnSp>
+          <p:nvCxnSpPr>
+            <p:cNvPr id="57" name="Straight Connector 56">
+              <a:extLst>
+                <a:ext uri="{FF2B5EF4-FFF2-40B4-BE49-F238E27FC236}">
+                  <a16:creationId xmlns:a16="http://schemas.microsoft.com/office/drawing/2014/main" id="{7C01C79E-BDA6-EA15-1EC3-864CF1ABEF86}"/>
+                </a:ext>
+              </a:extLst>
+            </p:cNvPr>
+            <p:cNvCxnSpPr>
+              <a:cxnSpLocks/>
+              <a:stCxn id="7" idx="3"/>
+            </p:cNvCxnSpPr>
+            <p:nvPr/>
+          </p:nvCxnSpPr>
+          <p:spPr>
+            <a:xfrm>
+              <a:off x="8689127" y="2321765"/>
+              <a:ext cx="1117592" cy="0"/>
+            </a:xfrm>
+            <a:prstGeom prst="line">
+              <a:avLst/>
+            </a:prstGeom>
+            <a:ln w="38100">
+              <a:solidFill>
+                <a:schemeClr val="accent2">
+                  <a:lumMod val="75000"/>
+                </a:schemeClr>
+              </a:solidFill>
+            </a:ln>
+          </p:spPr>
+          <p:style>
+            <a:lnRef idx="1">
+              <a:schemeClr val="accent1"/>
+            </a:lnRef>
+            <a:fillRef idx="0">
+              <a:schemeClr val="accent1"/>
+            </a:fillRef>
+            <a:effectRef idx="0">
+              <a:schemeClr val="accent1"/>
+            </a:effectRef>
+            <a:fontRef idx="minor">
+              <a:schemeClr val="tx1"/>
+            </a:fontRef>
+          </p:style>
+        </p:cxnSp>
+        <p:sp>
+          <p:nvSpPr>
+            <p:cNvPr id="59" name="TextBox 58">
+              <a:extLst>
+                <a:ext uri="{FF2B5EF4-FFF2-40B4-BE49-F238E27FC236}">
+                  <a16:creationId xmlns:a16="http://schemas.microsoft.com/office/drawing/2014/main" id="{C6EAA290-A794-E682-6FB2-F77F56E11358}"/>
+                </a:ext>
+              </a:extLst>
+            </p:cNvPr>
+            <p:cNvSpPr txBox="1"/>
+            <p:nvPr/>
+          </p:nvSpPr>
+          <p:spPr>
+            <a:xfrm>
+              <a:off x="3017027" y="1222023"/>
+              <a:ext cx="648292" cy="253674"/>
+            </a:xfrm>
+            <a:prstGeom prst="rect">
+              <a:avLst/>
+            </a:prstGeom>
+            <a:noFill/>
+          </p:spPr>
+          <p:txBody>
+            <a:bodyPr wrap="square" rtlCol="0">
+              <a:spAutoFit/>
+            </a:bodyPr>
+            <a:lstStyle/>
+            <a:p>
+              <a:pPr algn="ctr"/>
+              <a:r>
+                <a:rPr lang="en-US" sz="1400" dirty="0">
+                  <a:latin typeface="Consolas" panose="020B0609020204030204" pitchFamily="49" charset="0"/>
+                  <a:cs typeface="Consolas" panose="020B0609020204030204" pitchFamily="49" charset="0"/>
+                </a:rPr>
+                <a:t>https</a:t>
+              </a:r>
+            </a:p>
+          </p:txBody>
+        </p:sp>
+        <p:sp>
+          <p:nvSpPr>
+            <p:cNvPr id="60" name="TextBox 59">
+              <a:extLst>
+                <a:ext uri="{FF2B5EF4-FFF2-40B4-BE49-F238E27FC236}">
+                  <a16:creationId xmlns:a16="http://schemas.microsoft.com/office/drawing/2014/main" id="{B7FCCF5F-DF2D-A891-8CF2-6E14EC7ED39B}"/>
+                </a:ext>
+              </a:extLst>
+            </p:cNvPr>
+            <p:cNvSpPr txBox="1"/>
+            <p:nvPr/>
+          </p:nvSpPr>
+          <p:spPr>
+            <a:xfrm>
+              <a:off x="1296700" y="516487"/>
+              <a:ext cx="1550867" cy="431245"/>
+            </a:xfrm>
+            <a:prstGeom prst="rect">
+              <a:avLst/>
+            </a:prstGeom>
+            <a:noFill/>
+          </p:spPr>
+          <p:txBody>
+            <a:bodyPr wrap="square" rtlCol="0">
+              <a:spAutoFit/>
+            </a:bodyPr>
+            <a:lstStyle/>
+            <a:p>
+              <a:pPr algn="ctr"/>
+              <a:r>
+                <a:rPr lang="en-US" sz="1400" dirty="0">
+                  <a:latin typeface="Consolas" panose="020B0609020204030204" pitchFamily="49" charset="0"/>
+                  <a:cs typeface="Consolas" panose="020B0609020204030204" pitchFamily="49" charset="0"/>
+                </a:rPr>
+                <a:t>PSU Network or GlobalProtect VPN</a:t>
+              </a:r>
+            </a:p>
+          </p:txBody>
+        </p:sp>
+        <p:sp>
+          <p:nvSpPr>
+            <p:cNvPr id="72" name="TextBox 71">
+              <a:extLst>
+                <a:ext uri="{FF2B5EF4-FFF2-40B4-BE49-F238E27FC236}">
+                  <a16:creationId xmlns:a16="http://schemas.microsoft.com/office/drawing/2014/main" id="{36055230-C1F2-2044-A2C7-B94C9C9D0229}"/>
+                </a:ext>
+              </a:extLst>
+            </p:cNvPr>
+            <p:cNvSpPr txBox="1"/>
+            <p:nvPr/>
+          </p:nvSpPr>
+          <p:spPr>
+            <a:xfrm>
+              <a:off x="5580550" y="1155244"/>
+              <a:ext cx="2112338" cy="253674"/>
+            </a:xfrm>
+            <a:prstGeom prst="rect">
+              <a:avLst/>
+            </a:prstGeom>
+            <a:noFill/>
+          </p:spPr>
+          <p:txBody>
+            <a:bodyPr wrap="square" rtlCol="0">
+              <a:spAutoFit/>
+            </a:bodyPr>
+            <a:lstStyle/>
+            <a:p>
+              <a:pPr algn="ctr"/>
+              <a:r>
+                <a:rPr lang="en-US" sz="1400" dirty="0">
+                  <a:latin typeface="Consolas" panose="020B0609020204030204" pitchFamily="49" charset="0"/>
+                  <a:cs typeface="Consolas" panose="020B0609020204030204" pitchFamily="49" charset="0"/>
+                </a:rPr>
+                <a:t>interactive desktop/apps</a:t>
+              </a:r>
+            </a:p>
+          </p:txBody>
+        </p:sp>
+        <p:sp>
+          <p:nvSpPr>
+            <p:cNvPr id="73" name="TextBox 72">
+              <a:extLst>
+                <a:ext uri="{FF2B5EF4-FFF2-40B4-BE49-F238E27FC236}">
+                  <a16:creationId xmlns:a16="http://schemas.microsoft.com/office/drawing/2014/main" id="{B6EFB7D1-DE22-F972-6130-47224FBEF731}"/>
+                </a:ext>
+              </a:extLst>
+            </p:cNvPr>
+            <p:cNvSpPr txBox="1"/>
+            <p:nvPr/>
+          </p:nvSpPr>
+          <p:spPr>
+            <a:xfrm>
+              <a:off x="6451103" y="2400232"/>
+              <a:ext cx="806228" cy="307777"/>
+            </a:xfrm>
+            <a:prstGeom prst="rect">
+              <a:avLst/>
+            </a:prstGeom>
+            <a:noFill/>
+          </p:spPr>
+          <p:txBody>
+            <a:bodyPr wrap="square" rtlCol="0">
+              <a:spAutoFit/>
+            </a:bodyPr>
+            <a:lstStyle/>
+            <a:p>
+              <a:r>
+                <a:rPr lang="en-US" sz="1400" dirty="0">
+                  <a:latin typeface="Consolas" panose="020B0609020204030204" pitchFamily="49" charset="0"/>
+                  <a:cs typeface="Consolas" panose="020B0609020204030204" pitchFamily="49" charset="0"/>
+                </a:rPr>
+                <a:t>salloc</a:t>
+              </a:r>
+            </a:p>
+          </p:txBody>
+        </p:sp>
+        <p:sp>
+          <p:nvSpPr>
+            <p:cNvPr id="74" name="TextBox 73">
+              <a:extLst>
+                <a:ext uri="{FF2B5EF4-FFF2-40B4-BE49-F238E27FC236}">
+                  <a16:creationId xmlns:a16="http://schemas.microsoft.com/office/drawing/2014/main" id="{0A725F77-9564-A40A-32A3-EE862F81402D}"/>
+                </a:ext>
+              </a:extLst>
+            </p:cNvPr>
+            <p:cNvSpPr txBox="1"/>
+            <p:nvPr/>
+          </p:nvSpPr>
+          <p:spPr>
+            <a:xfrm>
+              <a:off x="6454093" y="3240811"/>
+              <a:ext cx="833152" cy="307777"/>
+            </a:xfrm>
+            <a:prstGeom prst="rect">
+              <a:avLst/>
+            </a:prstGeom>
+            <a:noFill/>
+          </p:spPr>
+          <p:txBody>
+            <a:bodyPr wrap="square" rtlCol="0">
+              <a:spAutoFit/>
+            </a:bodyPr>
+            <a:lstStyle/>
+            <a:p>
+              <a:r>
+                <a:rPr lang="en-US" sz="1400" dirty="0">
+                  <a:latin typeface="Consolas" panose="020B0609020204030204" pitchFamily="49" charset="0"/>
+                  <a:cs typeface="Consolas" panose="020B0609020204030204" pitchFamily="49" charset="0"/>
+                </a:rPr>
+                <a:t>sbatch</a:t>
+              </a:r>
+            </a:p>
+          </p:txBody>
+        </p:sp>
+        <p:cxnSp>
+          <p:nvCxnSpPr>
+            <p:cNvPr id="75" name="Elbow Connector 74">
+              <a:extLst>
+                <a:ext uri="{FF2B5EF4-FFF2-40B4-BE49-F238E27FC236}">
+                  <a16:creationId xmlns:a16="http://schemas.microsoft.com/office/drawing/2014/main" id="{35CB55C2-158F-B933-09AC-ED74B7FCFA6A}"/>
+                </a:ext>
+              </a:extLst>
+            </p:cNvPr>
+            <p:cNvCxnSpPr>
+              <a:cxnSpLocks/>
+              <a:endCxn id="7" idx="0"/>
+            </p:cNvCxnSpPr>
+            <p:nvPr/>
+          </p:nvCxnSpPr>
+          <p:spPr>
+            <a:xfrm>
+              <a:off x="5324250" y="1426700"/>
+              <a:ext cx="2673217" cy="465218"/>
+            </a:xfrm>
+            <a:prstGeom prst="bentConnector2">
+              <a:avLst/>
+            </a:prstGeom>
+            <a:ln w="38100">
+              <a:solidFill>
+                <a:schemeClr val="tx1"/>
+              </a:solidFill>
+              <a:tailEnd type="triangle"/>
+            </a:ln>
+          </p:spPr>
+          <p:style>
+            <a:lnRef idx="1">
+              <a:schemeClr val="accent1"/>
+            </a:lnRef>
+            <a:fillRef idx="0">
+              <a:schemeClr val="accent1"/>
+            </a:fillRef>
+            <a:effectRef idx="0">
+              <a:schemeClr val="accent1"/>
+            </a:effectRef>
+            <a:fontRef idx="minor">
+              <a:schemeClr val="tx1"/>
+            </a:fontRef>
+          </p:style>
+        </p:cxnSp>
+        <p:cxnSp>
+          <p:nvCxnSpPr>
+            <p:cNvPr id="78" name="Elbow Connector 77">
+              <a:extLst>
+                <a:ext uri="{FF2B5EF4-FFF2-40B4-BE49-F238E27FC236}">
+                  <a16:creationId xmlns:a16="http://schemas.microsoft.com/office/drawing/2014/main" id="{11B18149-3513-9398-6251-8BA1B4A47E80}"/>
+                </a:ext>
+              </a:extLst>
+            </p:cNvPr>
+            <p:cNvCxnSpPr>
+              <a:cxnSpLocks/>
+              <a:stCxn id="11" idx="3"/>
+              <a:endCxn id="8" idx="1"/>
+            </p:cNvCxnSpPr>
+            <p:nvPr/>
+          </p:nvCxnSpPr>
+          <p:spPr>
+            <a:xfrm>
+              <a:off x="5315405" y="3060002"/>
+              <a:ext cx="1990399" cy="809496"/>
+            </a:xfrm>
+            <a:prstGeom prst="bentConnector3">
+              <a:avLst>
+                <a:gd name="adj1" fmla="val 87551"/>
+              </a:avLst>
+            </a:prstGeom>
+            <a:ln w="38100">
+              <a:solidFill>
+                <a:schemeClr val="tx1"/>
+              </a:solidFill>
+              <a:tailEnd type="triangle"/>
+            </a:ln>
+          </p:spPr>
+          <p:style>
+            <a:lnRef idx="1">
+              <a:schemeClr val="accent1"/>
+            </a:lnRef>
+            <a:fillRef idx="0">
+              <a:schemeClr val="accent1"/>
+            </a:fillRef>
+            <a:effectRef idx="0">
+              <a:schemeClr val="accent1"/>
+            </a:effectRef>
+            <a:fontRef idx="minor">
+              <a:schemeClr val="tx1"/>
+            </a:fontRef>
+          </p:style>
+        </p:cxnSp>
+        <p:cxnSp>
+          <p:nvCxnSpPr>
+            <p:cNvPr id="79" name="Elbow Connector 78">
+              <a:extLst>
+                <a:ext uri="{FF2B5EF4-FFF2-40B4-BE49-F238E27FC236}">
+                  <a16:creationId xmlns:a16="http://schemas.microsoft.com/office/drawing/2014/main" id="{CE32BC99-3900-8162-E286-F06661BC3F7B}"/>
+                </a:ext>
+              </a:extLst>
+            </p:cNvPr>
+            <p:cNvCxnSpPr>
+              <a:cxnSpLocks/>
+              <a:stCxn id="11" idx="3"/>
+              <a:endCxn id="7" idx="1"/>
+            </p:cNvCxnSpPr>
+            <p:nvPr/>
+          </p:nvCxnSpPr>
+          <p:spPr>
+            <a:xfrm flipV="1">
+              <a:off x="5315404" y="2321766"/>
+              <a:ext cx="1990400" cy="738237"/>
+            </a:xfrm>
+            <a:prstGeom prst="bentConnector3">
+              <a:avLst>
+                <a:gd name="adj1" fmla="val 87551"/>
+              </a:avLst>
+            </a:prstGeom>
+            <a:ln w="38100">
+              <a:solidFill>
+                <a:schemeClr val="tx1"/>
+              </a:solidFill>
+              <a:tailEnd type="triangle"/>
+            </a:ln>
+          </p:spPr>
+          <p:style>
+            <a:lnRef idx="1">
+              <a:schemeClr val="accent1"/>
+            </a:lnRef>
+            <a:fillRef idx="0">
+              <a:schemeClr val="accent1"/>
+            </a:fillRef>
+            <a:effectRef idx="0">
+              <a:schemeClr val="accent1"/>
+            </a:effectRef>
+            <a:fontRef idx="minor">
+              <a:schemeClr val="tx1"/>
+            </a:fontRef>
+          </p:style>
+        </p:cxnSp>
+        <p:cxnSp>
+          <p:nvCxnSpPr>
+            <p:cNvPr id="89" name="Straight Connector 88">
+              <a:extLst>
+                <a:ext uri="{FF2B5EF4-FFF2-40B4-BE49-F238E27FC236}">
+                  <a16:creationId xmlns:a16="http://schemas.microsoft.com/office/drawing/2014/main" id="{0BB36758-3FC5-765E-22EC-B1D07D1CF83C}"/>
+                </a:ext>
+              </a:extLst>
+            </p:cNvPr>
+            <p:cNvCxnSpPr>
+              <a:cxnSpLocks/>
+              <a:stCxn id="8" idx="3"/>
+            </p:cNvCxnSpPr>
+            <p:nvPr/>
+          </p:nvCxnSpPr>
+          <p:spPr>
+            <a:xfrm flipV="1">
+              <a:off x="8689126" y="3869498"/>
+              <a:ext cx="1117592" cy="1"/>
+            </a:xfrm>
+            <a:prstGeom prst="line">
+              <a:avLst/>
+            </a:prstGeom>
+            <a:ln w="38100">
+              <a:solidFill>
+                <a:schemeClr val="accent2">
+                  <a:lumMod val="75000"/>
+                </a:schemeClr>
+              </a:solidFill>
+            </a:ln>
+          </p:spPr>
+          <p:style>
+            <a:lnRef idx="1">
+              <a:schemeClr val="accent1"/>
+            </a:lnRef>
+            <a:fillRef idx="0">
+              <a:schemeClr val="accent1"/>
+            </a:fillRef>
+            <a:effectRef idx="0">
+              <a:schemeClr val="accent1"/>
+            </a:effectRef>
+            <a:fontRef idx="minor">
+              <a:schemeClr val="tx1"/>
+            </a:fontRef>
+          </p:style>
+        </p:cxnSp>
+        <p:cxnSp>
+          <p:nvCxnSpPr>
+            <p:cNvPr id="92" name="Straight Arrow Connector 91">
+              <a:extLst>
+                <a:ext uri="{FF2B5EF4-FFF2-40B4-BE49-F238E27FC236}">
+                  <a16:creationId xmlns:a16="http://schemas.microsoft.com/office/drawing/2014/main" id="{80AF47E0-8644-C9D9-F0BE-B50B4E841D8B}"/>
+                </a:ext>
+              </a:extLst>
+            </p:cNvPr>
+            <p:cNvCxnSpPr>
+              <a:cxnSpLocks/>
+              <a:stCxn id="7" idx="2"/>
+              <a:endCxn id="8" idx="0"/>
+            </p:cNvCxnSpPr>
+            <p:nvPr/>
+          </p:nvCxnSpPr>
+          <p:spPr>
+            <a:xfrm flipH="1">
+              <a:off x="7997466" y="2751611"/>
+              <a:ext cx="1" cy="688040"/>
+            </a:xfrm>
+            <a:prstGeom prst="straightConnector1">
+              <a:avLst/>
+            </a:prstGeom>
+            <a:ln w="38100">
+              <a:solidFill>
+                <a:schemeClr val="tx1"/>
+              </a:solidFill>
+              <a:tailEnd type="triangle"/>
+            </a:ln>
+          </p:spPr>
+          <p:style>
+            <a:lnRef idx="1">
+              <a:schemeClr val="accent1"/>
+            </a:lnRef>
+            <a:fillRef idx="0">
+              <a:schemeClr val="accent1"/>
+            </a:fillRef>
+            <a:effectRef idx="0">
+              <a:schemeClr val="accent1"/>
+            </a:effectRef>
+            <a:fontRef idx="minor">
+              <a:schemeClr val="tx1"/>
+            </a:fontRef>
+          </p:style>
+        </p:cxnSp>
+        <p:sp>
+          <p:nvSpPr>
+            <p:cNvPr id="102" name="TextBox 101">
+              <a:extLst>
+                <a:ext uri="{FF2B5EF4-FFF2-40B4-BE49-F238E27FC236}">
+                  <a16:creationId xmlns:a16="http://schemas.microsoft.com/office/drawing/2014/main" id="{2EF1152D-086E-4A28-2EBB-A5765DCBD8A9}"/>
+                </a:ext>
+              </a:extLst>
+            </p:cNvPr>
+            <p:cNvSpPr txBox="1"/>
+            <p:nvPr/>
+          </p:nvSpPr>
+          <p:spPr>
+            <a:xfrm>
+              <a:off x="7968618" y="2889117"/>
+              <a:ext cx="823055" cy="307777"/>
+            </a:xfrm>
+            <a:prstGeom prst="rect">
+              <a:avLst/>
+            </a:prstGeom>
+            <a:noFill/>
+          </p:spPr>
+          <p:txBody>
+            <a:bodyPr wrap="square" rtlCol="0">
+              <a:spAutoFit/>
+            </a:bodyPr>
+            <a:lstStyle/>
+            <a:p>
+              <a:r>
+                <a:rPr lang="en-US" sz="1400" dirty="0">
+                  <a:latin typeface="Consolas" panose="020B0609020204030204" pitchFamily="49" charset="0"/>
+                  <a:cs typeface="Consolas" panose="020B0609020204030204" pitchFamily="49" charset="0"/>
+                </a:rPr>
+                <a:t>sbatch</a:t>
+              </a:r>
+            </a:p>
+          </p:txBody>
+        </p:sp>
+        <p:sp>
+          <p:nvSpPr>
+            <p:cNvPr id="105" name="Rounded Rectangle 104">
+              <a:extLst>
+                <a:ext uri="{FF2B5EF4-FFF2-40B4-BE49-F238E27FC236}">
+                  <a16:creationId xmlns:a16="http://schemas.microsoft.com/office/drawing/2014/main" id="{12FE5164-0497-9E10-8AC1-E1413335A065}"/>
+                </a:ext>
+              </a:extLst>
+            </p:cNvPr>
+            <p:cNvSpPr/>
+            <p:nvPr/>
+          </p:nvSpPr>
+          <p:spPr>
+            <a:xfrm>
+              <a:off x="2954334" y="4681750"/>
+              <a:ext cx="3968703" cy="659268"/>
+            </a:xfrm>
+            <a:prstGeom prst="roundRect">
+              <a:avLst>
+                <a:gd name="adj" fmla="val 29924"/>
+              </a:avLst>
+            </a:prstGeom>
+            <a:solidFill>
+              <a:schemeClr val="bg1"/>
+            </a:solidFill>
+            <a:ln w="76200">
+              <a:solidFill>
+                <a:schemeClr val="bg1">
+                  <a:lumMod val="50000"/>
+                </a:schemeClr>
+              </a:solidFill>
+            </a:ln>
+          </p:spPr>
+          <p:style>
+            <a:lnRef idx="2">
+              <a:schemeClr val="accent1">
+                <a:shade val="50000"/>
+              </a:schemeClr>
+            </a:lnRef>
+            <a:fillRef idx="1">
+              <a:schemeClr val="accent1"/>
+            </a:fillRef>
+            <a:effectRef idx="0">
+              <a:schemeClr val="accent1"/>
+            </a:effectRef>
+            <a:fontRef idx="minor">
+              <a:schemeClr val="lt1"/>
+            </a:fontRef>
+          </p:style>
+          <p:txBody>
+            <a:bodyPr rtlCol="0" anchor="ctr"/>
+            <a:lstStyle/>
+            <a:p>
+              <a:pPr algn="ctr"/>
+              <a:r>
+                <a:rPr lang="en-US" sz="2400" b="1" dirty="0">
+                  <a:solidFill>
+                    <a:schemeClr val="tx1"/>
+                  </a:solidFill>
+                </a:rPr>
+                <a:t>Roar Restricted User Flow Diagram</a:t>
+              </a:r>
+            </a:p>
+          </p:txBody>
+        </p:sp>
+        <p:cxnSp>
+          <p:nvCxnSpPr>
+            <p:cNvPr id="113" name="Elbow Connector 112">
+              <a:extLst>
+                <a:ext uri="{FF2B5EF4-FFF2-40B4-BE49-F238E27FC236}">
+                  <a16:creationId xmlns:a16="http://schemas.microsoft.com/office/drawing/2014/main" id="{D2BDCC62-8D54-3549-2813-9CB2E02C2240}"/>
+                </a:ext>
+              </a:extLst>
+            </p:cNvPr>
+            <p:cNvCxnSpPr>
+              <a:cxnSpLocks/>
+              <a:stCxn id="11" idx="2"/>
+            </p:cNvCxnSpPr>
+            <p:nvPr/>
+          </p:nvCxnSpPr>
+          <p:spPr>
+            <a:xfrm rot="16200000" flipH="1">
+              <a:off x="6640887" y="1362434"/>
+              <a:ext cx="1038418" cy="5293246"/>
+            </a:xfrm>
+            <a:prstGeom prst="bentConnector2">
+              <a:avLst/>
+            </a:prstGeom>
+            <a:ln w="38100">
+              <a:solidFill>
+                <a:schemeClr val="accent2">
+                  <a:lumMod val="75000"/>
+                </a:schemeClr>
+              </a:solidFill>
+            </a:ln>
+          </p:spPr>
+          <p:style>
+            <a:lnRef idx="1">
+              <a:schemeClr val="accent1"/>
+            </a:lnRef>
+            <a:fillRef idx="0">
+              <a:schemeClr val="accent1"/>
+            </a:fillRef>
+            <a:effectRef idx="0">
+              <a:schemeClr val="accent1"/>
+            </a:effectRef>
+            <a:fontRef idx="minor">
+              <a:schemeClr val="tx1"/>
+            </a:fontRef>
+          </p:style>
+        </p:cxnSp>
+        <p:sp>
+          <p:nvSpPr>
+            <p:cNvPr id="126" name="Rounded Rectangle 125">
+              <a:extLst>
+                <a:ext uri="{FF2B5EF4-FFF2-40B4-BE49-F238E27FC236}">
+                  <a16:creationId xmlns:a16="http://schemas.microsoft.com/office/drawing/2014/main" id="{EBA06B6C-C5BB-CBFE-2C2B-5C614DA887B1}"/>
+                </a:ext>
+              </a:extLst>
+            </p:cNvPr>
+            <p:cNvSpPr/>
+            <p:nvPr/>
+          </p:nvSpPr>
+          <p:spPr>
+            <a:xfrm>
+              <a:off x="5821894" y="3796149"/>
+              <a:ext cx="1101143" cy="629043"/>
+            </a:xfrm>
+            <a:prstGeom prst="roundRect">
+              <a:avLst/>
+            </a:prstGeom>
+            <a:solidFill>
+              <a:schemeClr val="accent5">
+                <a:lumMod val="60000"/>
+                <a:lumOff val="40000"/>
+              </a:schemeClr>
+            </a:solidFill>
+            <a:ln w="38100">
+              <a:solidFill>
+                <a:schemeClr val="accent5">
+                  <a:lumMod val="50000"/>
+                </a:schemeClr>
+              </a:solidFill>
+            </a:ln>
+          </p:spPr>
+          <p:style>
+            <a:lnRef idx="2">
+              <a:schemeClr val="accent1">
+                <a:shade val="50000"/>
+              </a:schemeClr>
+            </a:lnRef>
+            <a:fillRef idx="1">
+              <a:schemeClr val="accent1"/>
+            </a:fillRef>
+            <a:effectRef idx="0">
+              <a:schemeClr val="accent1"/>
+            </a:effectRef>
+            <a:fontRef idx="minor">
+              <a:schemeClr val="lt1"/>
+            </a:fontRef>
+          </p:style>
+          <p:txBody>
+            <a:bodyPr rtlCol="0" anchor="ctr"/>
+            <a:lstStyle/>
+            <a:p>
+              <a:pPr algn="ctr"/>
+              <a:r>
+                <a:rPr lang="en-US" dirty="0">
+                  <a:solidFill>
+                    <a:schemeClr val="tx1"/>
+                  </a:solidFill>
+                </a:rPr>
+                <a:t>Compute Nodes</a:t>
+              </a:r>
+            </a:p>
+          </p:txBody>
+        </p:sp>
+        <p:sp>
+          <p:nvSpPr>
+            <p:cNvPr id="6" name="Rounded Rectangle 5">
+              <a:extLst>
+                <a:ext uri="{FF2B5EF4-FFF2-40B4-BE49-F238E27FC236}">
+                  <a16:creationId xmlns:a16="http://schemas.microsoft.com/office/drawing/2014/main" id="{6526621E-A0EA-E682-BCD5-178AE77EB86C}"/>
+                </a:ext>
+              </a:extLst>
+            </p:cNvPr>
+            <p:cNvSpPr/>
+            <p:nvPr/>
+          </p:nvSpPr>
+          <p:spPr>
+            <a:xfrm>
+              <a:off x="9808408" y="1577931"/>
+              <a:ext cx="584659" cy="3103819"/>
+            </a:xfrm>
+            <a:prstGeom prst="roundRect">
+              <a:avLst/>
+            </a:prstGeom>
+            <a:solidFill>
+              <a:schemeClr val="accent2">
+                <a:lumMod val="60000"/>
+                <a:lumOff val="40000"/>
+              </a:schemeClr>
+            </a:solidFill>
+            <a:ln w="38100">
+              <a:solidFill>
+                <a:schemeClr val="accent2">
+                  <a:lumMod val="50000"/>
+                </a:schemeClr>
+              </a:solidFill>
+            </a:ln>
+          </p:spPr>
+          <p:style>
+            <a:lnRef idx="2">
+              <a:schemeClr val="accent1">
+                <a:shade val="50000"/>
+              </a:schemeClr>
+            </a:lnRef>
+            <a:fillRef idx="1">
+              <a:schemeClr val="accent1"/>
+            </a:fillRef>
+            <a:effectRef idx="0">
+              <a:schemeClr val="accent1"/>
+            </a:effectRef>
+            <a:fontRef idx="minor">
+              <a:schemeClr val="lt1"/>
+            </a:fontRef>
+          </p:style>
+          <p:txBody>
+            <a:bodyPr vert="vert" rtlCol="0" anchor="ctr"/>
+            <a:lstStyle/>
+            <a:p>
+              <a:pPr algn="ctr"/>
+              <a:r>
+                <a:rPr lang="en-US" dirty="0">
+                  <a:solidFill>
+                    <a:schemeClr val="tx1"/>
+                  </a:solidFill>
+                </a:rPr>
+                <a:t>Filesystem</a:t>
+              </a:r>
+            </a:p>
+          </p:txBody>
+        </p:sp>
+        <p:sp>
+          <p:nvSpPr>
+            <p:cNvPr id="7" name="Rounded Rectangle 6">
+              <a:extLst>
+                <a:ext uri="{FF2B5EF4-FFF2-40B4-BE49-F238E27FC236}">
+                  <a16:creationId xmlns:a16="http://schemas.microsoft.com/office/drawing/2014/main" id="{02F43B55-7588-3BD2-D5BD-A9132DF5A4A3}"/>
+                </a:ext>
+              </a:extLst>
+            </p:cNvPr>
+            <p:cNvSpPr/>
+            <p:nvPr/>
+          </p:nvSpPr>
+          <p:spPr>
+            <a:xfrm>
+              <a:off x="7305805" y="1891919"/>
+              <a:ext cx="1383323" cy="859693"/>
+            </a:xfrm>
+            <a:prstGeom prst="roundRect">
+              <a:avLst/>
+            </a:prstGeom>
+            <a:solidFill>
+              <a:schemeClr val="accent6">
+                <a:lumMod val="60000"/>
+                <a:lumOff val="40000"/>
+              </a:schemeClr>
+            </a:solidFill>
+            <a:ln w="38100">
+              <a:solidFill>
+                <a:schemeClr val="accent6">
+                  <a:lumMod val="50000"/>
+                </a:schemeClr>
+              </a:solidFill>
+            </a:ln>
+          </p:spPr>
+          <p:style>
+            <a:lnRef idx="2">
+              <a:schemeClr val="accent1">
+                <a:shade val="50000"/>
+              </a:schemeClr>
+            </a:lnRef>
+            <a:fillRef idx="1">
+              <a:schemeClr val="accent1"/>
+            </a:fillRef>
+            <a:effectRef idx="0">
+              <a:schemeClr val="accent1"/>
+            </a:effectRef>
+            <a:fontRef idx="minor">
+              <a:schemeClr val="lt1"/>
+            </a:fontRef>
+          </p:style>
+          <p:txBody>
+            <a:bodyPr rtlCol="0" anchor="ctr"/>
+            <a:lstStyle/>
+            <a:p>
+              <a:pPr algn="ctr"/>
+              <a:r>
+                <a:rPr lang="en-US" dirty="0">
+                  <a:solidFill>
+                    <a:schemeClr val="tx1"/>
+                  </a:solidFill>
+                </a:rPr>
+                <a:t>Interactive Session</a:t>
+              </a:r>
+            </a:p>
+          </p:txBody>
+        </p:sp>
+        <p:sp>
+          <p:nvSpPr>
+            <p:cNvPr id="8" name="Rounded Rectangle 7">
+              <a:extLst>
+                <a:ext uri="{FF2B5EF4-FFF2-40B4-BE49-F238E27FC236}">
+                  <a16:creationId xmlns:a16="http://schemas.microsoft.com/office/drawing/2014/main" id="{AFDCB0A3-A100-79E1-AEC4-7A4A4531E864}"/>
+                </a:ext>
+              </a:extLst>
+            </p:cNvPr>
+            <p:cNvSpPr/>
+            <p:nvPr/>
+          </p:nvSpPr>
+          <p:spPr>
+            <a:xfrm>
+              <a:off x="7305804" y="3439652"/>
+              <a:ext cx="1383323" cy="859693"/>
+            </a:xfrm>
+            <a:prstGeom prst="roundRect">
+              <a:avLst/>
+            </a:prstGeom>
+            <a:solidFill>
+              <a:schemeClr val="accent6">
+                <a:lumMod val="60000"/>
+                <a:lumOff val="40000"/>
+              </a:schemeClr>
+            </a:solidFill>
+            <a:ln w="38100">
+              <a:solidFill>
+                <a:schemeClr val="accent6">
+                  <a:lumMod val="50000"/>
+                </a:schemeClr>
+              </a:solidFill>
+            </a:ln>
+          </p:spPr>
+          <p:style>
+            <a:lnRef idx="2">
+              <a:schemeClr val="accent1">
+                <a:shade val="50000"/>
+              </a:schemeClr>
+            </a:lnRef>
+            <a:fillRef idx="1">
+              <a:schemeClr val="accent1"/>
+            </a:fillRef>
+            <a:effectRef idx="0">
+              <a:schemeClr val="accent1"/>
+            </a:effectRef>
+            <a:fontRef idx="minor">
+              <a:schemeClr val="lt1"/>
+            </a:fontRef>
+          </p:style>
+          <p:txBody>
+            <a:bodyPr rtlCol="0" anchor="ctr"/>
+            <a:lstStyle/>
+            <a:p>
+              <a:pPr algn="ctr"/>
+              <a:r>
+                <a:rPr lang="en-US" dirty="0">
+                  <a:solidFill>
+                    <a:schemeClr val="tx1"/>
+                  </a:solidFill>
+                </a:rPr>
+                <a:t>Batch Session</a:t>
+              </a:r>
+            </a:p>
+          </p:txBody>
+        </p:sp>
+        <p:sp>
+          <p:nvSpPr>
+            <p:cNvPr id="10" name="Rounded Rectangle 9">
+              <a:extLst>
+                <a:ext uri="{FF2B5EF4-FFF2-40B4-BE49-F238E27FC236}">
+                  <a16:creationId xmlns:a16="http://schemas.microsoft.com/office/drawing/2014/main" id="{86094601-1F6D-D2EC-E2AE-28E10629DA91}"/>
+                </a:ext>
+              </a:extLst>
+            </p:cNvPr>
+            <p:cNvSpPr/>
+            <p:nvPr/>
+          </p:nvSpPr>
+          <p:spPr>
+            <a:xfrm>
+              <a:off x="3711542" y="853789"/>
+              <a:ext cx="1603863" cy="724145"/>
+            </a:xfrm>
+            <a:prstGeom prst="roundRect">
+              <a:avLst/>
+            </a:prstGeom>
+            <a:solidFill>
+              <a:schemeClr val="accent5">
+                <a:lumMod val="60000"/>
+                <a:lumOff val="40000"/>
+              </a:schemeClr>
+            </a:solidFill>
+            <a:ln w="38100">
+              <a:solidFill>
+                <a:schemeClr val="accent5">
+                  <a:lumMod val="50000"/>
+                </a:schemeClr>
+              </a:solidFill>
+            </a:ln>
+          </p:spPr>
+          <p:style>
+            <a:lnRef idx="2">
+              <a:schemeClr val="accent1">
+                <a:shade val="50000"/>
+              </a:schemeClr>
+            </a:lnRef>
+            <a:fillRef idx="1">
+              <a:schemeClr val="accent1"/>
+            </a:fillRef>
+            <a:effectRef idx="0">
+              <a:schemeClr val="accent1"/>
+            </a:effectRef>
+            <a:fontRef idx="minor">
+              <a:schemeClr val="lt1"/>
+            </a:fontRef>
+          </p:style>
+          <p:txBody>
+            <a:bodyPr rtlCol="0" anchor="ctr"/>
+            <a:lstStyle/>
+            <a:p>
+              <a:pPr algn="ctr"/>
+              <a:r>
+                <a:rPr lang="en-US" dirty="0">
+                  <a:solidFill>
+                    <a:schemeClr val="tx1"/>
+                  </a:solidFill>
+                </a:rPr>
+                <a:t>Portal</a:t>
+              </a:r>
+            </a:p>
+            <a:p>
+              <a:pPr algn="ctr"/>
+              <a:r>
+                <a:rPr lang="en-US" sz="1100" dirty="0">
+                  <a:solidFill>
+                    <a:schemeClr val="tx1"/>
+                  </a:solidFill>
+                </a:rPr>
+                <a:t>rrportal.hpc.psu.edu</a:t>
+              </a:r>
+            </a:p>
+          </p:txBody>
+        </p:sp>
+        <p:sp>
+          <p:nvSpPr>
+            <p:cNvPr id="11" name="Rounded Rectangle 10">
+              <a:extLst>
+                <a:ext uri="{FF2B5EF4-FFF2-40B4-BE49-F238E27FC236}">
+                  <a16:creationId xmlns:a16="http://schemas.microsoft.com/office/drawing/2014/main" id="{BA73F5B4-784A-1905-56E4-F66DD5CF66D1}"/>
+                </a:ext>
+              </a:extLst>
+            </p:cNvPr>
+            <p:cNvSpPr/>
+            <p:nvPr/>
+          </p:nvSpPr>
+          <p:spPr>
+            <a:xfrm>
+              <a:off x="3711542" y="2630156"/>
+              <a:ext cx="1603863" cy="859693"/>
+            </a:xfrm>
+            <a:prstGeom prst="roundRect">
+              <a:avLst/>
+            </a:prstGeom>
+            <a:solidFill>
+              <a:schemeClr val="accent5">
+                <a:lumMod val="60000"/>
+                <a:lumOff val="40000"/>
+              </a:schemeClr>
+            </a:solidFill>
+            <a:ln w="38100">
+              <a:solidFill>
+                <a:schemeClr val="accent5">
+                  <a:lumMod val="50000"/>
+                </a:schemeClr>
+              </a:solidFill>
+            </a:ln>
+          </p:spPr>
+          <p:style>
+            <a:lnRef idx="2">
+              <a:schemeClr val="accent1">
+                <a:shade val="50000"/>
+              </a:schemeClr>
+            </a:lnRef>
+            <a:fillRef idx="1">
+              <a:schemeClr val="accent1"/>
+            </a:fillRef>
+            <a:effectRef idx="0">
+              <a:schemeClr val="accent1"/>
+            </a:effectRef>
+            <a:fontRef idx="minor">
+              <a:schemeClr val="lt1"/>
+            </a:fontRef>
+          </p:style>
+          <p:txBody>
+            <a:bodyPr rtlCol="0" anchor="ctr"/>
+            <a:lstStyle/>
+            <a:p>
+              <a:pPr algn="ctr"/>
+              <a:r>
+                <a:rPr lang="en-US" dirty="0">
+                  <a:solidFill>
+                    <a:schemeClr val="tx1"/>
+                  </a:solidFill>
+                </a:rPr>
+                <a:t>Submit Node</a:t>
+              </a:r>
+            </a:p>
+            <a:p>
+              <a:pPr algn="ctr"/>
+              <a:r>
+                <a:rPr lang="en-US" dirty="0">
+                  <a:solidFill>
+                    <a:schemeClr val="tx1"/>
+                  </a:solidFill>
+                </a:rPr>
+                <a:t>(Virtual Machine)</a:t>
+              </a:r>
+            </a:p>
+          </p:txBody>
+        </p:sp>
+        <p:sp>
+          <p:nvSpPr>
+            <p:cNvPr id="13" name="Oval 12">
+              <a:extLst>
+                <a:ext uri="{FF2B5EF4-FFF2-40B4-BE49-F238E27FC236}">
+                  <a16:creationId xmlns:a16="http://schemas.microsoft.com/office/drawing/2014/main" id="{B23E8560-94CE-FA98-2D82-2CDD6424210B}"/>
+                </a:ext>
+              </a:extLst>
+            </p:cNvPr>
+            <p:cNvSpPr/>
+            <p:nvPr/>
+          </p:nvSpPr>
+          <p:spPr>
+            <a:xfrm>
+              <a:off x="1595405" y="2796905"/>
+              <a:ext cx="953931" cy="526195"/>
+            </a:xfrm>
+            <a:prstGeom prst="ellipse">
+              <a:avLst/>
+            </a:prstGeom>
+            <a:ln w="38100">
+              <a:solidFill>
+                <a:schemeClr val="accent1">
+                  <a:lumMod val="50000"/>
+                </a:schemeClr>
+              </a:solidFill>
+            </a:ln>
+          </p:spPr>
+          <p:style>
+            <a:lnRef idx="2">
+              <a:schemeClr val="accent1">
+                <a:shade val="50000"/>
+              </a:schemeClr>
+            </a:lnRef>
+            <a:fillRef idx="1">
+              <a:schemeClr val="accent1"/>
+            </a:fillRef>
+            <a:effectRef idx="0">
+              <a:schemeClr val="accent1"/>
+            </a:effectRef>
+            <a:fontRef idx="minor">
+              <a:schemeClr val="lt1"/>
+            </a:fontRef>
+          </p:style>
+          <p:txBody>
+            <a:bodyPr rtlCol="0" anchor="ctr"/>
+            <a:lstStyle/>
+            <a:p>
+              <a:pPr algn="ctr"/>
+              <a:r>
+                <a:rPr lang="en-US" dirty="0"/>
+                <a:t>User</a:t>
+              </a:r>
+            </a:p>
+          </p:txBody>
+        </p:sp>
+      </p:grpSp>
+      <p:cxnSp>
+        <p:nvCxnSpPr>
+          <p:cNvPr id="3" name="Straight Arrow Connector 2">
+            <a:extLst>
+              <a:ext uri="{FF2B5EF4-FFF2-40B4-BE49-F238E27FC236}">
+                <a16:creationId xmlns:a16="http://schemas.microsoft.com/office/drawing/2014/main" id="{FA69B435-6BF5-D85B-BC34-432CFCDDE252}"/>
+              </a:ext>
+            </a:extLst>
+          </p:cNvPr>
+          <p:cNvCxnSpPr>
+            <a:cxnSpLocks/>
+            <a:stCxn id="10" idx="2"/>
+            <a:endCxn id="11" idx="0"/>
+          </p:cNvCxnSpPr>
+          <p:nvPr/>
+        </p:nvCxnSpPr>
+        <p:spPr>
+          <a:xfrm>
+            <a:off x="4221301" y="1402120"/>
+            <a:ext cx="0" cy="1276638"/>
+          </a:xfrm>
+          <a:prstGeom prst="straightConnector1">
+            <a:avLst/>
+          </a:prstGeom>
+          <a:ln w="38100">
+            <a:solidFill>
+              <a:schemeClr val="tx1"/>
+            </a:solidFill>
+            <a:tailEnd type="triangle"/>
+          </a:ln>
+        </p:spPr>
+        <p:style>
+          <a:lnRef idx="1">
+            <a:schemeClr val="accent1"/>
+          </a:lnRef>
+          <a:fillRef idx="0">
+            <a:schemeClr val="accent1"/>
+          </a:fillRef>
+          <a:effectRef idx="0">
+            <a:schemeClr val="accent1"/>
+          </a:effectRef>
+          <a:fontRef idx="minor">
+            <a:schemeClr val="tx1"/>
+          </a:fontRef>
+        </p:style>
+      </p:cxnSp>
+      <p:sp>
+        <p:nvSpPr>
+          <p:cNvPr id="9" name="TextBox 8">
+            <a:extLst>
+              <a:ext uri="{FF2B5EF4-FFF2-40B4-BE49-F238E27FC236}">
+                <a16:creationId xmlns:a16="http://schemas.microsoft.com/office/drawing/2014/main" id="{659E5D10-34BF-4EA1-42A6-C22203B7F246}"/>
+              </a:ext>
+            </a:extLst>
+          </p:cNvPr>
+          <p:cNvSpPr txBox="1"/>
+          <p:nvPr/>
+        </p:nvSpPr>
+        <p:spPr>
+          <a:xfrm>
+            <a:off x="3407743" y="1770283"/>
+            <a:ext cx="880402" cy="523220"/>
+          </a:xfrm>
+          <a:prstGeom prst="rect">
+            <a:avLst/>
+          </a:prstGeom>
+          <a:noFill/>
+        </p:spPr>
+        <p:txBody>
+          <a:bodyPr wrap="square" rtlCol="0">
+            <a:spAutoFit/>
+          </a:bodyPr>
+          <a:lstStyle/>
+          <a:p>
+            <a:pPr algn="ctr"/>
+            <a:r>
+              <a:rPr lang="en-US" sz="1400" dirty="0">
+                <a:latin typeface="Consolas" panose="020B0609020204030204" pitchFamily="49" charset="0"/>
+                <a:cs typeface="Consolas" panose="020B0609020204030204" pitchFamily="49" charset="0"/>
+              </a:rPr>
+              <a:t>Shell Access</a:t>
+            </a:r>
+          </a:p>
+        </p:txBody>
+      </p:sp>
+      <p:pic>
+        <p:nvPicPr>
+          <p:cNvPr id="4" name="Picture 3">
+            <a:extLst>
+              <a:ext uri="{FF2B5EF4-FFF2-40B4-BE49-F238E27FC236}">
+                <a16:creationId xmlns:a16="http://schemas.microsoft.com/office/drawing/2014/main" id="{EF8C1916-9500-EB9E-CFD7-C43DB5139A9F}"/>
+              </a:ext>
+            </a:extLst>
+          </p:cNvPr>
+          <p:cNvPicPr>
+            <a:picLocks noChangeAspect="1"/>
+          </p:cNvPicPr>
+          <p:nvPr/>
+        </p:nvPicPr>
+        <p:blipFill>
+          <a:blip r:embed="rId2"/>
+          <a:stretch>
+            <a:fillRect/>
+          </a:stretch>
+        </p:blipFill>
+        <p:spPr>
+          <a:xfrm>
+            <a:off x="954581" y="637515"/>
+            <a:ext cx="648493" cy="650626"/>
+          </a:xfrm>
+          <a:prstGeom prst="rect">
+            <a:avLst/>
+          </a:prstGeom>
+        </p:spPr>
+      </p:pic>
+    </p:spTree>
+    <p:extLst>
+      <p:ext uri="{BB962C8B-B14F-4D97-AF65-F5344CB8AC3E}">
+        <p14:creationId xmlns:p14="http://schemas.microsoft.com/office/powerpoint/2010/main" val="2830287466"/>
+      </p:ext>
+    </p:extLst>
+  </p:cSld>
+  <p:clrMapOvr>
+    <a:masterClrMapping/>
+  </p:clrMapOvr>
+</p:sld>
+</file>
+
+<file path=ppt/slides/slide4.xml><?xml version="1.0" encoding="utf-8"?>
+<p:sld xmlns:a="http://schemas.openxmlformats.org/drawingml/2006/main" xmlns:r="http://schemas.openxmlformats.org/officeDocument/2006/relationships" xmlns:p="http://schemas.openxmlformats.org/presentationml/2006/main">
+  <p:cSld>
+    <p:spTree>
+      <p:nvGrpSpPr>
+        <p:cNvPr id="1" name=""/>
+        <p:cNvGrpSpPr/>
+        <p:nvPr/>
+      </p:nvGrpSpPr>
+      <p:grpSpPr>
+        <a:xfrm>
+          <a:off x="0" y="0"/>
+          <a:ext cx="0" cy="0"/>
+          <a:chOff x="0" y="0"/>
+          <a:chExt cx="0" cy="0"/>
+        </a:xfrm>
+      </p:grpSpPr>
       <p:sp>
         <p:nvSpPr>
           <p:cNvPr id="27" name="Rounded Rectangle 26">
@@ -6400,6 +7876,2806 @@
     <p:extLst>
       <p:ext uri="{BB962C8B-B14F-4D97-AF65-F5344CB8AC3E}">
         <p14:creationId xmlns:p14="http://schemas.microsoft.com/office/powerpoint/2010/main" val="1182157541"/>
+      </p:ext>
+    </p:extLst>
+  </p:cSld>
+  <p:clrMapOvr>
+    <a:masterClrMapping/>
+  </p:clrMapOvr>
+</p:sld>
+</file>
+
+<file path=ppt/slides/slide5.xml><?xml version="1.0" encoding="utf-8"?>
+<p:sld xmlns:a="http://schemas.openxmlformats.org/drawingml/2006/main" xmlns:r="http://schemas.openxmlformats.org/officeDocument/2006/relationships" xmlns:p="http://schemas.openxmlformats.org/presentationml/2006/main">
+  <p:cSld>
+    <p:spTree>
+      <p:nvGrpSpPr>
+        <p:cNvPr id="1" name="">
+          <a:extLst>
+            <a:ext uri="{FF2B5EF4-FFF2-40B4-BE49-F238E27FC236}">
+              <a16:creationId xmlns:a16="http://schemas.microsoft.com/office/drawing/2014/main" id="{03F308B0-DEBD-1BEE-6A06-1A52A8A44541}"/>
+            </a:ext>
+          </a:extLst>
+        </p:cNvPr>
+        <p:cNvGrpSpPr/>
+        <p:nvPr/>
+      </p:nvGrpSpPr>
+      <p:grpSpPr>
+        <a:xfrm>
+          <a:off x="0" y="0"/>
+          <a:ext cx="0" cy="0"/>
+          <a:chOff x="0" y="0"/>
+          <a:chExt cx="0" cy="0"/>
+        </a:xfrm>
+      </p:grpSpPr>
+      <p:pic>
+        <p:nvPicPr>
+          <p:cNvPr id="1028" name="Picture 4">
+            <a:extLst>
+              <a:ext uri="{FF2B5EF4-FFF2-40B4-BE49-F238E27FC236}">
+                <a16:creationId xmlns:a16="http://schemas.microsoft.com/office/drawing/2014/main" id="{EEF9AF63-232C-F324-34B3-6A95C8649EDA}"/>
+              </a:ext>
+            </a:extLst>
+          </p:cNvPr>
+          <p:cNvPicPr>
+            <a:picLocks noChangeAspect="1" noChangeArrowheads="1"/>
+          </p:cNvPicPr>
+          <p:nvPr/>
+        </p:nvPicPr>
+        <p:blipFill>
+          <a:blip r:embed="rId2">
+            <a:extLst>
+              <a:ext uri="{28A0092B-C50C-407E-A947-70E740481C1C}">
+                <a14:useLocalDpi xmlns:a14="http://schemas.microsoft.com/office/drawing/2010/main" val="0"/>
+              </a:ext>
+            </a:extLst>
+          </a:blip>
+          <a:srcRect/>
+          <a:stretch>
+            <a:fillRect/>
+          </a:stretch>
+        </p:blipFill>
+        <p:spPr bwMode="auto">
+          <a:xfrm>
+            <a:off x="371915" y="1362583"/>
+            <a:ext cx="1325591" cy="1325591"/>
+          </a:xfrm>
+          <a:prstGeom prst="rect">
+            <a:avLst/>
+          </a:prstGeom>
+          <a:noFill/>
+          <a:extLst>
+            <a:ext uri="{909E8E84-426E-40DD-AFC4-6F175D3DCCD1}">
+              <a14:hiddenFill xmlns:a14="http://schemas.microsoft.com/office/drawing/2010/main">
+                <a:solidFill>
+                  <a:srgbClr val="FFFFFF"/>
+                </a:solidFill>
+              </a14:hiddenFill>
+            </a:ext>
+          </a:extLst>
+        </p:spPr>
+      </p:pic>
+      <p:pic>
+        <p:nvPicPr>
+          <p:cNvPr id="4" name="Picture 4">
+            <a:extLst>
+              <a:ext uri="{FF2B5EF4-FFF2-40B4-BE49-F238E27FC236}">
+                <a16:creationId xmlns:a16="http://schemas.microsoft.com/office/drawing/2014/main" id="{1F4DF4F6-835C-5FA5-E645-38F2FAC8F8A7}"/>
+              </a:ext>
+            </a:extLst>
+          </p:cNvPr>
+          <p:cNvPicPr>
+            <a:picLocks noChangeAspect="1" noChangeArrowheads="1"/>
+          </p:cNvPicPr>
+          <p:nvPr/>
+        </p:nvPicPr>
+        <p:blipFill>
+          <a:blip r:embed="rId2">
+            <a:extLst>
+              <a:ext uri="{28A0092B-C50C-407E-A947-70E740481C1C}">
+                <a14:useLocalDpi xmlns:a14="http://schemas.microsoft.com/office/drawing/2010/main" val="0"/>
+              </a:ext>
+            </a:extLst>
+          </a:blip>
+          <a:srcRect/>
+          <a:stretch>
+            <a:fillRect/>
+          </a:stretch>
+        </p:blipFill>
+        <p:spPr bwMode="auto">
+          <a:xfrm>
+            <a:off x="371914" y="3972855"/>
+            <a:ext cx="1325591" cy="1325591"/>
+          </a:xfrm>
+          <a:prstGeom prst="rect">
+            <a:avLst/>
+          </a:prstGeom>
+          <a:noFill/>
+          <a:extLst>
+            <a:ext uri="{909E8E84-426E-40DD-AFC4-6F175D3DCCD1}">
+              <a14:hiddenFill xmlns:a14="http://schemas.microsoft.com/office/drawing/2010/main">
+                <a:solidFill>
+                  <a:srgbClr val="FFFFFF"/>
+                </a:solidFill>
+              </a14:hiddenFill>
+            </a:ext>
+          </a:extLst>
+        </p:spPr>
+      </p:pic>
+      <p:pic>
+        <p:nvPicPr>
+          <p:cNvPr id="5" name="Picture 4">
+            <a:extLst>
+              <a:ext uri="{FF2B5EF4-FFF2-40B4-BE49-F238E27FC236}">
+                <a16:creationId xmlns:a16="http://schemas.microsoft.com/office/drawing/2014/main" id="{625831F6-34C0-7698-22F3-DA1271549E85}"/>
+              </a:ext>
+            </a:extLst>
+          </p:cNvPr>
+          <p:cNvPicPr>
+            <a:picLocks noChangeAspect="1"/>
+          </p:cNvPicPr>
+          <p:nvPr/>
+        </p:nvPicPr>
+        <p:blipFill>
+          <a:blip r:embed="rId3"/>
+          <a:stretch>
+            <a:fillRect/>
+          </a:stretch>
+        </p:blipFill>
+        <p:spPr>
+          <a:xfrm>
+            <a:off x="2549876" y="1700065"/>
+            <a:ext cx="648493" cy="650626"/>
+          </a:xfrm>
+          <a:prstGeom prst="rect">
+            <a:avLst/>
+          </a:prstGeom>
+        </p:spPr>
+      </p:pic>
+      <p:sp>
+        <p:nvSpPr>
+          <p:cNvPr id="14" name="TextBox 13">
+            <a:extLst>
+              <a:ext uri="{FF2B5EF4-FFF2-40B4-BE49-F238E27FC236}">
+                <a16:creationId xmlns:a16="http://schemas.microsoft.com/office/drawing/2014/main" id="{4FB3383D-F898-FCA7-3B73-8306E4404C7A}"/>
+              </a:ext>
+            </a:extLst>
+          </p:cNvPr>
+          <p:cNvSpPr txBox="1"/>
+          <p:nvPr/>
+        </p:nvSpPr>
+        <p:spPr>
+          <a:xfrm>
+            <a:off x="2345999" y="2359458"/>
+            <a:ext cx="1044125" cy="307777"/>
+          </a:xfrm>
+          <a:prstGeom prst="rect">
+            <a:avLst/>
+          </a:prstGeom>
+          <a:noFill/>
+        </p:spPr>
+        <p:txBody>
+          <a:bodyPr wrap="square" rtlCol="0">
+            <a:spAutoFit/>
+          </a:bodyPr>
+          <a:lstStyle/>
+          <a:p>
+            <a:pPr algn="ctr"/>
+            <a:r>
+              <a:rPr lang="en-US" sz="1400" dirty="0">
+                <a:latin typeface="Consolas" panose="020B0609020204030204" pitchFamily="49" charset="0"/>
+                <a:cs typeface="Consolas" panose="020B0609020204030204" pitchFamily="49" charset="0"/>
+              </a:rPr>
+              <a:t>firewall</a:t>
+            </a:r>
+          </a:p>
+        </p:txBody>
+      </p:sp>
+      <p:sp>
+        <p:nvSpPr>
+          <p:cNvPr id="15" name="TextBox 14">
+            <a:extLst>
+              <a:ext uri="{FF2B5EF4-FFF2-40B4-BE49-F238E27FC236}">
+                <a16:creationId xmlns:a16="http://schemas.microsoft.com/office/drawing/2014/main" id="{6AB6E238-E0B1-5534-19F1-A7298C8E1310}"/>
+              </a:ext>
+            </a:extLst>
+          </p:cNvPr>
+          <p:cNvSpPr txBox="1"/>
+          <p:nvPr/>
+        </p:nvSpPr>
+        <p:spPr>
+          <a:xfrm>
+            <a:off x="2352060" y="4959522"/>
+            <a:ext cx="1044125" cy="307777"/>
+          </a:xfrm>
+          <a:prstGeom prst="rect">
+            <a:avLst/>
+          </a:prstGeom>
+          <a:noFill/>
+        </p:spPr>
+        <p:txBody>
+          <a:bodyPr wrap="square" rtlCol="0">
+            <a:spAutoFit/>
+          </a:bodyPr>
+          <a:lstStyle/>
+          <a:p>
+            <a:pPr algn="ctr"/>
+            <a:r>
+              <a:rPr lang="en-US" sz="1400" dirty="0">
+                <a:latin typeface="Consolas" panose="020B0609020204030204" pitchFamily="49" charset="0"/>
+                <a:cs typeface="Consolas" panose="020B0609020204030204" pitchFamily="49" charset="0"/>
+              </a:rPr>
+              <a:t>firewall</a:t>
+            </a:r>
+          </a:p>
+        </p:txBody>
+      </p:sp>
+      <p:sp>
+        <p:nvSpPr>
+          <p:cNvPr id="17" name="Rounded Rectangle 16">
+            <a:extLst>
+              <a:ext uri="{FF2B5EF4-FFF2-40B4-BE49-F238E27FC236}">
+                <a16:creationId xmlns:a16="http://schemas.microsoft.com/office/drawing/2014/main" id="{232874E1-940E-A6F0-ECA5-D8874172DABB}"/>
+              </a:ext>
+            </a:extLst>
+          </p:cNvPr>
+          <p:cNvSpPr/>
+          <p:nvPr/>
+        </p:nvSpPr>
+        <p:spPr>
+          <a:xfrm>
+            <a:off x="4455822" y="1518399"/>
+            <a:ext cx="1788584" cy="1030200"/>
+          </a:xfrm>
+          <a:prstGeom prst="roundRect">
+            <a:avLst/>
+          </a:prstGeom>
+          <a:solidFill>
+            <a:schemeClr val="accent5">
+              <a:lumMod val="60000"/>
+              <a:lumOff val="40000"/>
+            </a:schemeClr>
+          </a:solidFill>
+          <a:ln w="38100">
+            <a:solidFill>
+              <a:schemeClr val="accent5">
+                <a:lumMod val="50000"/>
+              </a:schemeClr>
+            </a:solidFill>
+          </a:ln>
+        </p:spPr>
+        <p:style>
+          <a:lnRef idx="2">
+            <a:schemeClr val="accent1">
+              <a:shade val="50000"/>
+            </a:schemeClr>
+          </a:lnRef>
+          <a:fillRef idx="1">
+            <a:schemeClr val="accent1"/>
+          </a:fillRef>
+          <a:effectRef idx="0">
+            <a:schemeClr val="accent1"/>
+          </a:effectRef>
+          <a:fontRef idx="minor">
+            <a:schemeClr val="lt1"/>
+          </a:fontRef>
+        </p:style>
+        <p:txBody>
+          <a:bodyPr rtlCol="0" anchor="ctr"/>
+          <a:lstStyle/>
+          <a:p>
+            <a:pPr algn="ctr"/>
+            <a:r>
+              <a:rPr lang="en-US" dirty="0">
+                <a:solidFill>
+                  <a:schemeClr val="tx1"/>
+                </a:solidFill>
+              </a:rPr>
+              <a:t>RR Portal</a:t>
+            </a:r>
+          </a:p>
+          <a:p>
+            <a:pPr algn="ctr"/>
+            <a:r>
+              <a:rPr lang="en-US" sz="1100" dirty="0">
+                <a:solidFill>
+                  <a:schemeClr val="tx1"/>
+                </a:solidFill>
+              </a:rPr>
+              <a:t>rrportal.hpc.psu.edu</a:t>
+            </a:r>
+          </a:p>
+          <a:p>
+            <a:pPr algn="ctr"/>
+            <a:endParaRPr lang="en-US" sz="1100" dirty="0">
+              <a:solidFill>
+                <a:schemeClr val="tx1"/>
+              </a:solidFill>
+            </a:endParaRPr>
+          </a:p>
+          <a:p>
+            <a:pPr algn="ctr"/>
+            <a:r>
+              <a:rPr lang="en-US" sz="1100" dirty="0">
+                <a:solidFill>
+                  <a:schemeClr val="tx1"/>
+                </a:solidFill>
+              </a:rPr>
+              <a:t>(no ssh, no data sharing)</a:t>
+            </a:r>
+          </a:p>
+        </p:txBody>
+      </p:sp>
+      <p:sp>
+        <p:nvSpPr>
+          <p:cNvPr id="19" name="TextBox 18">
+            <a:extLst>
+              <a:ext uri="{FF2B5EF4-FFF2-40B4-BE49-F238E27FC236}">
+                <a16:creationId xmlns:a16="http://schemas.microsoft.com/office/drawing/2014/main" id="{D5FB9A04-F13F-83AE-5DDD-BEECE583E8CD}"/>
+              </a:ext>
+            </a:extLst>
+          </p:cNvPr>
+          <p:cNvSpPr txBox="1"/>
+          <p:nvPr/>
+        </p:nvSpPr>
+        <p:spPr>
+          <a:xfrm>
+            <a:off x="3339013" y="3749778"/>
+            <a:ext cx="930669" cy="738664"/>
+          </a:xfrm>
+          <a:prstGeom prst="rect">
+            <a:avLst/>
+          </a:prstGeom>
+          <a:noFill/>
+        </p:spPr>
+        <p:txBody>
+          <a:bodyPr wrap="square" rtlCol="0">
+            <a:spAutoFit/>
+          </a:bodyPr>
+          <a:lstStyle/>
+          <a:p>
+            <a:pPr algn="ctr"/>
+            <a:r>
+              <a:rPr lang="en-US" sz="1400" dirty="0">
+                <a:latin typeface="Consolas" panose="020B0609020204030204" pitchFamily="49" charset="0"/>
+                <a:cs typeface="Consolas" panose="020B0609020204030204" pitchFamily="49" charset="0"/>
+              </a:rPr>
+              <a:t>scp</a:t>
+            </a:r>
+          </a:p>
+          <a:p>
+            <a:pPr algn="ctr"/>
+            <a:r>
+              <a:rPr lang="en-US" sz="1400" dirty="0">
+                <a:latin typeface="Consolas" panose="020B0609020204030204" pitchFamily="49" charset="0"/>
+                <a:cs typeface="Consolas" panose="020B0609020204030204" pitchFamily="49" charset="0"/>
+              </a:rPr>
+              <a:t>sftp</a:t>
+            </a:r>
+          </a:p>
+          <a:p>
+            <a:pPr algn="ctr"/>
+            <a:r>
+              <a:rPr lang="en-US" sz="1400" dirty="0">
+                <a:latin typeface="Consolas" panose="020B0609020204030204" pitchFamily="49" charset="0"/>
+                <a:cs typeface="Consolas" panose="020B0609020204030204" pitchFamily="49" charset="0"/>
+              </a:rPr>
+              <a:t>rsync</a:t>
+            </a:r>
+          </a:p>
+        </p:txBody>
+      </p:sp>
+      <p:sp>
+        <p:nvSpPr>
+          <p:cNvPr id="20" name="Can 19">
+            <a:extLst>
+              <a:ext uri="{FF2B5EF4-FFF2-40B4-BE49-F238E27FC236}">
+                <a16:creationId xmlns:a16="http://schemas.microsoft.com/office/drawing/2014/main" id="{78219295-927C-8140-2CAA-182084963A27}"/>
+              </a:ext>
+            </a:extLst>
+          </p:cNvPr>
+          <p:cNvSpPr/>
+          <p:nvPr/>
+        </p:nvSpPr>
+        <p:spPr>
+          <a:xfrm>
+            <a:off x="8306443" y="1518399"/>
+            <a:ext cx="2740374" cy="1030200"/>
+          </a:xfrm>
+          <a:prstGeom prst="can">
+            <a:avLst/>
+          </a:prstGeom>
+          <a:solidFill>
+            <a:schemeClr val="accent5">
+              <a:lumMod val="60000"/>
+              <a:lumOff val="40000"/>
+            </a:schemeClr>
+          </a:solidFill>
+          <a:ln w="38100">
+            <a:solidFill>
+              <a:schemeClr val="accent5">
+                <a:lumMod val="50000"/>
+              </a:schemeClr>
+            </a:solidFill>
+          </a:ln>
+        </p:spPr>
+        <p:style>
+          <a:lnRef idx="2">
+            <a:schemeClr val="accent1">
+              <a:shade val="50000"/>
+            </a:schemeClr>
+          </a:lnRef>
+          <a:fillRef idx="1">
+            <a:schemeClr val="accent1"/>
+          </a:fillRef>
+          <a:effectRef idx="0">
+            <a:schemeClr val="accent1"/>
+          </a:effectRef>
+          <a:fontRef idx="minor">
+            <a:schemeClr val="lt1"/>
+          </a:fontRef>
+        </p:style>
+        <p:txBody>
+          <a:bodyPr rtlCol="0" anchor="ctr"/>
+          <a:lstStyle/>
+          <a:p>
+            <a:pPr algn="ctr"/>
+            <a:r>
+              <a:rPr lang="en-US" sz="1100" dirty="0">
+                <a:solidFill>
+                  <a:schemeClr val="tx1"/>
+                </a:solidFill>
+              </a:rPr>
+              <a:t>/storage/restricted/&lt;PI&gt;/&lt;restrictedtype&gt;</a:t>
+            </a:r>
+          </a:p>
+        </p:txBody>
+      </p:sp>
+      <p:sp>
+        <p:nvSpPr>
+          <p:cNvPr id="21" name="Can 20">
+            <a:extLst>
+              <a:ext uri="{FF2B5EF4-FFF2-40B4-BE49-F238E27FC236}">
+                <a16:creationId xmlns:a16="http://schemas.microsoft.com/office/drawing/2014/main" id="{3154BFC7-EECD-E275-3896-FB67578F50E2}"/>
+              </a:ext>
+            </a:extLst>
+          </p:cNvPr>
+          <p:cNvSpPr/>
+          <p:nvPr/>
+        </p:nvSpPr>
+        <p:spPr>
+          <a:xfrm>
+            <a:off x="8306443" y="4119110"/>
+            <a:ext cx="2740374" cy="1030200"/>
+          </a:xfrm>
+          <a:prstGeom prst="can">
+            <a:avLst/>
+          </a:prstGeom>
+          <a:solidFill>
+            <a:schemeClr val="accent5">
+              <a:lumMod val="60000"/>
+              <a:lumOff val="40000"/>
+            </a:schemeClr>
+          </a:solidFill>
+          <a:ln w="38100">
+            <a:solidFill>
+              <a:schemeClr val="accent5">
+                <a:lumMod val="50000"/>
+              </a:schemeClr>
+            </a:solidFill>
+          </a:ln>
+        </p:spPr>
+        <p:style>
+          <a:lnRef idx="2">
+            <a:schemeClr val="accent1">
+              <a:shade val="50000"/>
+            </a:schemeClr>
+          </a:lnRef>
+          <a:fillRef idx="1">
+            <a:schemeClr val="accent1"/>
+          </a:fillRef>
+          <a:effectRef idx="0">
+            <a:schemeClr val="accent1"/>
+          </a:effectRef>
+          <a:fontRef idx="minor">
+            <a:schemeClr val="lt1"/>
+          </a:fontRef>
+        </p:style>
+        <p:txBody>
+          <a:bodyPr rtlCol="0" anchor="ctr"/>
+          <a:lstStyle/>
+          <a:p>
+            <a:pPr algn="ctr"/>
+            <a:r>
+              <a:rPr lang="en-US" sz="1100" dirty="0">
+                <a:solidFill>
+                  <a:schemeClr val="tx1"/>
+                </a:solidFill>
+              </a:rPr>
+              <a:t>/storage/restricted/&lt;PI&gt;/datastage</a:t>
+            </a:r>
+          </a:p>
+        </p:txBody>
+      </p:sp>
+      <p:sp>
+        <p:nvSpPr>
+          <p:cNvPr id="22" name="TextBox 21">
+            <a:extLst>
+              <a:ext uri="{FF2B5EF4-FFF2-40B4-BE49-F238E27FC236}">
+                <a16:creationId xmlns:a16="http://schemas.microsoft.com/office/drawing/2014/main" id="{A3F74C00-4D47-B2D7-10ED-D913B03412A8}"/>
+              </a:ext>
+            </a:extLst>
+          </p:cNvPr>
+          <p:cNvSpPr txBox="1"/>
+          <p:nvPr/>
+        </p:nvSpPr>
+        <p:spPr>
+          <a:xfrm>
+            <a:off x="6531265" y="1510279"/>
+            <a:ext cx="1488317" cy="523220"/>
+          </a:xfrm>
+          <a:prstGeom prst="rect">
+            <a:avLst/>
+          </a:prstGeom>
+          <a:noFill/>
+        </p:spPr>
+        <p:txBody>
+          <a:bodyPr wrap="square" rtlCol="0">
+            <a:spAutoFit/>
+          </a:bodyPr>
+          <a:lstStyle/>
+          <a:p>
+            <a:pPr algn="ctr"/>
+            <a:r>
+              <a:rPr lang="en-US" sz="1400" dirty="0">
+                <a:latin typeface="Consolas" panose="020B0609020204030204" pitchFamily="49" charset="0"/>
+                <a:cs typeface="Consolas" panose="020B0609020204030204" pitchFamily="49" charset="0"/>
+              </a:rPr>
+              <a:t>via submit or compute node</a:t>
+            </a:r>
+          </a:p>
+        </p:txBody>
+      </p:sp>
+      <p:cxnSp>
+        <p:nvCxnSpPr>
+          <p:cNvPr id="23" name="Straight Arrow Connector 22">
+            <a:extLst>
+              <a:ext uri="{FF2B5EF4-FFF2-40B4-BE49-F238E27FC236}">
+                <a16:creationId xmlns:a16="http://schemas.microsoft.com/office/drawing/2014/main" id="{0303240C-6026-1CDF-0D90-52AA0AC50E0A}"/>
+              </a:ext>
+            </a:extLst>
+          </p:cNvPr>
+          <p:cNvCxnSpPr>
+            <a:cxnSpLocks/>
+            <a:stCxn id="1028" idx="3"/>
+            <a:endCxn id="5" idx="1"/>
+          </p:cNvCxnSpPr>
+          <p:nvPr/>
+        </p:nvCxnSpPr>
+        <p:spPr>
+          <a:xfrm flipV="1">
+            <a:off x="1697506" y="2025378"/>
+            <a:ext cx="852370" cy="1"/>
+          </a:xfrm>
+          <a:prstGeom prst="straightConnector1">
+            <a:avLst/>
+          </a:prstGeom>
+          <a:ln w="38100">
+            <a:solidFill>
+              <a:schemeClr val="tx1"/>
+            </a:solidFill>
+            <a:tailEnd type="none"/>
+          </a:ln>
+        </p:spPr>
+        <p:style>
+          <a:lnRef idx="1">
+            <a:schemeClr val="accent1"/>
+          </a:lnRef>
+          <a:fillRef idx="0">
+            <a:schemeClr val="accent1"/>
+          </a:fillRef>
+          <a:effectRef idx="0">
+            <a:schemeClr val="accent1"/>
+          </a:effectRef>
+          <a:fontRef idx="minor">
+            <a:schemeClr val="tx1"/>
+          </a:fontRef>
+        </p:style>
+      </p:cxnSp>
+      <p:cxnSp>
+        <p:nvCxnSpPr>
+          <p:cNvPr id="26" name="Straight Arrow Connector 25">
+            <a:extLst>
+              <a:ext uri="{FF2B5EF4-FFF2-40B4-BE49-F238E27FC236}">
+                <a16:creationId xmlns:a16="http://schemas.microsoft.com/office/drawing/2014/main" id="{612B7F49-3528-62CF-AA10-AAF95877C249}"/>
+              </a:ext>
+            </a:extLst>
+          </p:cNvPr>
+          <p:cNvCxnSpPr>
+            <a:cxnSpLocks/>
+            <a:stCxn id="17" idx="1"/>
+            <a:endCxn id="5" idx="3"/>
+          </p:cNvCxnSpPr>
+          <p:nvPr/>
+        </p:nvCxnSpPr>
+        <p:spPr>
+          <a:xfrm flipH="1" flipV="1">
+            <a:off x="3198369" y="2025378"/>
+            <a:ext cx="1257453" cy="8121"/>
+          </a:xfrm>
+          <a:prstGeom prst="straightConnector1">
+            <a:avLst/>
+          </a:prstGeom>
+          <a:ln w="38100">
+            <a:solidFill>
+              <a:schemeClr val="tx1"/>
+            </a:solidFill>
+            <a:tailEnd type="none"/>
+          </a:ln>
+        </p:spPr>
+        <p:style>
+          <a:lnRef idx="1">
+            <a:schemeClr val="accent1"/>
+          </a:lnRef>
+          <a:fillRef idx="0">
+            <a:schemeClr val="accent1"/>
+          </a:fillRef>
+          <a:effectRef idx="0">
+            <a:schemeClr val="accent1"/>
+          </a:effectRef>
+          <a:fontRef idx="minor">
+            <a:schemeClr val="tx1"/>
+          </a:fontRef>
+        </p:style>
+      </p:cxnSp>
+      <p:cxnSp>
+        <p:nvCxnSpPr>
+          <p:cNvPr id="30" name="Straight Arrow Connector 29">
+            <a:extLst>
+              <a:ext uri="{FF2B5EF4-FFF2-40B4-BE49-F238E27FC236}">
+                <a16:creationId xmlns:a16="http://schemas.microsoft.com/office/drawing/2014/main" id="{1346592D-2BBD-5CD0-507F-0D7D41CF97D1}"/>
+              </a:ext>
+            </a:extLst>
+          </p:cNvPr>
+          <p:cNvCxnSpPr>
+            <a:cxnSpLocks/>
+            <a:stCxn id="17" idx="3"/>
+            <a:endCxn id="20" idx="2"/>
+          </p:cNvCxnSpPr>
+          <p:nvPr/>
+        </p:nvCxnSpPr>
+        <p:spPr>
+          <a:xfrm>
+            <a:off x="6244406" y="2033499"/>
+            <a:ext cx="2062037" cy="0"/>
+          </a:xfrm>
+          <a:prstGeom prst="straightConnector1">
+            <a:avLst/>
+          </a:prstGeom>
+          <a:ln w="38100">
+            <a:solidFill>
+              <a:schemeClr val="tx1"/>
+            </a:solidFill>
+            <a:tailEnd type="none"/>
+          </a:ln>
+        </p:spPr>
+        <p:style>
+          <a:lnRef idx="1">
+            <a:schemeClr val="accent1"/>
+          </a:lnRef>
+          <a:fillRef idx="0">
+            <a:schemeClr val="accent1"/>
+          </a:fillRef>
+          <a:effectRef idx="0">
+            <a:schemeClr val="accent1"/>
+          </a:effectRef>
+          <a:fontRef idx="minor">
+            <a:schemeClr val="tx1"/>
+          </a:fontRef>
+        </p:style>
+      </p:cxnSp>
+      <p:cxnSp>
+        <p:nvCxnSpPr>
+          <p:cNvPr id="33" name="Straight Arrow Connector 32">
+            <a:extLst>
+              <a:ext uri="{FF2B5EF4-FFF2-40B4-BE49-F238E27FC236}">
+                <a16:creationId xmlns:a16="http://schemas.microsoft.com/office/drawing/2014/main" id="{682C2197-2866-6955-13FE-214A44D4D047}"/>
+              </a:ext>
+            </a:extLst>
+          </p:cNvPr>
+          <p:cNvCxnSpPr>
+            <a:cxnSpLocks/>
+            <a:stCxn id="4" idx="3"/>
+            <a:endCxn id="12" idx="1"/>
+          </p:cNvCxnSpPr>
+          <p:nvPr/>
+        </p:nvCxnSpPr>
+        <p:spPr>
+          <a:xfrm flipV="1">
+            <a:off x="1697505" y="4634210"/>
+            <a:ext cx="852371" cy="1441"/>
+          </a:xfrm>
+          <a:prstGeom prst="straightConnector1">
+            <a:avLst/>
+          </a:prstGeom>
+          <a:ln w="38100">
+            <a:solidFill>
+              <a:schemeClr val="tx1"/>
+            </a:solidFill>
+            <a:tailEnd type="none"/>
+          </a:ln>
+        </p:spPr>
+        <p:style>
+          <a:lnRef idx="1">
+            <a:schemeClr val="accent1"/>
+          </a:lnRef>
+          <a:fillRef idx="0">
+            <a:schemeClr val="accent1"/>
+          </a:fillRef>
+          <a:effectRef idx="0">
+            <a:schemeClr val="accent1"/>
+          </a:effectRef>
+          <a:fontRef idx="minor">
+            <a:schemeClr val="tx1"/>
+          </a:fontRef>
+        </p:style>
+      </p:cxnSp>
+      <p:cxnSp>
+        <p:nvCxnSpPr>
+          <p:cNvPr id="37" name="Straight Arrow Connector 36">
+            <a:extLst>
+              <a:ext uri="{FF2B5EF4-FFF2-40B4-BE49-F238E27FC236}">
+                <a16:creationId xmlns:a16="http://schemas.microsoft.com/office/drawing/2014/main" id="{08D01707-869D-E626-24E4-6E45E29C505A}"/>
+              </a:ext>
+            </a:extLst>
+          </p:cNvPr>
+          <p:cNvCxnSpPr>
+            <a:cxnSpLocks/>
+            <a:stCxn id="12" idx="3"/>
+            <a:endCxn id="18" idx="1"/>
+          </p:cNvCxnSpPr>
+          <p:nvPr/>
+        </p:nvCxnSpPr>
+        <p:spPr>
+          <a:xfrm>
+            <a:off x="3198369" y="4634210"/>
+            <a:ext cx="1257453" cy="1"/>
+          </a:xfrm>
+          <a:prstGeom prst="straightConnector1">
+            <a:avLst/>
+          </a:prstGeom>
+          <a:ln w="38100">
+            <a:solidFill>
+              <a:schemeClr val="tx1"/>
+            </a:solidFill>
+            <a:tailEnd type="none"/>
+          </a:ln>
+        </p:spPr>
+        <p:style>
+          <a:lnRef idx="1">
+            <a:schemeClr val="accent1"/>
+          </a:lnRef>
+          <a:fillRef idx="0">
+            <a:schemeClr val="accent1"/>
+          </a:fillRef>
+          <a:effectRef idx="0">
+            <a:schemeClr val="accent1"/>
+          </a:effectRef>
+          <a:fontRef idx="minor">
+            <a:schemeClr val="tx1"/>
+          </a:fontRef>
+        </p:style>
+      </p:cxnSp>
+      <p:cxnSp>
+        <p:nvCxnSpPr>
+          <p:cNvPr id="38" name="Straight Arrow Connector 37">
+            <a:extLst>
+              <a:ext uri="{FF2B5EF4-FFF2-40B4-BE49-F238E27FC236}">
+                <a16:creationId xmlns:a16="http://schemas.microsoft.com/office/drawing/2014/main" id="{5B7C407D-F30B-866B-E43C-BAF70F9A19C5}"/>
+              </a:ext>
+            </a:extLst>
+          </p:cNvPr>
+          <p:cNvCxnSpPr>
+            <a:cxnSpLocks/>
+            <a:stCxn id="21" idx="2"/>
+            <a:endCxn id="18" idx="3"/>
+          </p:cNvCxnSpPr>
+          <p:nvPr/>
+        </p:nvCxnSpPr>
+        <p:spPr>
+          <a:xfrm flipH="1">
+            <a:off x="6244407" y="4634210"/>
+            <a:ext cx="2062036" cy="1"/>
+          </a:xfrm>
+          <a:prstGeom prst="straightConnector1">
+            <a:avLst/>
+          </a:prstGeom>
+          <a:ln w="38100">
+            <a:solidFill>
+              <a:schemeClr val="tx1"/>
+            </a:solidFill>
+            <a:tailEnd type="none"/>
+          </a:ln>
+        </p:spPr>
+        <p:style>
+          <a:lnRef idx="1">
+            <a:schemeClr val="accent1"/>
+          </a:lnRef>
+          <a:fillRef idx="0">
+            <a:schemeClr val="accent1"/>
+          </a:fillRef>
+          <a:effectRef idx="0">
+            <a:schemeClr val="accent1"/>
+          </a:effectRef>
+          <a:fontRef idx="minor">
+            <a:schemeClr val="tx1"/>
+          </a:fontRef>
+        </p:style>
+      </p:cxnSp>
+      <p:sp>
+        <p:nvSpPr>
+          <p:cNvPr id="46" name="TextBox 45">
+            <a:extLst>
+              <a:ext uri="{FF2B5EF4-FFF2-40B4-BE49-F238E27FC236}">
+                <a16:creationId xmlns:a16="http://schemas.microsoft.com/office/drawing/2014/main" id="{11D705BB-B4BA-0DAB-0CB8-4325691082C0}"/>
+              </a:ext>
+            </a:extLst>
+          </p:cNvPr>
+          <p:cNvSpPr txBox="1"/>
+          <p:nvPr/>
+        </p:nvSpPr>
+        <p:spPr>
+          <a:xfrm>
+            <a:off x="511425" y="2350691"/>
+            <a:ext cx="1044125" cy="307777"/>
+          </a:xfrm>
+          <a:prstGeom prst="rect">
+            <a:avLst/>
+          </a:prstGeom>
+          <a:noFill/>
+        </p:spPr>
+        <p:txBody>
+          <a:bodyPr wrap="square" rtlCol="0">
+            <a:spAutoFit/>
+          </a:bodyPr>
+          <a:lstStyle/>
+          <a:p>
+            <a:pPr algn="ctr"/>
+            <a:r>
+              <a:rPr lang="en-US" sz="1400" dirty="0">
+                <a:latin typeface="Consolas" panose="020B0609020204030204" pitchFamily="49" charset="0"/>
+                <a:cs typeface="Consolas" panose="020B0609020204030204" pitchFamily="49" charset="0"/>
+              </a:rPr>
+              <a:t>User</a:t>
+            </a:r>
+          </a:p>
+        </p:txBody>
+      </p:sp>
+      <p:sp>
+        <p:nvSpPr>
+          <p:cNvPr id="47" name="TextBox 46">
+            <a:extLst>
+              <a:ext uri="{FF2B5EF4-FFF2-40B4-BE49-F238E27FC236}">
+                <a16:creationId xmlns:a16="http://schemas.microsoft.com/office/drawing/2014/main" id="{7BCD98EB-F28A-3B1E-3584-D176D4A75FCB}"/>
+              </a:ext>
+            </a:extLst>
+          </p:cNvPr>
+          <p:cNvSpPr txBox="1"/>
+          <p:nvPr/>
+        </p:nvSpPr>
+        <p:spPr>
+          <a:xfrm>
+            <a:off x="401898" y="4973132"/>
+            <a:ext cx="1263177" cy="307777"/>
+          </a:xfrm>
+          <a:prstGeom prst="rect">
+            <a:avLst/>
+          </a:prstGeom>
+          <a:noFill/>
+        </p:spPr>
+        <p:txBody>
+          <a:bodyPr wrap="square" rtlCol="0">
+            <a:spAutoFit/>
+          </a:bodyPr>
+          <a:lstStyle/>
+          <a:p>
+            <a:pPr algn="ctr"/>
+            <a:r>
+              <a:rPr lang="en-US" sz="1400" dirty="0">
+                <a:latin typeface="Consolas" panose="020B0609020204030204" pitchFamily="49" charset="0"/>
+                <a:cs typeface="Consolas" panose="020B0609020204030204" pitchFamily="49" charset="0"/>
+              </a:rPr>
+              <a:t>Data Admin</a:t>
+            </a:r>
+          </a:p>
+        </p:txBody>
+      </p:sp>
+      <p:cxnSp>
+        <p:nvCxnSpPr>
+          <p:cNvPr id="48" name="Straight Arrow Connector 47">
+            <a:extLst>
+              <a:ext uri="{FF2B5EF4-FFF2-40B4-BE49-F238E27FC236}">
+                <a16:creationId xmlns:a16="http://schemas.microsoft.com/office/drawing/2014/main" id="{BCC84D31-19F7-3A14-CC65-9ABA21BBD115}"/>
+              </a:ext>
+            </a:extLst>
+          </p:cNvPr>
+          <p:cNvCxnSpPr>
+            <a:cxnSpLocks/>
+            <a:stCxn id="20" idx="3"/>
+            <a:endCxn id="21" idx="1"/>
+          </p:cNvCxnSpPr>
+          <p:nvPr/>
+        </p:nvCxnSpPr>
+        <p:spPr>
+          <a:xfrm>
+            <a:off x="9676630" y="2548599"/>
+            <a:ext cx="0" cy="1570511"/>
+          </a:xfrm>
+          <a:prstGeom prst="straightConnector1">
+            <a:avLst/>
+          </a:prstGeom>
+          <a:ln w="38100">
+            <a:solidFill>
+              <a:schemeClr val="tx1"/>
+            </a:solidFill>
+            <a:tailEnd type="none"/>
+          </a:ln>
+        </p:spPr>
+        <p:style>
+          <a:lnRef idx="1">
+            <a:schemeClr val="accent1"/>
+          </a:lnRef>
+          <a:fillRef idx="0">
+            <a:schemeClr val="accent1"/>
+          </a:fillRef>
+          <a:effectRef idx="0">
+            <a:schemeClr val="accent1"/>
+          </a:effectRef>
+          <a:fontRef idx="minor">
+            <a:schemeClr val="tx1"/>
+          </a:fontRef>
+        </p:style>
+      </p:cxnSp>
+      <p:sp>
+        <p:nvSpPr>
+          <p:cNvPr id="76" name="Down Arrow 75">
+            <a:extLst>
+              <a:ext uri="{FF2B5EF4-FFF2-40B4-BE49-F238E27FC236}">
+                <a16:creationId xmlns:a16="http://schemas.microsoft.com/office/drawing/2014/main" id="{F6D962AF-D014-A1CF-4E4B-5BA165A13904}"/>
+              </a:ext>
+            </a:extLst>
+          </p:cNvPr>
+          <p:cNvSpPr/>
+          <p:nvPr/>
+        </p:nvSpPr>
+        <p:spPr>
+          <a:xfrm>
+            <a:off x="9376914" y="2548599"/>
+            <a:ext cx="595222" cy="1570511"/>
+          </a:xfrm>
+          <a:prstGeom prst="downArrow">
+            <a:avLst/>
+          </a:prstGeom>
+          <a:solidFill>
+            <a:srgbClr val="00B050"/>
+          </a:solidFill>
+          <a:ln>
+            <a:solidFill>
+              <a:schemeClr val="tx1"/>
+            </a:solidFill>
+          </a:ln>
+        </p:spPr>
+        <p:style>
+          <a:lnRef idx="2">
+            <a:schemeClr val="accent1">
+              <a:shade val="15000"/>
+            </a:schemeClr>
+          </a:lnRef>
+          <a:fillRef idx="1">
+            <a:schemeClr val="accent1"/>
+          </a:fillRef>
+          <a:effectRef idx="0">
+            <a:schemeClr val="accent1"/>
+          </a:effectRef>
+          <a:fontRef idx="minor">
+            <a:schemeClr val="lt1"/>
+          </a:fontRef>
+        </p:style>
+        <p:txBody>
+          <a:bodyPr rtlCol="0" anchor="ctr"/>
+          <a:lstStyle/>
+          <a:p>
+            <a:pPr algn="ctr"/>
+            <a:endParaRPr lang="en-US"/>
+          </a:p>
+        </p:txBody>
+      </p:sp>
+      <p:sp>
+        <p:nvSpPr>
+          <p:cNvPr id="80" name="Rounded Rectangle 79">
+            <a:extLst>
+              <a:ext uri="{FF2B5EF4-FFF2-40B4-BE49-F238E27FC236}">
+                <a16:creationId xmlns:a16="http://schemas.microsoft.com/office/drawing/2014/main" id="{7E9B2CEF-2AB0-ED3D-6A04-74B22A17E3B9}"/>
+              </a:ext>
+            </a:extLst>
+          </p:cNvPr>
+          <p:cNvSpPr/>
+          <p:nvPr/>
+        </p:nvSpPr>
+        <p:spPr>
+          <a:xfrm>
+            <a:off x="401898" y="4119111"/>
+            <a:ext cx="1263177" cy="1249150"/>
+          </a:xfrm>
+          <a:prstGeom prst="roundRect">
+            <a:avLst/>
+          </a:prstGeom>
+          <a:noFill/>
+          <a:ln w="76200">
+            <a:solidFill>
+              <a:srgbClr val="C00000"/>
+            </a:solidFill>
+          </a:ln>
+        </p:spPr>
+        <p:style>
+          <a:lnRef idx="2">
+            <a:schemeClr val="accent1">
+              <a:shade val="15000"/>
+            </a:schemeClr>
+          </a:lnRef>
+          <a:fillRef idx="1">
+            <a:schemeClr val="accent1"/>
+          </a:fillRef>
+          <a:effectRef idx="0">
+            <a:schemeClr val="accent1"/>
+          </a:effectRef>
+          <a:fontRef idx="minor">
+            <a:schemeClr val="lt1"/>
+          </a:fontRef>
+        </p:style>
+        <p:txBody>
+          <a:bodyPr rtlCol="0" anchor="ctr"/>
+          <a:lstStyle/>
+          <a:p>
+            <a:pPr algn="ctr"/>
+            <a:endParaRPr lang="en-US"/>
+          </a:p>
+        </p:txBody>
+      </p:sp>
+      <p:sp>
+        <p:nvSpPr>
+          <p:cNvPr id="81" name="Rounded Rectangle 80">
+            <a:extLst>
+              <a:ext uri="{FF2B5EF4-FFF2-40B4-BE49-F238E27FC236}">
+                <a16:creationId xmlns:a16="http://schemas.microsoft.com/office/drawing/2014/main" id="{7E7EF0ED-6531-5191-A016-CDE4191332F8}"/>
+              </a:ext>
+            </a:extLst>
+          </p:cNvPr>
+          <p:cNvSpPr/>
+          <p:nvPr/>
+        </p:nvSpPr>
+        <p:spPr>
+          <a:xfrm>
+            <a:off x="396066" y="1473932"/>
+            <a:ext cx="1263177" cy="1249150"/>
+          </a:xfrm>
+          <a:prstGeom prst="roundRect">
+            <a:avLst/>
+          </a:prstGeom>
+          <a:noFill/>
+          <a:ln w="76200">
+            <a:solidFill>
+              <a:srgbClr val="00B050"/>
+            </a:solidFill>
+          </a:ln>
+        </p:spPr>
+        <p:style>
+          <a:lnRef idx="2">
+            <a:schemeClr val="accent1">
+              <a:shade val="15000"/>
+            </a:schemeClr>
+          </a:lnRef>
+          <a:fillRef idx="1">
+            <a:schemeClr val="accent1"/>
+          </a:fillRef>
+          <a:effectRef idx="0">
+            <a:schemeClr val="accent1"/>
+          </a:effectRef>
+          <a:fontRef idx="minor">
+            <a:schemeClr val="lt1"/>
+          </a:fontRef>
+        </p:style>
+        <p:txBody>
+          <a:bodyPr rtlCol="0" anchor="ctr"/>
+          <a:lstStyle/>
+          <a:p>
+            <a:pPr algn="ctr"/>
+            <a:endParaRPr lang="en-US"/>
+          </a:p>
+        </p:txBody>
+      </p:sp>
+      <p:sp>
+        <p:nvSpPr>
+          <p:cNvPr id="82" name="TextBox 81">
+            <a:extLst>
+              <a:ext uri="{FF2B5EF4-FFF2-40B4-BE49-F238E27FC236}">
+                <a16:creationId xmlns:a16="http://schemas.microsoft.com/office/drawing/2014/main" id="{90410A2E-05A1-3B39-008F-85D646B07C03}"/>
+              </a:ext>
+            </a:extLst>
+          </p:cNvPr>
+          <p:cNvSpPr txBox="1"/>
+          <p:nvPr/>
+        </p:nvSpPr>
+        <p:spPr>
+          <a:xfrm>
+            <a:off x="9898230" y="3072244"/>
+            <a:ext cx="1978568" cy="523220"/>
+          </a:xfrm>
+          <a:prstGeom prst="rect">
+            <a:avLst/>
+          </a:prstGeom>
+          <a:solidFill>
+            <a:schemeClr val="accent6">
+              <a:lumMod val="20000"/>
+              <a:lumOff val="80000"/>
+            </a:schemeClr>
+          </a:solidFill>
+          <a:ln w="38100">
+            <a:solidFill>
+              <a:srgbClr val="00B050"/>
+            </a:solidFill>
+          </a:ln>
+        </p:spPr>
+        <p:txBody>
+          <a:bodyPr wrap="square" rtlCol="0">
+            <a:spAutoFit/>
+          </a:bodyPr>
+          <a:lstStyle/>
+          <a:p>
+            <a:pPr algn="ctr"/>
+            <a:r>
+              <a:rPr lang="en-US" sz="1400" dirty="0">
+                <a:latin typeface="Consolas" panose="020B0609020204030204" pitchFamily="49" charset="0"/>
+                <a:cs typeface="Consolas" panose="020B0609020204030204" pitchFamily="49" charset="0"/>
+              </a:rPr>
+              <a:t>1. User moves data to staging area</a:t>
+            </a:r>
+          </a:p>
+        </p:txBody>
+      </p:sp>
+      <p:sp>
+        <p:nvSpPr>
+          <p:cNvPr id="83" name="TextBox 82">
+            <a:extLst>
+              <a:ext uri="{FF2B5EF4-FFF2-40B4-BE49-F238E27FC236}">
+                <a16:creationId xmlns:a16="http://schemas.microsoft.com/office/drawing/2014/main" id="{E35CF02A-7189-405A-BE2A-34959B8B2332}"/>
+              </a:ext>
+            </a:extLst>
+          </p:cNvPr>
+          <p:cNvSpPr txBox="1"/>
+          <p:nvPr/>
+        </p:nvSpPr>
+        <p:spPr>
+          <a:xfrm>
+            <a:off x="4050740" y="5261884"/>
+            <a:ext cx="2600226" cy="523220"/>
+          </a:xfrm>
+          <a:prstGeom prst="rect">
+            <a:avLst/>
+          </a:prstGeom>
+          <a:solidFill>
+            <a:srgbClr val="FFAEB2"/>
+          </a:solidFill>
+          <a:ln w="38100">
+            <a:solidFill>
+              <a:srgbClr val="C00000"/>
+            </a:solidFill>
+          </a:ln>
+        </p:spPr>
+        <p:txBody>
+          <a:bodyPr wrap="square" rtlCol="0">
+            <a:spAutoFit/>
+          </a:bodyPr>
+          <a:lstStyle/>
+          <a:p>
+            <a:pPr algn="ctr"/>
+            <a:r>
+              <a:rPr lang="en-US" sz="1400" dirty="0">
+                <a:latin typeface="Consolas" panose="020B0609020204030204" pitchFamily="49" charset="0"/>
+                <a:cs typeface="Consolas" panose="020B0609020204030204" pitchFamily="49" charset="0"/>
+              </a:rPr>
+              <a:t>2. Data Admin moves data from staging area off RR</a:t>
+            </a:r>
+          </a:p>
+        </p:txBody>
+      </p:sp>
+      <p:sp>
+        <p:nvSpPr>
+          <p:cNvPr id="85" name="Down Arrow 84">
+            <a:extLst>
+              <a:ext uri="{FF2B5EF4-FFF2-40B4-BE49-F238E27FC236}">
+                <a16:creationId xmlns:a16="http://schemas.microsoft.com/office/drawing/2014/main" id="{CF8C2F57-CF8D-6AF3-B19F-6D7D06BE6C17}"/>
+              </a:ext>
+            </a:extLst>
+          </p:cNvPr>
+          <p:cNvSpPr/>
+          <p:nvPr/>
+        </p:nvSpPr>
+        <p:spPr>
+          <a:xfrm rot="5400000">
+            <a:off x="4685232" y="1309035"/>
+            <a:ext cx="595222" cy="6647200"/>
+          </a:xfrm>
+          <a:prstGeom prst="downArrow">
+            <a:avLst/>
+          </a:prstGeom>
+          <a:solidFill>
+            <a:srgbClr val="C00000"/>
+          </a:solidFill>
+          <a:ln>
+            <a:solidFill>
+              <a:schemeClr val="tx1"/>
+            </a:solidFill>
+          </a:ln>
+        </p:spPr>
+        <p:style>
+          <a:lnRef idx="2">
+            <a:schemeClr val="accent1">
+              <a:shade val="15000"/>
+            </a:schemeClr>
+          </a:lnRef>
+          <a:fillRef idx="1">
+            <a:schemeClr val="accent1"/>
+          </a:fillRef>
+          <a:effectRef idx="0">
+            <a:schemeClr val="accent1"/>
+          </a:effectRef>
+          <a:fontRef idx="minor">
+            <a:schemeClr val="lt1"/>
+          </a:fontRef>
+        </p:style>
+        <p:txBody>
+          <a:bodyPr rtlCol="0" anchor="ctr"/>
+          <a:lstStyle/>
+          <a:p>
+            <a:pPr algn="ctr"/>
+            <a:endParaRPr lang="en-US"/>
+          </a:p>
+        </p:txBody>
+      </p:sp>
+      <p:pic>
+        <p:nvPicPr>
+          <p:cNvPr id="12" name="Picture 11">
+            <a:extLst>
+              <a:ext uri="{FF2B5EF4-FFF2-40B4-BE49-F238E27FC236}">
+                <a16:creationId xmlns:a16="http://schemas.microsoft.com/office/drawing/2014/main" id="{7E0C23F7-4346-85CB-EF06-6ECB55D2DFEF}"/>
+              </a:ext>
+            </a:extLst>
+          </p:cNvPr>
+          <p:cNvPicPr>
+            <a:picLocks noChangeAspect="1"/>
+          </p:cNvPicPr>
+          <p:nvPr/>
+        </p:nvPicPr>
+        <p:blipFill>
+          <a:blip r:embed="rId3"/>
+          <a:stretch>
+            <a:fillRect/>
+          </a:stretch>
+        </p:blipFill>
+        <p:spPr>
+          <a:xfrm>
+            <a:off x="2549876" y="4308897"/>
+            <a:ext cx="648493" cy="650626"/>
+          </a:xfrm>
+          <a:prstGeom prst="rect">
+            <a:avLst/>
+          </a:prstGeom>
+        </p:spPr>
+      </p:pic>
+      <p:sp>
+        <p:nvSpPr>
+          <p:cNvPr id="86" name="Title 1">
+            <a:extLst>
+              <a:ext uri="{FF2B5EF4-FFF2-40B4-BE49-F238E27FC236}">
+                <a16:creationId xmlns:a16="http://schemas.microsoft.com/office/drawing/2014/main" id="{881D3D4D-F388-75FC-2089-A062278CAE73}"/>
+              </a:ext>
+            </a:extLst>
+          </p:cNvPr>
+          <p:cNvSpPr>
+            <a:spLocks noGrp="1"/>
+          </p:cNvSpPr>
+          <p:nvPr>
+            <p:ph type="title"/>
+          </p:nvPr>
+        </p:nvSpPr>
+        <p:spPr>
+          <a:xfrm>
+            <a:off x="371914" y="372703"/>
+            <a:ext cx="10515600" cy="947788"/>
+          </a:xfrm>
+        </p:spPr>
+        <p:txBody>
+          <a:bodyPr/>
+          <a:lstStyle/>
+          <a:p>
+            <a:r>
+              <a:rPr lang="en-US" dirty="0"/>
+              <a:t>Outbound Transfer Workflow</a:t>
+            </a:r>
+          </a:p>
+        </p:txBody>
+      </p:sp>
+      <p:sp>
+        <p:nvSpPr>
+          <p:cNvPr id="18" name="Rounded Rectangle 17">
+            <a:extLst>
+              <a:ext uri="{FF2B5EF4-FFF2-40B4-BE49-F238E27FC236}">
+                <a16:creationId xmlns:a16="http://schemas.microsoft.com/office/drawing/2014/main" id="{2232F691-C47B-7FD9-1ED6-0C775B544B18}"/>
+              </a:ext>
+            </a:extLst>
+          </p:cNvPr>
+          <p:cNvSpPr/>
+          <p:nvPr/>
+        </p:nvSpPr>
+        <p:spPr>
+          <a:xfrm>
+            <a:off x="4455822" y="4308897"/>
+            <a:ext cx="1788585" cy="650627"/>
+          </a:xfrm>
+          <a:prstGeom prst="roundRect">
+            <a:avLst/>
+          </a:prstGeom>
+          <a:solidFill>
+            <a:schemeClr val="accent5">
+              <a:lumMod val="60000"/>
+              <a:lumOff val="40000"/>
+            </a:schemeClr>
+          </a:solidFill>
+          <a:ln w="38100">
+            <a:solidFill>
+              <a:schemeClr val="accent5">
+                <a:lumMod val="50000"/>
+              </a:schemeClr>
+            </a:solidFill>
+          </a:ln>
+        </p:spPr>
+        <p:style>
+          <a:lnRef idx="2">
+            <a:schemeClr val="accent1">
+              <a:shade val="50000"/>
+            </a:schemeClr>
+          </a:lnRef>
+          <a:fillRef idx="1">
+            <a:schemeClr val="accent1"/>
+          </a:fillRef>
+          <a:effectRef idx="0">
+            <a:schemeClr val="accent1"/>
+          </a:effectRef>
+          <a:fontRef idx="minor">
+            <a:schemeClr val="lt1"/>
+          </a:fontRef>
+        </p:style>
+        <p:txBody>
+          <a:bodyPr rtlCol="0" anchor="ctr"/>
+          <a:lstStyle/>
+          <a:p>
+            <a:pPr algn="ctr"/>
+            <a:r>
+              <a:rPr lang="en-US" sz="1100" dirty="0">
+                <a:solidFill>
+                  <a:schemeClr val="tx1"/>
+                </a:solidFill>
+              </a:rPr>
+              <a:t>rr-datamgr01.hpc.psu.edu</a:t>
+            </a:r>
+          </a:p>
+        </p:txBody>
+      </p:sp>
+    </p:spTree>
+    <p:extLst>
+      <p:ext uri="{BB962C8B-B14F-4D97-AF65-F5344CB8AC3E}">
+        <p14:creationId xmlns:p14="http://schemas.microsoft.com/office/powerpoint/2010/main" val="1428882918"/>
+      </p:ext>
+    </p:extLst>
+  </p:cSld>
+  <p:clrMapOvr>
+    <a:masterClrMapping/>
+  </p:clrMapOvr>
+</p:sld>
+</file>
+
+<file path=ppt/slides/slide6.xml><?xml version="1.0" encoding="utf-8"?>
+<p:sld xmlns:a="http://schemas.openxmlformats.org/drawingml/2006/main" xmlns:r="http://schemas.openxmlformats.org/officeDocument/2006/relationships" xmlns:p="http://schemas.openxmlformats.org/presentationml/2006/main">
+  <p:cSld>
+    <p:spTree>
+      <p:nvGrpSpPr>
+        <p:cNvPr id="1" name="">
+          <a:extLst>
+            <a:ext uri="{FF2B5EF4-FFF2-40B4-BE49-F238E27FC236}">
+              <a16:creationId xmlns:a16="http://schemas.microsoft.com/office/drawing/2014/main" id="{621DCFCE-6411-0372-B631-F295BF5FE649}"/>
+            </a:ext>
+          </a:extLst>
+        </p:cNvPr>
+        <p:cNvGrpSpPr/>
+        <p:nvPr/>
+      </p:nvGrpSpPr>
+      <p:grpSpPr>
+        <a:xfrm>
+          <a:off x="0" y="0"/>
+          <a:ext cx="0" cy="0"/>
+          <a:chOff x="0" y="0"/>
+          <a:chExt cx="0" cy="0"/>
+        </a:xfrm>
+      </p:grpSpPr>
+      <p:pic>
+        <p:nvPicPr>
+          <p:cNvPr id="1028" name="Picture 4">
+            <a:extLst>
+              <a:ext uri="{FF2B5EF4-FFF2-40B4-BE49-F238E27FC236}">
+                <a16:creationId xmlns:a16="http://schemas.microsoft.com/office/drawing/2014/main" id="{BA891237-AC83-690E-6B76-51B0E3270B2B}"/>
+              </a:ext>
+            </a:extLst>
+          </p:cNvPr>
+          <p:cNvPicPr>
+            <a:picLocks noChangeAspect="1" noChangeArrowheads="1"/>
+          </p:cNvPicPr>
+          <p:nvPr/>
+        </p:nvPicPr>
+        <p:blipFill>
+          <a:blip r:embed="rId2">
+            <a:extLst>
+              <a:ext uri="{28A0092B-C50C-407E-A947-70E740481C1C}">
+                <a14:useLocalDpi xmlns:a14="http://schemas.microsoft.com/office/drawing/2010/main" val="0"/>
+              </a:ext>
+            </a:extLst>
+          </a:blip>
+          <a:srcRect/>
+          <a:stretch>
+            <a:fillRect/>
+          </a:stretch>
+        </p:blipFill>
+        <p:spPr bwMode="auto">
+          <a:xfrm>
+            <a:off x="371915" y="1362583"/>
+            <a:ext cx="1325591" cy="1325591"/>
+          </a:xfrm>
+          <a:prstGeom prst="rect">
+            <a:avLst/>
+          </a:prstGeom>
+          <a:noFill/>
+          <a:extLst>
+            <a:ext uri="{909E8E84-426E-40DD-AFC4-6F175D3DCCD1}">
+              <a14:hiddenFill xmlns:a14="http://schemas.microsoft.com/office/drawing/2010/main">
+                <a:solidFill>
+                  <a:srgbClr val="FFFFFF"/>
+                </a:solidFill>
+              </a14:hiddenFill>
+            </a:ext>
+          </a:extLst>
+        </p:spPr>
+      </p:pic>
+      <p:pic>
+        <p:nvPicPr>
+          <p:cNvPr id="4" name="Picture 4">
+            <a:extLst>
+              <a:ext uri="{FF2B5EF4-FFF2-40B4-BE49-F238E27FC236}">
+                <a16:creationId xmlns:a16="http://schemas.microsoft.com/office/drawing/2014/main" id="{791B5AE5-E1D9-37CD-1031-D6352276DC65}"/>
+              </a:ext>
+            </a:extLst>
+          </p:cNvPr>
+          <p:cNvPicPr>
+            <a:picLocks noChangeAspect="1" noChangeArrowheads="1"/>
+          </p:cNvPicPr>
+          <p:nvPr/>
+        </p:nvPicPr>
+        <p:blipFill>
+          <a:blip r:embed="rId2">
+            <a:extLst>
+              <a:ext uri="{28A0092B-C50C-407E-A947-70E740481C1C}">
+                <a14:useLocalDpi xmlns:a14="http://schemas.microsoft.com/office/drawing/2010/main" val="0"/>
+              </a:ext>
+            </a:extLst>
+          </a:blip>
+          <a:srcRect/>
+          <a:stretch>
+            <a:fillRect/>
+          </a:stretch>
+        </p:blipFill>
+        <p:spPr bwMode="auto">
+          <a:xfrm>
+            <a:off x="371914" y="3972855"/>
+            <a:ext cx="1325591" cy="1325591"/>
+          </a:xfrm>
+          <a:prstGeom prst="rect">
+            <a:avLst/>
+          </a:prstGeom>
+          <a:noFill/>
+          <a:extLst>
+            <a:ext uri="{909E8E84-426E-40DD-AFC4-6F175D3DCCD1}">
+              <a14:hiddenFill xmlns:a14="http://schemas.microsoft.com/office/drawing/2010/main">
+                <a:solidFill>
+                  <a:srgbClr val="FFFFFF"/>
+                </a:solidFill>
+              </a14:hiddenFill>
+            </a:ext>
+          </a:extLst>
+        </p:spPr>
+      </p:pic>
+      <p:pic>
+        <p:nvPicPr>
+          <p:cNvPr id="5" name="Picture 4">
+            <a:extLst>
+              <a:ext uri="{FF2B5EF4-FFF2-40B4-BE49-F238E27FC236}">
+                <a16:creationId xmlns:a16="http://schemas.microsoft.com/office/drawing/2014/main" id="{C2CCF745-EE33-36B5-ADB3-C2967FFDAF75}"/>
+              </a:ext>
+            </a:extLst>
+          </p:cNvPr>
+          <p:cNvPicPr>
+            <a:picLocks noChangeAspect="1"/>
+          </p:cNvPicPr>
+          <p:nvPr/>
+        </p:nvPicPr>
+        <p:blipFill>
+          <a:blip r:embed="rId3"/>
+          <a:stretch>
+            <a:fillRect/>
+          </a:stretch>
+        </p:blipFill>
+        <p:spPr>
+          <a:xfrm>
+            <a:off x="2549876" y="1700065"/>
+            <a:ext cx="648493" cy="650626"/>
+          </a:xfrm>
+          <a:prstGeom prst="rect">
+            <a:avLst/>
+          </a:prstGeom>
+        </p:spPr>
+      </p:pic>
+      <p:sp>
+        <p:nvSpPr>
+          <p:cNvPr id="14" name="TextBox 13">
+            <a:extLst>
+              <a:ext uri="{FF2B5EF4-FFF2-40B4-BE49-F238E27FC236}">
+                <a16:creationId xmlns:a16="http://schemas.microsoft.com/office/drawing/2014/main" id="{405BCC1B-608F-E989-7149-C2092C7513BC}"/>
+              </a:ext>
+            </a:extLst>
+          </p:cNvPr>
+          <p:cNvSpPr txBox="1"/>
+          <p:nvPr/>
+        </p:nvSpPr>
+        <p:spPr>
+          <a:xfrm>
+            <a:off x="2345999" y="2359458"/>
+            <a:ext cx="1044125" cy="307777"/>
+          </a:xfrm>
+          <a:prstGeom prst="rect">
+            <a:avLst/>
+          </a:prstGeom>
+          <a:noFill/>
+        </p:spPr>
+        <p:txBody>
+          <a:bodyPr wrap="square" rtlCol="0">
+            <a:spAutoFit/>
+          </a:bodyPr>
+          <a:lstStyle/>
+          <a:p>
+            <a:pPr algn="ctr"/>
+            <a:r>
+              <a:rPr lang="en-US" sz="1400" dirty="0">
+                <a:latin typeface="Consolas" panose="020B0609020204030204" pitchFamily="49" charset="0"/>
+                <a:cs typeface="Consolas" panose="020B0609020204030204" pitchFamily="49" charset="0"/>
+              </a:rPr>
+              <a:t>firewall</a:t>
+            </a:r>
+          </a:p>
+        </p:txBody>
+      </p:sp>
+      <p:sp>
+        <p:nvSpPr>
+          <p:cNvPr id="15" name="TextBox 14">
+            <a:extLst>
+              <a:ext uri="{FF2B5EF4-FFF2-40B4-BE49-F238E27FC236}">
+                <a16:creationId xmlns:a16="http://schemas.microsoft.com/office/drawing/2014/main" id="{F047B988-6717-F94E-F643-23105B327935}"/>
+              </a:ext>
+            </a:extLst>
+          </p:cNvPr>
+          <p:cNvSpPr txBox="1"/>
+          <p:nvPr/>
+        </p:nvSpPr>
+        <p:spPr>
+          <a:xfrm>
+            <a:off x="2352060" y="4959522"/>
+            <a:ext cx="1044125" cy="307777"/>
+          </a:xfrm>
+          <a:prstGeom prst="rect">
+            <a:avLst/>
+          </a:prstGeom>
+          <a:noFill/>
+        </p:spPr>
+        <p:txBody>
+          <a:bodyPr wrap="square" rtlCol="0">
+            <a:spAutoFit/>
+          </a:bodyPr>
+          <a:lstStyle/>
+          <a:p>
+            <a:pPr algn="ctr"/>
+            <a:r>
+              <a:rPr lang="en-US" sz="1400" dirty="0">
+                <a:latin typeface="Consolas" panose="020B0609020204030204" pitchFamily="49" charset="0"/>
+                <a:cs typeface="Consolas" panose="020B0609020204030204" pitchFamily="49" charset="0"/>
+              </a:rPr>
+              <a:t>firewall</a:t>
+            </a:r>
+          </a:p>
+        </p:txBody>
+      </p:sp>
+      <p:sp>
+        <p:nvSpPr>
+          <p:cNvPr id="17" name="Rounded Rectangle 16">
+            <a:extLst>
+              <a:ext uri="{FF2B5EF4-FFF2-40B4-BE49-F238E27FC236}">
+                <a16:creationId xmlns:a16="http://schemas.microsoft.com/office/drawing/2014/main" id="{F990E046-5A79-2AA5-420D-42CEB96924AD}"/>
+              </a:ext>
+            </a:extLst>
+          </p:cNvPr>
+          <p:cNvSpPr/>
+          <p:nvPr/>
+        </p:nvSpPr>
+        <p:spPr>
+          <a:xfrm>
+            <a:off x="4455822" y="1518399"/>
+            <a:ext cx="1788584" cy="1030200"/>
+          </a:xfrm>
+          <a:prstGeom prst="roundRect">
+            <a:avLst/>
+          </a:prstGeom>
+          <a:solidFill>
+            <a:schemeClr val="accent5">
+              <a:lumMod val="60000"/>
+              <a:lumOff val="40000"/>
+            </a:schemeClr>
+          </a:solidFill>
+          <a:ln w="38100">
+            <a:solidFill>
+              <a:schemeClr val="accent5">
+                <a:lumMod val="50000"/>
+              </a:schemeClr>
+            </a:solidFill>
+          </a:ln>
+        </p:spPr>
+        <p:style>
+          <a:lnRef idx="2">
+            <a:schemeClr val="accent1">
+              <a:shade val="50000"/>
+            </a:schemeClr>
+          </a:lnRef>
+          <a:fillRef idx="1">
+            <a:schemeClr val="accent1"/>
+          </a:fillRef>
+          <a:effectRef idx="0">
+            <a:schemeClr val="accent1"/>
+          </a:effectRef>
+          <a:fontRef idx="minor">
+            <a:schemeClr val="lt1"/>
+          </a:fontRef>
+        </p:style>
+        <p:txBody>
+          <a:bodyPr rtlCol="0" anchor="ctr"/>
+          <a:lstStyle/>
+          <a:p>
+            <a:pPr algn="ctr"/>
+            <a:r>
+              <a:rPr lang="en-US" dirty="0">
+                <a:solidFill>
+                  <a:schemeClr val="tx1"/>
+                </a:solidFill>
+              </a:rPr>
+              <a:t>RR Portal</a:t>
+            </a:r>
+          </a:p>
+          <a:p>
+            <a:pPr algn="ctr"/>
+            <a:r>
+              <a:rPr lang="en-US" sz="1100" dirty="0">
+                <a:solidFill>
+                  <a:schemeClr val="tx1"/>
+                </a:solidFill>
+              </a:rPr>
+              <a:t>rrportal.hpc.psu.edu</a:t>
+            </a:r>
+          </a:p>
+          <a:p>
+            <a:pPr algn="ctr"/>
+            <a:endParaRPr lang="en-US" sz="1100" dirty="0">
+              <a:solidFill>
+                <a:schemeClr val="tx1"/>
+              </a:solidFill>
+            </a:endParaRPr>
+          </a:p>
+          <a:p>
+            <a:pPr algn="ctr"/>
+            <a:r>
+              <a:rPr lang="en-US" sz="1100" dirty="0">
+                <a:solidFill>
+                  <a:schemeClr val="tx1"/>
+                </a:solidFill>
+              </a:rPr>
+              <a:t>(no ssh, no data sharing)</a:t>
+            </a:r>
+          </a:p>
+        </p:txBody>
+      </p:sp>
+      <p:sp>
+        <p:nvSpPr>
+          <p:cNvPr id="19" name="TextBox 18">
+            <a:extLst>
+              <a:ext uri="{FF2B5EF4-FFF2-40B4-BE49-F238E27FC236}">
+                <a16:creationId xmlns:a16="http://schemas.microsoft.com/office/drawing/2014/main" id="{763A7F86-C7C4-7497-4B17-9FF5C94C7EF8}"/>
+              </a:ext>
+            </a:extLst>
+          </p:cNvPr>
+          <p:cNvSpPr txBox="1"/>
+          <p:nvPr/>
+        </p:nvSpPr>
+        <p:spPr>
+          <a:xfrm>
+            <a:off x="3339013" y="3749778"/>
+            <a:ext cx="930669" cy="738664"/>
+          </a:xfrm>
+          <a:prstGeom prst="rect">
+            <a:avLst/>
+          </a:prstGeom>
+          <a:noFill/>
+        </p:spPr>
+        <p:txBody>
+          <a:bodyPr wrap="square" rtlCol="0">
+            <a:spAutoFit/>
+          </a:bodyPr>
+          <a:lstStyle/>
+          <a:p>
+            <a:pPr algn="ctr"/>
+            <a:r>
+              <a:rPr lang="en-US" sz="1400" dirty="0">
+                <a:latin typeface="Consolas" panose="020B0609020204030204" pitchFamily="49" charset="0"/>
+                <a:cs typeface="Consolas" panose="020B0609020204030204" pitchFamily="49" charset="0"/>
+              </a:rPr>
+              <a:t>scp</a:t>
+            </a:r>
+          </a:p>
+          <a:p>
+            <a:pPr algn="ctr"/>
+            <a:r>
+              <a:rPr lang="en-US" sz="1400" dirty="0">
+                <a:latin typeface="Consolas" panose="020B0609020204030204" pitchFamily="49" charset="0"/>
+                <a:cs typeface="Consolas" panose="020B0609020204030204" pitchFamily="49" charset="0"/>
+              </a:rPr>
+              <a:t>sftp</a:t>
+            </a:r>
+          </a:p>
+          <a:p>
+            <a:pPr algn="ctr"/>
+            <a:r>
+              <a:rPr lang="en-US" sz="1400" dirty="0">
+                <a:latin typeface="Consolas" panose="020B0609020204030204" pitchFamily="49" charset="0"/>
+                <a:cs typeface="Consolas" panose="020B0609020204030204" pitchFamily="49" charset="0"/>
+              </a:rPr>
+              <a:t>rsync</a:t>
+            </a:r>
+          </a:p>
+        </p:txBody>
+      </p:sp>
+      <p:sp>
+        <p:nvSpPr>
+          <p:cNvPr id="20" name="Can 19">
+            <a:extLst>
+              <a:ext uri="{FF2B5EF4-FFF2-40B4-BE49-F238E27FC236}">
+                <a16:creationId xmlns:a16="http://schemas.microsoft.com/office/drawing/2014/main" id="{3E108E72-3F1D-23E7-EE73-A9C64ABBEEFC}"/>
+              </a:ext>
+            </a:extLst>
+          </p:cNvPr>
+          <p:cNvSpPr/>
+          <p:nvPr/>
+        </p:nvSpPr>
+        <p:spPr>
+          <a:xfrm>
+            <a:off x="8306443" y="1518399"/>
+            <a:ext cx="2740374" cy="1030200"/>
+          </a:xfrm>
+          <a:prstGeom prst="can">
+            <a:avLst/>
+          </a:prstGeom>
+          <a:solidFill>
+            <a:schemeClr val="accent5">
+              <a:lumMod val="60000"/>
+              <a:lumOff val="40000"/>
+            </a:schemeClr>
+          </a:solidFill>
+          <a:ln w="38100">
+            <a:solidFill>
+              <a:schemeClr val="accent5">
+                <a:lumMod val="50000"/>
+              </a:schemeClr>
+            </a:solidFill>
+          </a:ln>
+        </p:spPr>
+        <p:style>
+          <a:lnRef idx="2">
+            <a:schemeClr val="accent1">
+              <a:shade val="50000"/>
+            </a:schemeClr>
+          </a:lnRef>
+          <a:fillRef idx="1">
+            <a:schemeClr val="accent1"/>
+          </a:fillRef>
+          <a:effectRef idx="0">
+            <a:schemeClr val="accent1"/>
+          </a:effectRef>
+          <a:fontRef idx="minor">
+            <a:schemeClr val="lt1"/>
+          </a:fontRef>
+        </p:style>
+        <p:txBody>
+          <a:bodyPr rtlCol="0" anchor="ctr"/>
+          <a:lstStyle/>
+          <a:p>
+            <a:pPr algn="ctr"/>
+            <a:r>
+              <a:rPr lang="en-US" sz="1100" dirty="0">
+                <a:solidFill>
+                  <a:schemeClr val="tx1"/>
+                </a:solidFill>
+              </a:rPr>
+              <a:t>/storage/restricted/&lt;PI&gt;/&lt;restrictedtype&gt;</a:t>
+            </a:r>
+          </a:p>
+        </p:txBody>
+      </p:sp>
+      <p:sp>
+        <p:nvSpPr>
+          <p:cNvPr id="21" name="Can 20">
+            <a:extLst>
+              <a:ext uri="{FF2B5EF4-FFF2-40B4-BE49-F238E27FC236}">
+                <a16:creationId xmlns:a16="http://schemas.microsoft.com/office/drawing/2014/main" id="{09D0F097-52BF-A44F-0874-7A777DA9DE20}"/>
+              </a:ext>
+            </a:extLst>
+          </p:cNvPr>
+          <p:cNvSpPr/>
+          <p:nvPr/>
+        </p:nvSpPr>
+        <p:spPr>
+          <a:xfrm>
+            <a:off x="8306443" y="4119110"/>
+            <a:ext cx="2740374" cy="1030200"/>
+          </a:xfrm>
+          <a:prstGeom prst="can">
+            <a:avLst/>
+          </a:prstGeom>
+          <a:solidFill>
+            <a:schemeClr val="accent5">
+              <a:lumMod val="60000"/>
+              <a:lumOff val="40000"/>
+            </a:schemeClr>
+          </a:solidFill>
+          <a:ln w="38100">
+            <a:solidFill>
+              <a:schemeClr val="accent5">
+                <a:lumMod val="50000"/>
+              </a:schemeClr>
+            </a:solidFill>
+          </a:ln>
+        </p:spPr>
+        <p:style>
+          <a:lnRef idx="2">
+            <a:schemeClr val="accent1">
+              <a:shade val="50000"/>
+            </a:schemeClr>
+          </a:lnRef>
+          <a:fillRef idx="1">
+            <a:schemeClr val="accent1"/>
+          </a:fillRef>
+          <a:effectRef idx="0">
+            <a:schemeClr val="accent1"/>
+          </a:effectRef>
+          <a:fontRef idx="minor">
+            <a:schemeClr val="lt1"/>
+          </a:fontRef>
+        </p:style>
+        <p:txBody>
+          <a:bodyPr rtlCol="0" anchor="ctr"/>
+          <a:lstStyle/>
+          <a:p>
+            <a:pPr algn="ctr"/>
+            <a:r>
+              <a:rPr lang="en-US" sz="1100" dirty="0">
+                <a:solidFill>
+                  <a:schemeClr val="tx1"/>
+                </a:solidFill>
+              </a:rPr>
+              <a:t>/storage/restricted/&lt;PI&gt;/datastage</a:t>
+            </a:r>
+          </a:p>
+        </p:txBody>
+      </p:sp>
+      <p:sp>
+        <p:nvSpPr>
+          <p:cNvPr id="22" name="TextBox 21">
+            <a:extLst>
+              <a:ext uri="{FF2B5EF4-FFF2-40B4-BE49-F238E27FC236}">
+                <a16:creationId xmlns:a16="http://schemas.microsoft.com/office/drawing/2014/main" id="{F81490C9-8579-6C7A-9512-6A4F80732E13}"/>
+              </a:ext>
+            </a:extLst>
+          </p:cNvPr>
+          <p:cNvSpPr txBox="1"/>
+          <p:nvPr/>
+        </p:nvSpPr>
+        <p:spPr>
+          <a:xfrm>
+            <a:off x="6531265" y="1510279"/>
+            <a:ext cx="1488317" cy="523220"/>
+          </a:xfrm>
+          <a:prstGeom prst="rect">
+            <a:avLst/>
+          </a:prstGeom>
+          <a:noFill/>
+        </p:spPr>
+        <p:txBody>
+          <a:bodyPr wrap="square" rtlCol="0">
+            <a:spAutoFit/>
+          </a:bodyPr>
+          <a:lstStyle/>
+          <a:p>
+            <a:pPr algn="ctr"/>
+            <a:r>
+              <a:rPr lang="en-US" sz="1400" dirty="0">
+                <a:latin typeface="Consolas" panose="020B0609020204030204" pitchFamily="49" charset="0"/>
+                <a:cs typeface="Consolas" panose="020B0609020204030204" pitchFamily="49" charset="0"/>
+              </a:rPr>
+              <a:t>via submit or compute node</a:t>
+            </a:r>
+          </a:p>
+        </p:txBody>
+      </p:sp>
+      <p:cxnSp>
+        <p:nvCxnSpPr>
+          <p:cNvPr id="23" name="Straight Arrow Connector 22">
+            <a:extLst>
+              <a:ext uri="{FF2B5EF4-FFF2-40B4-BE49-F238E27FC236}">
+                <a16:creationId xmlns:a16="http://schemas.microsoft.com/office/drawing/2014/main" id="{F23D1E24-D358-4A1C-C475-4E0D59EDCE96}"/>
+              </a:ext>
+            </a:extLst>
+          </p:cNvPr>
+          <p:cNvCxnSpPr>
+            <a:cxnSpLocks/>
+            <a:stCxn id="1028" idx="3"/>
+            <a:endCxn id="5" idx="1"/>
+          </p:cNvCxnSpPr>
+          <p:nvPr/>
+        </p:nvCxnSpPr>
+        <p:spPr>
+          <a:xfrm flipV="1">
+            <a:off x="1697506" y="2025378"/>
+            <a:ext cx="852370" cy="1"/>
+          </a:xfrm>
+          <a:prstGeom prst="straightConnector1">
+            <a:avLst/>
+          </a:prstGeom>
+          <a:ln w="38100">
+            <a:solidFill>
+              <a:schemeClr val="tx1"/>
+            </a:solidFill>
+            <a:tailEnd type="none"/>
+          </a:ln>
+        </p:spPr>
+        <p:style>
+          <a:lnRef idx="1">
+            <a:schemeClr val="accent1"/>
+          </a:lnRef>
+          <a:fillRef idx="0">
+            <a:schemeClr val="accent1"/>
+          </a:fillRef>
+          <a:effectRef idx="0">
+            <a:schemeClr val="accent1"/>
+          </a:effectRef>
+          <a:fontRef idx="minor">
+            <a:schemeClr val="tx1"/>
+          </a:fontRef>
+        </p:style>
+      </p:cxnSp>
+      <p:cxnSp>
+        <p:nvCxnSpPr>
+          <p:cNvPr id="26" name="Straight Arrow Connector 25">
+            <a:extLst>
+              <a:ext uri="{FF2B5EF4-FFF2-40B4-BE49-F238E27FC236}">
+                <a16:creationId xmlns:a16="http://schemas.microsoft.com/office/drawing/2014/main" id="{E989C13B-28C1-E94F-C958-ABF00A16B815}"/>
+              </a:ext>
+            </a:extLst>
+          </p:cNvPr>
+          <p:cNvCxnSpPr>
+            <a:cxnSpLocks/>
+            <a:stCxn id="17" idx="1"/>
+            <a:endCxn id="5" idx="3"/>
+          </p:cNvCxnSpPr>
+          <p:nvPr/>
+        </p:nvCxnSpPr>
+        <p:spPr>
+          <a:xfrm flipH="1" flipV="1">
+            <a:off x="3198369" y="2025378"/>
+            <a:ext cx="1257453" cy="8121"/>
+          </a:xfrm>
+          <a:prstGeom prst="straightConnector1">
+            <a:avLst/>
+          </a:prstGeom>
+          <a:ln w="38100">
+            <a:solidFill>
+              <a:schemeClr val="tx1"/>
+            </a:solidFill>
+            <a:tailEnd type="none"/>
+          </a:ln>
+        </p:spPr>
+        <p:style>
+          <a:lnRef idx="1">
+            <a:schemeClr val="accent1"/>
+          </a:lnRef>
+          <a:fillRef idx="0">
+            <a:schemeClr val="accent1"/>
+          </a:fillRef>
+          <a:effectRef idx="0">
+            <a:schemeClr val="accent1"/>
+          </a:effectRef>
+          <a:fontRef idx="minor">
+            <a:schemeClr val="tx1"/>
+          </a:fontRef>
+        </p:style>
+      </p:cxnSp>
+      <p:cxnSp>
+        <p:nvCxnSpPr>
+          <p:cNvPr id="30" name="Straight Arrow Connector 29">
+            <a:extLst>
+              <a:ext uri="{FF2B5EF4-FFF2-40B4-BE49-F238E27FC236}">
+                <a16:creationId xmlns:a16="http://schemas.microsoft.com/office/drawing/2014/main" id="{44A6FC94-F558-B8D8-E2DA-084A5DAEF580}"/>
+              </a:ext>
+            </a:extLst>
+          </p:cNvPr>
+          <p:cNvCxnSpPr>
+            <a:cxnSpLocks/>
+            <a:stCxn id="17" idx="3"/>
+            <a:endCxn id="20" idx="2"/>
+          </p:cNvCxnSpPr>
+          <p:nvPr/>
+        </p:nvCxnSpPr>
+        <p:spPr>
+          <a:xfrm>
+            <a:off x="6244406" y="2033499"/>
+            <a:ext cx="2062037" cy="0"/>
+          </a:xfrm>
+          <a:prstGeom prst="straightConnector1">
+            <a:avLst/>
+          </a:prstGeom>
+          <a:ln w="38100">
+            <a:solidFill>
+              <a:schemeClr val="tx1"/>
+            </a:solidFill>
+            <a:tailEnd type="none"/>
+          </a:ln>
+        </p:spPr>
+        <p:style>
+          <a:lnRef idx="1">
+            <a:schemeClr val="accent1"/>
+          </a:lnRef>
+          <a:fillRef idx="0">
+            <a:schemeClr val="accent1"/>
+          </a:fillRef>
+          <a:effectRef idx="0">
+            <a:schemeClr val="accent1"/>
+          </a:effectRef>
+          <a:fontRef idx="minor">
+            <a:schemeClr val="tx1"/>
+          </a:fontRef>
+        </p:style>
+      </p:cxnSp>
+      <p:cxnSp>
+        <p:nvCxnSpPr>
+          <p:cNvPr id="33" name="Straight Arrow Connector 32">
+            <a:extLst>
+              <a:ext uri="{FF2B5EF4-FFF2-40B4-BE49-F238E27FC236}">
+                <a16:creationId xmlns:a16="http://schemas.microsoft.com/office/drawing/2014/main" id="{E6C7D15E-AD2A-4407-F2E6-1F56795AF746}"/>
+              </a:ext>
+            </a:extLst>
+          </p:cNvPr>
+          <p:cNvCxnSpPr>
+            <a:cxnSpLocks/>
+            <a:stCxn id="4" idx="3"/>
+            <a:endCxn id="12" idx="1"/>
+          </p:cNvCxnSpPr>
+          <p:nvPr/>
+        </p:nvCxnSpPr>
+        <p:spPr>
+          <a:xfrm flipV="1">
+            <a:off x="1697505" y="4634210"/>
+            <a:ext cx="852371" cy="1441"/>
+          </a:xfrm>
+          <a:prstGeom prst="straightConnector1">
+            <a:avLst/>
+          </a:prstGeom>
+          <a:ln w="38100">
+            <a:solidFill>
+              <a:schemeClr val="tx1"/>
+            </a:solidFill>
+            <a:tailEnd type="none"/>
+          </a:ln>
+        </p:spPr>
+        <p:style>
+          <a:lnRef idx="1">
+            <a:schemeClr val="accent1"/>
+          </a:lnRef>
+          <a:fillRef idx="0">
+            <a:schemeClr val="accent1"/>
+          </a:fillRef>
+          <a:effectRef idx="0">
+            <a:schemeClr val="accent1"/>
+          </a:effectRef>
+          <a:fontRef idx="minor">
+            <a:schemeClr val="tx1"/>
+          </a:fontRef>
+        </p:style>
+      </p:cxnSp>
+      <p:cxnSp>
+        <p:nvCxnSpPr>
+          <p:cNvPr id="37" name="Straight Arrow Connector 36">
+            <a:extLst>
+              <a:ext uri="{FF2B5EF4-FFF2-40B4-BE49-F238E27FC236}">
+                <a16:creationId xmlns:a16="http://schemas.microsoft.com/office/drawing/2014/main" id="{4A569952-6C25-0738-CF98-D888E8039C93}"/>
+              </a:ext>
+            </a:extLst>
+          </p:cNvPr>
+          <p:cNvCxnSpPr>
+            <a:cxnSpLocks/>
+            <a:stCxn id="12" idx="3"/>
+            <a:endCxn id="18" idx="1"/>
+          </p:cNvCxnSpPr>
+          <p:nvPr/>
+        </p:nvCxnSpPr>
+        <p:spPr>
+          <a:xfrm>
+            <a:off x="3198369" y="4634210"/>
+            <a:ext cx="1257453" cy="1"/>
+          </a:xfrm>
+          <a:prstGeom prst="straightConnector1">
+            <a:avLst/>
+          </a:prstGeom>
+          <a:ln w="38100">
+            <a:solidFill>
+              <a:schemeClr val="tx1"/>
+            </a:solidFill>
+            <a:tailEnd type="none"/>
+          </a:ln>
+        </p:spPr>
+        <p:style>
+          <a:lnRef idx="1">
+            <a:schemeClr val="accent1"/>
+          </a:lnRef>
+          <a:fillRef idx="0">
+            <a:schemeClr val="accent1"/>
+          </a:fillRef>
+          <a:effectRef idx="0">
+            <a:schemeClr val="accent1"/>
+          </a:effectRef>
+          <a:fontRef idx="minor">
+            <a:schemeClr val="tx1"/>
+          </a:fontRef>
+        </p:style>
+      </p:cxnSp>
+      <p:cxnSp>
+        <p:nvCxnSpPr>
+          <p:cNvPr id="38" name="Straight Arrow Connector 37">
+            <a:extLst>
+              <a:ext uri="{FF2B5EF4-FFF2-40B4-BE49-F238E27FC236}">
+                <a16:creationId xmlns:a16="http://schemas.microsoft.com/office/drawing/2014/main" id="{B2DCAA46-C522-F965-ED14-2D5A230E1D49}"/>
+              </a:ext>
+            </a:extLst>
+          </p:cNvPr>
+          <p:cNvCxnSpPr>
+            <a:cxnSpLocks/>
+            <a:stCxn id="21" idx="2"/>
+            <a:endCxn id="18" idx="3"/>
+          </p:cNvCxnSpPr>
+          <p:nvPr/>
+        </p:nvCxnSpPr>
+        <p:spPr>
+          <a:xfrm flipH="1">
+            <a:off x="6244407" y="4634210"/>
+            <a:ext cx="2062036" cy="1"/>
+          </a:xfrm>
+          <a:prstGeom prst="straightConnector1">
+            <a:avLst/>
+          </a:prstGeom>
+          <a:ln w="38100">
+            <a:solidFill>
+              <a:schemeClr val="tx1"/>
+            </a:solidFill>
+            <a:tailEnd type="none"/>
+          </a:ln>
+        </p:spPr>
+        <p:style>
+          <a:lnRef idx="1">
+            <a:schemeClr val="accent1"/>
+          </a:lnRef>
+          <a:fillRef idx="0">
+            <a:schemeClr val="accent1"/>
+          </a:fillRef>
+          <a:effectRef idx="0">
+            <a:schemeClr val="accent1"/>
+          </a:effectRef>
+          <a:fontRef idx="minor">
+            <a:schemeClr val="tx1"/>
+          </a:fontRef>
+        </p:style>
+      </p:cxnSp>
+      <p:sp>
+        <p:nvSpPr>
+          <p:cNvPr id="46" name="TextBox 45">
+            <a:extLst>
+              <a:ext uri="{FF2B5EF4-FFF2-40B4-BE49-F238E27FC236}">
+                <a16:creationId xmlns:a16="http://schemas.microsoft.com/office/drawing/2014/main" id="{25C4DC18-7D54-7DFB-656E-3627E0BA0AC4}"/>
+              </a:ext>
+            </a:extLst>
+          </p:cNvPr>
+          <p:cNvSpPr txBox="1"/>
+          <p:nvPr/>
+        </p:nvSpPr>
+        <p:spPr>
+          <a:xfrm>
+            <a:off x="511425" y="2350691"/>
+            <a:ext cx="1044125" cy="307777"/>
+          </a:xfrm>
+          <a:prstGeom prst="rect">
+            <a:avLst/>
+          </a:prstGeom>
+          <a:noFill/>
+        </p:spPr>
+        <p:txBody>
+          <a:bodyPr wrap="square" rtlCol="0">
+            <a:spAutoFit/>
+          </a:bodyPr>
+          <a:lstStyle/>
+          <a:p>
+            <a:pPr algn="ctr"/>
+            <a:r>
+              <a:rPr lang="en-US" sz="1400" dirty="0">
+                <a:latin typeface="Consolas" panose="020B0609020204030204" pitchFamily="49" charset="0"/>
+                <a:cs typeface="Consolas" panose="020B0609020204030204" pitchFamily="49" charset="0"/>
+              </a:rPr>
+              <a:t>User</a:t>
+            </a:r>
+          </a:p>
+        </p:txBody>
+      </p:sp>
+      <p:sp>
+        <p:nvSpPr>
+          <p:cNvPr id="47" name="TextBox 46">
+            <a:extLst>
+              <a:ext uri="{FF2B5EF4-FFF2-40B4-BE49-F238E27FC236}">
+                <a16:creationId xmlns:a16="http://schemas.microsoft.com/office/drawing/2014/main" id="{6ED6F146-2522-8A87-FB39-28BE37415C75}"/>
+              </a:ext>
+            </a:extLst>
+          </p:cNvPr>
+          <p:cNvSpPr txBox="1"/>
+          <p:nvPr/>
+        </p:nvSpPr>
+        <p:spPr>
+          <a:xfrm>
+            <a:off x="401898" y="4973132"/>
+            <a:ext cx="1263177" cy="307777"/>
+          </a:xfrm>
+          <a:prstGeom prst="rect">
+            <a:avLst/>
+          </a:prstGeom>
+          <a:noFill/>
+        </p:spPr>
+        <p:txBody>
+          <a:bodyPr wrap="square" rtlCol="0">
+            <a:spAutoFit/>
+          </a:bodyPr>
+          <a:lstStyle/>
+          <a:p>
+            <a:pPr algn="ctr"/>
+            <a:r>
+              <a:rPr lang="en-US" sz="1400" dirty="0">
+                <a:latin typeface="Consolas" panose="020B0609020204030204" pitchFamily="49" charset="0"/>
+                <a:cs typeface="Consolas" panose="020B0609020204030204" pitchFamily="49" charset="0"/>
+              </a:rPr>
+              <a:t>Data Admin</a:t>
+            </a:r>
+          </a:p>
+        </p:txBody>
+      </p:sp>
+      <p:cxnSp>
+        <p:nvCxnSpPr>
+          <p:cNvPr id="48" name="Straight Arrow Connector 47">
+            <a:extLst>
+              <a:ext uri="{FF2B5EF4-FFF2-40B4-BE49-F238E27FC236}">
+                <a16:creationId xmlns:a16="http://schemas.microsoft.com/office/drawing/2014/main" id="{E6339F16-EF2B-520A-F661-8A8BE510AD0E}"/>
+              </a:ext>
+            </a:extLst>
+          </p:cNvPr>
+          <p:cNvCxnSpPr>
+            <a:cxnSpLocks/>
+            <a:stCxn id="20" idx="3"/>
+            <a:endCxn id="21" idx="1"/>
+          </p:cNvCxnSpPr>
+          <p:nvPr/>
+        </p:nvCxnSpPr>
+        <p:spPr>
+          <a:xfrm>
+            <a:off x="9676630" y="2548599"/>
+            <a:ext cx="0" cy="1570511"/>
+          </a:xfrm>
+          <a:prstGeom prst="straightConnector1">
+            <a:avLst/>
+          </a:prstGeom>
+          <a:ln w="38100">
+            <a:solidFill>
+              <a:schemeClr val="tx1"/>
+            </a:solidFill>
+            <a:tailEnd type="none"/>
+          </a:ln>
+        </p:spPr>
+        <p:style>
+          <a:lnRef idx="1">
+            <a:schemeClr val="accent1"/>
+          </a:lnRef>
+          <a:fillRef idx="0">
+            <a:schemeClr val="accent1"/>
+          </a:fillRef>
+          <a:effectRef idx="0">
+            <a:schemeClr val="accent1"/>
+          </a:effectRef>
+          <a:fontRef idx="minor">
+            <a:schemeClr val="tx1"/>
+          </a:fontRef>
+        </p:style>
+      </p:cxnSp>
+      <p:sp>
+        <p:nvSpPr>
+          <p:cNvPr id="76" name="Down Arrow 75">
+            <a:extLst>
+              <a:ext uri="{FF2B5EF4-FFF2-40B4-BE49-F238E27FC236}">
+                <a16:creationId xmlns:a16="http://schemas.microsoft.com/office/drawing/2014/main" id="{F169718F-0076-5438-148C-B5F89C9E5B64}"/>
+              </a:ext>
+            </a:extLst>
+          </p:cNvPr>
+          <p:cNvSpPr/>
+          <p:nvPr/>
+        </p:nvSpPr>
+        <p:spPr>
+          <a:xfrm flipV="1">
+            <a:off x="9376914" y="2548600"/>
+            <a:ext cx="595222" cy="1570510"/>
+          </a:xfrm>
+          <a:prstGeom prst="downArrow">
+            <a:avLst/>
+          </a:prstGeom>
+          <a:solidFill>
+            <a:srgbClr val="00B050"/>
+          </a:solidFill>
+          <a:ln>
+            <a:solidFill>
+              <a:schemeClr val="tx1"/>
+            </a:solidFill>
+          </a:ln>
+        </p:spPr>
+        <p:style>
+          <a:lnRef idx="2">
+            <a:schemeClr val="accent1">
+              <a:shade val="15000"/>
+            </a:schemeClr>
+          </a:lnRef>
+          <a:fillRef idx="1">
+            <a:schemeClr val="accent1"/>
+          </a:fillRef>
+          <a:effectRef idx="0">
+            <a:schemeClr val="accent1"/>
+          </a:effectRef>
+          <a:fontRef idx="minor">
+            <a:schemeClr val="lt1"/>
+          </a:fontRef>
+        </p:style>
+        <p:txBody>
+          <a:bodyPr rtlCol="0" anchor="ctr"/>
+          <a:lstStyle/>
+          <a:p>
+            <a:pPr algn="ctr"/>
+            <a:endParaRPr lang="en-US"/>
+          </a:p>
+        </p:txBody>
+      </p:sp>
+      <p:sp>
+        <p:nvSpPr>
+          <p:cNvPr id="80" name="Rounded Rectangle 79">
+            <a:extLst>
+              <a:ext uri="{FF2B5EF4-FFF2-40B4-BE49-F238E27FC236}">
+                <a16:creationId xmlns:a16="http://schemas.microsoft.com/office/drawing/2014/main" id="{58DBFD81-0B91-3EBB-BBBA-0F6CC8FDF1F9}"/>
+              </a:ext>
+            </a:extLst>
+          </p:cNvPr>
+          <p:cNvSpPr/>
+          <p:nvPr/>
+        </p:nvSpPr>
+        <p:spPr>
+          <a:xfrm>
+            <a:off x="401898" y="4119111"/>
+            <a:ext cx="1263177" cy="1249150"/>
+          </a:xfrm>
+          <a:prstGeom prst="roundRect">
+            <a:avLst/>
+          </a:prstGeom>
+          <a:noFill/>
+          <a:ln w="76200">
+            <a:solidFill>
+              <a:srgbClr val="C00000"/>
+            </a:solidFill>
+          </a:ln>
+        </p:spPr>
+        <p:style>
+          <a:lnRef idx="2">
+            <a:schemeClr val="accent1">
+              <a:shade val="15000"/>
+            </a:schemeClr>
+          </a:lnRef>
+          <a:fillRef idx="1">
+            <a:schemeClr val="accent1"/>
+          </a:fillRef>
+          <a:effectRef idx="0">
+            <a:schemeClr val="accent1"/>
+          </a:effectRef>
+          <a:fontRef idx="minor">
+            <a:schemeClr val="lt1"/>
+          </a:fontRef>
+        </p:style>
+        <p:txBody>
+          <a:bodyPr rtlCol="0" anchor="ctr"/>
+          <a:lstStyle/>
+          <a:p>
+            <a:pPr algn="ctr"/>
+            <a:endParaRPr lang="en-US"/>
+          </a:p>
+        </p:txBody>
+      </p:sp>
+      <p:sp>
+        <p:nvSpPr>
+          <p:cNvPr id="81" name="Rounded Rectangle 80">
+            <a:extLst>
+              <a:ext uri="{FF2B5EF4-FFF2-40B4-BE49-F238E27FC236}">
+                <a16:creationId xmlns:a16="http://schemas.microsoft.com/office/drawing/2014/main" id="{28A38DFE-656D-F93D-BB55-B7BD010CF261}"/>
+              </a:ext>
+            </a:extLst>
+          </p:cNvPr>
+          <p:cNvSpPr/>
+          <p:nvPr/>
+        </p:nvSpPr>
+        <p:spPr>
+          <a:xfrm>
+            <a:off x="396066" y="1473932"/>
+            <a:ext cx="1263177" cy="1249150"/>
+          </a:xfrm>
+          <a:prstGeom prst="roundRect">
+            <a:avLst/>
+          </a:prstGeom>
+          <a:noFill/>
+          <a:ln w="76200">
+            <a:solidFill>
+              <a:srgbClr val="00B050"/>
+            </a:solidFill>
+          </a:ln>
+        </p:spPr>
+        <p:style>
+          <a:lnRef idx="2">
+            <a:schemeClr val="accent1">
+              <a:shade val="15000"/>
+            </a:schemeClr>
+          </a:lnRef>
+          <a:fillRef idx="1">
+            <a:schemeClr val="accent1"/>
+          </a:fillRef>
+          <a:effectRef idx="0">
+            <a:schemeClr val="accent1"/>
+          </a:effectRef>
+          <a:fontRef idx="minor">
+            <a:schemeClr val="lt1"/>
+          </a:fontRef>
+        </p:style>
+        <p:txBody>
+          <a:bodyPr rtlCol="0" anchor="ctr"/>
+          <a:lstStyle/>
+          <a:p>
+            <a:pPr algn="ctr"/>
+            <a:endParaRPr lang="en-US"/>
+          </a:p>
+        </p:txBody>
+      </p:sp>
+      <p:sp>
+        <p:nvSpPr>
+          <p:cNvPr id="82" name="TextBox 81">
+            <a:extLst>
+              <a:ext uri="{FF2B5EF4-FFF2-40B4-BE49-F238E27FC236}">
+                <a16:creationId xmlns:a16="http://schemas.microsoft.com/office/drawing/2014/main" id="{8A5FADAE-97A3-3DD7-87E9-5C1FE192726C}"/>
+              </a:ext>
+            </a:extLst>
+          </p:cNvPr>
+          <p:cNvSpPr txBox="1"/>
+          <p:nvPr/>
+        </p:nvSpPr>
+        <p:spPr>
+          <a:xfrm>
+            <a:off x="9898230" y="3072244"/>
+            <a:ext cx="1978568" cy="523220"/>
+          </a:xfrm>
+          <a:prstGeom prst="rect">
+            <a:avLst/>
+          </a:prstGeom>
+          <a:solidFill>
+            <a:schemeClr val="accent6">
+              <a:lumMod val="20000"/>
+              <a:lumOff val="80000"/>
+            </a:schemeClr>
+          </a:solidFill>
+          <a:ln w="38100">
+            <a:solidFill>
+              <a:srgbClr val="00B050"/>
+            </a:solidFill>
+          </a:ln>
+        </p:spPr>
+        <p:txBody>
+          <a:bodyPr wrap="square" rtlCol="0">
+            <a:spAutoFit/>
+          </a:bodyPr>
+          <a:lstStyle/>
+          <a:p>
+            <a:pPr algn="ctr"/>
+            <a:r>
+              <a:rPr lang="en-US" sz="1400" dirty="0">
+                <a:latin typeface="Consolas" panose="020B0609020204030204" pitchFamily="49" charset="0"/>
+                <a:cs typeface="Consolas" panose="020B0609020204030204" pitchFamily="49" charset="0"/>
+              </a:rPr>
+              <a:t>2. User moves data from staging area</a:t>
+            </a:r>
+          </a:p>
+        </p:txBody>
+      </p:sp>
+      <p:sp>
+        <p:nvSpPr>
+          <p:cNvPr id="83" name="TextBox 82">
+            <a:extLst>
+              <a:ext uri="{FF2B5EF4-FFF2-40B4-BE49-F238E27FC236}">
+                <a16:creationId xmlns:a16="http://schemas.microsoft.com/office/drawing/2014/main" id="{58EA8CE4-1CC5-CB70-4E32-F508D37E9025}"/>
+              </a:ext>
+            </a:extLst>
+          </p:cNvPr>
+          <p:cNvSpPr txBox="1"/>
+          <p:nvPr/>
+        </p:nvSpPr>
+        <p:spPr>
+          <a:xfrm>
+            <a:off x="4050740" y="5261884"/>
+            <a:ext cx="2600226" cy="523220"/>
+          </a:xfrm>
+          <a:prstGeom prst="rect">
+            <a:avLst/>
+          </a:prstGeom>
+          <a:solidFill>
+            <a:srgbClr val="FFAEB2"/>
+          </a:solidFill>
+          <a:ln w="38100">
+            <a:solidFill>
+              <a:srgbClr val="C00000"/>
+            </a:solidFill>
+          </a:ln>
+        </p:spPr>
+        <p:txBody>
+          <a:bodyPr wrap="square" rtlCol="0">
+            <a:spAutoFit/>
+          </a:bodyPr>
+          <a:lstStyle/>
+          <a:p>
+            <a:pPr algn="ctr"/>
+            <a:r>
+              <a:rPr lang="en-US" sz="1400" dirty="0">
+                <a:latin typeface="Consolas" panose="020B0609020204030204" pitchFamily="49" charset="0"/>
+                <a:cs typeface="Consolas" panose="020B0609020204030204" pitchFamily="49" charset="0"/>
+              </a:rPr>
+              <a:t>2. Data Admin moves data to staging area on RR</a:t>
+            </a:r>
+          </a:p>
+        </p:txBody>
+      </p:sp>
+      <p:sp>
+        <p:nvSpPr>
+          <p:cNvPr id="85" name="Down Arrow 84">
+            <a:extLst>
+              <a:ext uri="{FF2B5EF4-FFF2-40B4-BE49-F238E27FC236}">
+                <a16:creationId xmlns:a16="http://schemas.microsoft.com/office/drawing/2014/main" id="{1D9E8983-6CB5-1B49-A56D-DD66490E24BF}"/>
+              </a:ext>
+            </a:extLst>
+          </p:cNvPr>
+          <p:cNvSpPr/>
+          <p:nvPr/>
+        </p:nvSpPr>
+        <p:spPr>
+          <a:xfrm rot="5400000" flipV="1">
+            <a:off x="4685233" y="1309034"/>
+            <a:ext cx="595222" cy="6647202"/>
+          </a:xfrm>
+          <a:prstGeom prst="downArrow">
+            <a:avLst/>
+          </a:prstGeom>
+          <a:solidFill>
+            <a:srgbClr val="C00000"/>
+          </a:solidFill>
+          <a:ln>
+            <a:solidFill>
+              <a:schemeClr val="tx1"/>
+            </a:solidFill>
+          </a:ln>
+        </p:spPr>
+        <p:style>
+          <a:lnRef idx="2">
+            <a:schemeClr val="accent1">
+              <a:shade val="15000"/>
+            </a:schemeClr>
+          </a:lnRef>
+          <a:fillRef idx="1">
+            <a:schemeClr val="accent1"/>
+          </a:fillRef>
+          <a:effectRef idx="0">
+            <a:schemeClr val="accent1"/>
+          </a:effectRef>
+          <a:fontRef idx="minor">
+            <a:schemeClr val="lt1"/>
+          </a:fontRef>
+        </p:style>
+        <p:txBody>
+          <a:bodyPr rtlCol="0" anchor="ctr"/>
+          <a:lstStyle/>
+          <a:p>
+            <a:pPr algn="ctr"/>
+            <a:endParaRPr lang="en-US"/>
+          </a:p>
+        </p:txBody>
+      </p:sp>
+      <p:pic>
+        <p:nvPicPr>
+          <p:cNvPr id="12" name="Picture 11">
+            <a:extLst>
+              <a:ext uri="{FF2B5EF4-FFF2-40B4-BE49-F238E27FC236}">
+                <a16:creationId xmlns:a16="http://schemas.microsoft.com/office/drawing/2014/main" id="{05005AF9-482D-083E-E01E-D329AED43BD8}"/>
+              </a:ext>
+            </a:extLst>
+          </p:cNvPr>
+          <p:cNvPicPr>
+            <a:picLocks noChangeAspect="1"/>
+          </p:cNvPicPr>
+          <p:nvPr/>
+        </p:nvPicPr>
+        <p:blipFill>
+          <a:blip r:embed="rId3"/>
+          <a:stretch>
+            <a:fillRect/>
+          </a:stretch>
+        </p:blipFill>
+        <p:spPr>
+          <a:xfrm>
+            <a:off x="2549876" y="4308897"/>
+            <a:ext cx="648493" cy="650626"/>
+          </a:xfrm>
+          <a:prstGeom prst="rect">
+            <a:avLst/>
+          </a:prstGeom>
+        </p:spPr>
+      </p:pic>
+      <p:sp>
+        <p:nvSpPr>
+          <p:cNvPr id="86" name="Title 1">
+            <a:extLst>
+              <a:ext uri="{FF2B5EF4-FFF2-40B4-BE49-F238E27FC236}">
+                <a16:creationId xmlns:a16="http://schemas.microsoft.com/office/drawing/2014/main" id="{5A1C5A38-1026-7CD2-12B8-5DC95A3513DB}"/>
+              </a:ext>
+            </a:extLst>
+          </p:cNvPr>
+          <p:cNvSpPr>
+            <a:spLocks noGrp="1"/>
+          </p:cNvSpPr>
+          <p:nvPr>
+            <p:ph type="title"/>
+          </p:nvPr>
+        </p:nvSpPr>
+        <p:spPr>
+          <a:xfrm>
+            <a:off x="371914" y="372703"/>
+            <a:ext cx="10515600" cy="947788"/>
+          </a:xfrm>
+        </p:spPr>
+        <p:txBody>
+          <a:bodyPr/>
+          <a:lstStyle/>
+          <a:p>
+            <a:r>
+              <a:rPr lang="en-US" dirty="0"/>
+              <a:t>Inbound Transfer Workflow</a:t>
+            </a:r>
+          </a:p>
+        </p:txBody>
+      </p:sp>
+      <p:sp>
+        <p:nvSpPr>
+          <p:cNvPr id="18" name="Rounded Rectangle 17">
+            <a:extLst>
+              <a:ext uri="{FF2B5EF4-FFF2-40B4-BE49-F238E27FC236}">
+                <a16:creationId xmlns:a16="http://schemas.microsoft.com/office/drawing/2014/main" id="{295A25C2-26D9-1FF6-8346-E42684C1276B}"/>
+              </a:ext>
+            </a:extLst>
+          </p:cNvPr>
+          <p:cNvSpPr/>
+          <p:nvPr/>
+        </p:nvSpPr>
+        <p:spPr>
+          <a:xfrm>
+            <a:off x="4455822" y="4308897"/>
+            <a:ext cx="1788585" cy="650627"/>
+          </a:xfrm>
+          <a:prstGeom prst="roundRect">
+            <a:avLst/>
+          </a:prstGeom>
+          <a:solidFill>
+            <a:schemeClr val="accent5">
+              <a:lumMod val="60000"/>
+              <a:lumOff val="40000"/>
+            </a:schemeClr>
+          </a:solidFill>
+          <a:ln w="38100">
+            <a:solidFill>
+              <a:schemeClr val="accent5">
+                <a:lumMod val="50000"/>
+              </a:schemeClr>
+            </a:solidFill>
+          </a:ln>
+        </p:spPr>
+        <p:style>
+          <a:lnRef idx="2">
+            <a:schemeClr val="accent1">
+              <a:shade val="50000"/>
+            </a:schemeClr>
+          </a:lnRef>
+          <a:fillRef idx="1">
+            <a:schemeClr val="accent1"/>
+          </a:fillRef>
+          <a:effectRef idx="0">
+            <a:schemeClr val="accent1"/>
+          </a:effectRef>
+          <a:fontRef idx="minor">
+            <a:schemeClr val="lt1"/>
+          </a:fontRef>
+        </p:style>
+        <p:txBody>
+          <a:bodyPr rtlCol="0" anchor="ctr"/>
+          <a:lstStyle/>
+          <a:p>
+            <a:pPr algn="ctr"/>
+            <a:r>
+              <a:rPr lang="en-US" sz="1100" dirty="0">
+                <a:solidFill>
+                  <a:schemeClr val="tx1"/>
+                </a:solidFill>
+              </a:rPr>
+              <a:t>rr-datamgr01.hpc.psu.edu</a:t>
+            </a:r>
+          </a:p>
+        </p:txBody>
+      </p:sp>
+    </p:spTree>
+    <p:extLst>
+      <p:ext uri="{BB962C8B-B14F-4D97-AF65-F5344CB8AC3E}">
+        <p14:creationId xmlns:p14="http://schemas.microsoft.com/office/powerpoint/2010/main" val="3400239647"/>
       </p:ext>
     </p:extLst>
   </p:cSld>
@@ -7000,6 +11276,53 @@
 </file>
 
 <file path=customXml/item1.xml><?xml version="1.0" encoding="utf-8"?>
+<p:properties xmlns:p="http://schemas.microsoft.com/office/2006/metadata/properties" xmlns:xsi="http://www.w3.org/2001/XMLSchema-instance" xmlns:pc="http://schemas.microsoft.com/office/infopath/2007/PartnerControls">
+  <documentManagement>
+    <SharedWithUsers xmlns="4b28dc4c-da69-43c9-a1ff-3a3813db799e">
+      <UserInfo>
+        <DisplayName>Futrick, Jordan Q</DisplayName>
+        <AccountId>31</AccountId>
+        <AccountType/>
+      </UserInfo>
+      <UserInfo>
+        <DisplayName>Brown, Carrie</DisplayName>
+        <AccountId>84</AccountId>
+        <AccountType/>
+      </UserInfo>
+      <UserInfo>
+        <DisplayName>Leydig, Derek Martin</DisplayName>
+        <AccountId>38</AccountId>
+        <AccountType/>
+      </UserInfo>
+      <UserInfo>
+        <DisplayName>Jackson, Liam</DisplayName>
+        <AccountId>32</AccountId>
+        <AccountType/>
+      </UserInfo>
+      <UserInfo>
+        <DisplayName>Hey, Wolf</DisplayName>
+        <AccountId>182</AccountId>
+        <AccountType/>
+      </UserInfo>
+    </SharedWithUsers>
+    <TaxCatchAll xmlns="4b28dc4c-da69-43c9-a1ff-3a3813db799e" xsi:nil="true"/>
+    <lcf76f155ced4ddcb4097134ff3c332f xmlns="23ad9178-ade2-434f-a880-cfaf139256ed">
+      <Terms xmlns="http://schemas.microsoft.com/office/infopath/2007/PartnerControls"/>
+    </lcf76f155ced4ddcb4097134ff3c332f>
+  </documentManagement>
+</p:properties>
+</file>
+
+<file path=customXml/item2.xml><?xml version="1.0" encoding="utf-8"?>
+<?mso-contentType ?>
+<FormTemplates xmlns="http://schemas.microsoft.com/sharepoint/v3/contenttype/forms">
+  <Display>DocumentLibraryForm</Display>
+  <Edit>DocumentLibraryForm</Edit>
+  <New>DocumentLibraryForm</New>
+</FormTemplates>
+</file>
+
+<file path=customXml/item3.xml><?xml version="1.0" encoding="utf-8"?>
 <ct:contentTypeSchema xmlns:ct="http://schemas.microsoft.com/office/2006/metadata/contentType" xmlns:ma="http://schemas.microsoft.com/office/2006/metadata/properties/metaAttributes" ct:_="" ma:_="" ma:contentTypeName="Document" ma:contentTypeID="0x010100E843CC197C4EA6429DB8706FA366B0A9" ma:contentTypeVersion="16" ma:contentTypeDescription="Create a new document." ma:contentTypeScope="" ma:versionID="b4700a85abd1a74edb701ca6d3afdd96">
   <xsd:schema xmlns:xsd="http://www.w3.org/2001/XMLSchema" xmlns:xs="http://www.w3.org/2001/XMLSchema" xmlns:p="http://schemas.microsoft.com/office/2006/metadata/properties" xmlns:ns2="4b28dc4c-da69-43c9-a1ff-3a3813db799e" xmlns:ns3="23ad9178-ade2-434f-a880-cfaf139256ed" targetNamespace="http://schemas.microsoft.com/office/2006/metadata/properties" ma:root="true" ma:fieldsID="19eeb97119fa32ac520f06cf83d0de92" ns2:_="" ns3:_="">
     <xsd:import namespace="4b28dc4c-da69-43c9-a1ff-3a3813db799e"/>
@@ -7242,54 +11565,34 @@
 </ct:contentTypeSchema>
 </file>
 
-<file path=customXml/item2.xml><?xml version="1.0" encoding="utf-8"?>
-<?mso-contentType ?>
-<FormTemplates xmlns="http://schemas.microsoft.com/sharepoint/v3/contenttype/forms">
-  <Display>DocumentLibraryForm</Display>
-  <Edit>DocumentLibraryForm</Edit>
-  <New>DocumentLibraryForm</New>
-</FormTemplates>
+<file path=customXml/itemProps1.xml><?xml version="1.0" encoding="utf-8"?>
+<ds:datastoreItem xmlns:ds="http://schemas.openxmlformats.org/officeDocument/2006/customXml" ds:itemID="{AED196B3-28D2-4CE6-8BC6-FF9B8270B13E}">
+  <ds:schemaRefs>
+    <ds:schemaRef ds:uri="http://purl.org/dc/elements/1.1/"/>
+    <ds:schemaRef ds:uri="http://schemas.microsoft.com/office/2006/documentManagement/types"/>
+    <ds:schemaRef ds:uri="http://purl.org/dc/dcmitype/"/>
+    <ds:schemaRef ds:uri="8529ed79-734a-4657-bc3e-ffe023011016"/>
+    <ds:schemaRef ds:uri="http://purl.org/dc/terms/"/>
+    <ds:schemaRef ds:uri="http://schemas.microsoft.com/office/2006/metadata/properties"/>
+    <ds:schemaRef ds:uri="http://schemas.microsoft.com/office/infopath/2007/PartnerControls"/>
+    <ds:schemaRef ds:uri="http://schemas.openxmlformats.org/package/2006/metadata/core-properties"/>
+    <ds:schemaRef ds:uri="6673a5f0-d796-48d1-aef2-edb5346d3c37"/>
+    <ds:schemaRef ds:uri="http://www.w3.org/XML/1998/namespace"/>
+    <ds:schemaRef ds:uri="4b28dc4c-da69-43c9-a1ff-3a3813db799e"/>
+    <ds:schemaRef ds:uri="23ad9178-ade2-434f-a880-cfaf139256ed"/>
+  </ds:schemaRefs>
+</ds:datastoreItem>
 </file>
 
-<file path=customXml/item3.xml><?xml version="1.0" encoding="utf-8"?>
-<p:properties xmlns:p="http://schemas.microsoft.com/office/2006/metadata/properties" xmlns:xsi="http://www.w3.org/2001/XMLSchema-instance" xmlns:pc="http://schemas.microsoft.com/office/infopath/2007/PartnerControls">
-  <documentManagement>
-    <SharedWithUsers xmlns="4b28dc4c-da69-43c9-a1ff-3a3813db799e">
-      <UserInfo>
-        <DisplayName>Futrick, Jordan Q</DisplayName>
-        <AccountId>31</AccountId>
-        <AccountType/>
-      </UserInfo>
-      <UserInfo>
-        <DisplayName>Brown, Carrie</DisplayName>
-        <AccountId>84</AccountId>
-        <AccountType/>
-      </UserInfo>
-      <UserInfo>
-        <DisplayName>Leydig, Derek Martin</DisplayName>
-        <AccountId>38</AccountId>
-        <AccountType/>
-      </UserInfo>
-      <UserInfo>
-        <DisplayName>Jackson, Liam</DisplayName>
-        <AccountId>32</AccountId>
-        <AccountType/>
-      </UserInfo>
-      <UserInfo>
-        <DisplayName>Hey, Wolf</DisplayName>
-        <AccountId>182</AccountId>
-        <AccountType/>
-      </UserInfo>
-    </SharedWithUsers>
-    <TaxCatchAll xmlns="4b28dc4c-da69-43c9-a1ff-3a3813db799e" xsi:nil="true"/>
-    <lcf76f155ced4ddcb4097134ff3c332f xmlns="23ad9178-ade2-434f-a880-cfaf139256ed">
-      <Terms xmlns="http://schemas.microsoft.com/office/infopath/2007/PartnerControls"/>
-    </lcf76f155ced4ddcb4097134ff3c332f>
-  </documentManagement>
-</p:properties>
+<file path=customXml/itemProps2.xml><?xml version="1.0" encoding="utf-8"?>
+<ds:datastoreItem xmlns:ds="http://schemas.openxmlformats.org/officeDocument/2006/customXml" ds:itemID="{74FE70FB-0FCE-428C-BA58-AD39043535D1}">
+  <ds:schemaRefs>
+    <ds:schemaRef ds:uri="http://schemas.microsoft.com/sharepoint/v3/contenttype/forms"/>
+  </ds:schemaRefs>
+</ds:datastoreItem>
 </file>
 
-<file path=customXml/itemProps1.xml><?xml version="1.0" encoding="utf-8"?>
+<file path=customXml/itemProps3.xml><?xml version="1.0" encoding="utf-8"?>
 <ds:datastoreItem xmlns:ds="http://schemas.openxmlformats.org/officeDocument/2006/customXml" ds:itemID="{8DC5FBCA-8CEE-41E9-8E12-E7355B00A1CC}">
   <ds:schemaRefs>
     <ds:schemaRef ds:uri="http://schemas.microsoft.com/office/2006/metadata/contentType"/>
@@ -7308,33 +11611,6 @@
 </ds:datastoreItem>
 </file>
 
-<file path=customXml/itemProps2.xml><?xml version="1.0" encoding="utf-8"?>
-<ds:datastoreItem xmlns:ds="http://schemas.openxmlformats.org/officeDocument/2006/customXml" ds:itemID="{74FE70FB-0FCE-428C-BA58-AD39043535D1}">
-  <ds:schemaRefs>
-    <ds:schemaRef ds:uri="http://schemas.microsoft.com/sharepoint/v3/contenttype/forms"/>
-  </ds:schemaRefs>
-</ds:datastoreItem>
-</file>
-
-<file path=customXml/itemProps3.xml><?xml version="1.0" encoding="utf-8"?>
-<ds:datastoreItem xmlns:ds="http://schemas.openxmlformats.org/officeDocument/2006/customXml" ds:itemID="{AED196B3-28D2-4CE6-8BC6-FF9B8270B13E}">
-  <ds:schemaRefs>
-    <ds:schemaRef ds:uri="http://purl.org/dc/elements/1.1/"/>
-    <ds:schemaRef ds:uri="http://schemas.microsoft.com/office/2006/documentManagement/types"/>
-    <ds:schemaRef ds:uri="http://purl.org/dc/dcmitype/"/>
-    <ds:schemaRef ds:uri="8529ed79-734a-4657-bc3e-ffe023011016"/>
-    <ds:schemaRef ds:uri="http://purl.org/dc/terms/"/>
-    <ds:schemaRef ds:uri="http://schemas.microsoft.com/office/2006/metadata/properties"/>
-    <ds:schemaRef ds:uri="http://schemas.microsoft.com/office/infopath/2007/PartnerControls"/>
-    <ds:schemaRef ds:uri="http://schemas.openxmlformats.org/package/2006/metadata/core-properties"/>
-    <ds:schemaRef ds:uri="6673a5f0-d796-48d1-aef2-edb5346d3c37"/>
-    <ds:schemaRef ds:uri="http://www.w3.org/XML/1998/namespace"/>
-    <ds:schemaRef ds:uri="4b28dc4c-da69-43c9-a1ff-3a3813db799e"/>
-    <ds:schemaRef ds:uri="23ad9178-ade2-434f-a880-cfaf139256ed"/>
-  </ds:schemaRefs>
-</ds:datastoreItem>
-</file>
-
 <file path=docMetadata/LabelInfo.xml><?xml version="1.0" encoding="utf-8"?>
 <clbl:labelList xmlns:clbl="http://schemas.microsoft.com/office/2020/mipLabelMetadata">
   <clbl:label id="{7cf48d45-3ddb-4389-a9c1-c115526eb52e}" enabled="0" method="" siteId="{7cf48d45-3ddb-4389-a9c1-c115526eb52e}" removed="1"/>

</xml_diff>

<commit_message>
Update RR Data Manager address
</commit_message>
<xml_diff>
--- a/docs/img/icds_docs_images.pptx
+++ b/docs/img/icds_docs_images.pptx
@@ -208,7 +208,7 @@
           <a:p>
             <a:fld id="{8F25345D-83D0-4643-B4BC-44C238B5A8CF}" type="datetimeFigureOut">
               <a:rPr lang="en-US" smtClean="0"/>
-              <a:t>10/9/24</a:t>
+              <a:t>1/14/2025</a:t>
             </a:fld>
             <a:endParaRPr lang="en-US"/>
           </a:p>
@@ -790,7 +790,7 @@
           <a:p>
             <a:fld id="{06F6D09A-9F42-C649-A6EB-DC34432B03F0}" type="datetimeFigureOut">
               <a:rPr lang="en-US" smtClean="0"/>
-              <a:t>10/9/24</a:t>
+              <a:t>1/14/2025</a:t>
             </a:fld>
             <a:endParaRPr lang="en-US"/>
           </a:p>
@@ -988,7 +988,7 @@
           <a:p>
             <a:fld id="{06F6D09A-9F42-C649-A6EB-DC34432B03F0}" type="datetimeFigureOut">
               <a:rPr lang="en-US" smtClean="0"/>
-              <a:t>10/9/24</a:t>
+              <a:t>1/14/2025</a:t>
             </a:fld>
             <a:endParaRPr lang="en-US"/>
           </a:p>
@@ -1196,7 +1196,7 @@
           <a:p>
             <a:fld id="{06F6D09A-9F42-C649-A6EB-DC34432B03F0}" type="datetimeFigureOut">
               <a:rPr lang="en-US" smtClean="0"/>
-              <a:t>10/9/24</a:t>
+              <a:t>1/14/2025</a:t>
             </a:fld>
             <a:endParaRPr lang="en-US"/>
           </a:p>
@@ -1394,7 +1394,7 @@
           <a:p>
             <a:fld id="{06F6D09A-9F42-C649-A6EB-DC34432B03F0}" type="datetimeFigureOut">
               <a:rPr lang="en-US" smtClean="0"/>
-              <a:t>10/9/24</a:t>
+              <a:t>1/14/2025</a:t>
             </a:fld>
             <a:endParaRPr lang="en-US"/>
           </a:p>
@@ -1669,7 +1669,7 @@
           <a:p>
             <a:fld id="{06F6D09A-9F42-C649-A6EB-DC34432B03F0}" type="datetimeFigureOut">
               <a:rPr lang="en-US" smtClean="0"/>
-              <a:t>10/9/24</a:t>
+              <a:t>1/14/2025</a:t>
             </a:fld>
             <a:endParaRPr lang="en-US"/>
           </a:p>
@@ -1934,7 +1934,7 @@
           <a:p>
             <a:fld id="{06F6D09A-9F42-C649-A6EB-DC34432B03F0}" type="datetimeFigureOut">
               <a:rPr lang="en-US" smtClean="0"/>
-              <a:t>10/9/24</a:t>
+              <a:t>1/14/2025</a:t>
             </a:fld>
             <a:endParaRPr lang="en-US"/>
           </a:p>
@@ -2346,7 +2346,7 @@
           <a:p>
             <a:fld id="{06F6D09A-9F42-C649-A6EB-DC34432B03F0}" type="datetimeFigureOut">
               <a:rPr lang="en-US" smtClean="0"/>
-              <a:t>10/9/24</a:t>
+              <a:t>1/14/2025</a:t>
             </a:fld>
             <a:endParaRPr lang="en-US"/>
           </a:p>
@@ -2487,7 +2487,7 @@
           <a:p>
             <a:fld id="{06F6D09A-9F42-C649-A6EB-DC34432B03F0}" type="datetimeFigureOut">
               <a:rPr lang="en-US" smtClean="0"/>
-              <a:t>10/9/24</a:t>
+              <a:t>1/14/2025</a:t>
             </a:fld>
             <a:endParaRPr lang="en-US"/>
           </a:p>
@@ -2600,7 +2600,7 @@
           <a:p>
             <a:fld id="{06F6D09A-9F42-C649-A6EB-DC34432B03F0}" type="datetimeFigureOut">
               <a:rPr lang="en-US" smtClean="0"/>
-              <a:t>10/9/24</a:t>
+              <a:t>1/14/2025</a:t>
             </a:fld>
             <a:endParaRPr lang="en-US"/>
           </a:p>
@@ -2911,7 +2911,7 @@
           <a:p>
             <a:fld id="{06F6D09A-9F42-C649-A6EB-DC34432B03F0}" type="datetimeFigureOut">
               <a:rPr lang="en-US" smtClean="0"/>
-              <a:t>10/9/24</a:t>
+              <a:t>1/14/2025</a:t>
             </a:fld>
             <a:endParaRPr lang="en-US"/>
           </a:p>
@@ -3203,7 +3203,7 @@
           <a:p>
             <a:fld id="{06F6D09A-9F42-C649-A6EB-DC34432B03F0}" type="datetimeFigureOut">
               <a:rPr lang="en-US" smtClean="0"/>
-              <a:t>10/9/24</a:t>
+              <a:t>1/14/2025</a:t>
             </a:fld>
             <a:endParaRPr lang="en-US"/>
           </a:p>
@@ -3444,7 +3444,7 @@
           <a:p>
             <a:fld id="{06F6D09A-9F42-C649-A6EB-DC34432B03F0}" type="datetimeFigureOut">
               <a:rPr lang="en-US" smtClean="0"/>
-              <a:t>10/9/24</a:t>
+              <a:t>1/14/2025</a:t>
             </a:fld>
             <a:endParaRPr lang="en-US"/>
           </a:p>
@@ -9267,7 +9267,7 @@
                   <a:schemeClr val="tx1"/>
                 </a:solidFill>
               </a:rPr>
-              <a:t>rr-datamgr01.hpc.psu.edu</a:t>
+              <a:t>rr-datamgr.rr.hpc.psu.edu</a:t>
             </a:r>
           </a:p>
         </p:txBody>
@@ -10667,7 +10667,7 @@
                   <a:schemeClr val="tx1"/>
                 </a:solidFill>
               </a:rPr>
-              <a:t>rr-datamgr01.hpc.psu.edu</a:t>
+              <a:t>rr-datamgr.rr.hpc.psu.edu</a:t>
             </a:r>
           </a:p>
         </p:txBody>
@@ -11276,53 +11276,6 @@
 </file>
 
 <file path=customXml/item1.xml><?xml version="1.0" encoding="utf-8"?>
-<p:properties xmlns:p="http://schemas.microsoft.com/office/2006/metadata/properties" xmlns:xsi="http://www.w3.org/2001/XMLSchema-instance" xmlns:pc="http://schemas.microsoft.com/office/infopath/2007/PartnerControls">
-  <documentManagement>
-    <SharedWithUsers xmlns="4b28dc4c-da69-43c9-a1ff-3a3813db799e">
-      <UserInfo>
-        <DisplayName>Futrick, Jordan Q</DisplayName>
-        <AccountId>31</AccountId>
-        <AccountType/>
-      </UserInfo>
-      <UserInfo>
-        <DisplayName>Brown, Carrie</DisplayName>
-        <AccountId>84</AccountId>
-        <AccountType/>
-      </UserInfo>
-      <UserInfo>
-        <DisplayName>Leydig, Derek Martin</DisplayName>
-        <AccountId>38</AccountId>
-        <AccountType/>
-      </UserInfo>
-      <UserInfo>
-        <DisplayName>Jackson, Liam</DisplayName>
-        <AccountId>32</AccountId>
-        <AccountType/>
-      </UserInfo>
-      <UserInfo>
-        <DisplayName>Hey, Wolf</DisplayName>
-        <AccountId>182</AccountId>
-        <AccountType/>
-      </UserInfo>
-    </SharedWithUsers>
-    <TaxCatchAll xmlns="4b28dc4c-da69-43c9-a1ff-3a3813db799e" xsi:nil="true"/>
-    <lcf76f155ced4ddcb4097134ff3c332f xmlns="23ad9178-ade2-434f-a880-cfaf139256ed">
-      <Terms xmlns="http://schemas.microsoft.com/office/infopath/2007/PartnerControls"/>
-    </lcf76f155ced4ddcb4097134ff3c332f>
-  </documentManagement>
-</p:properties>
-</file>
-
-<file path=customXml/item2.xml><?xml version="1.0" encoding="utf-8"?>
-<?mso-contentType ?>
-<FormTemplates xmlns="http://schemas.microsoft.com/sharepoint/v3/contenttype/forms">
-  <Display>DocumentLibraryForm</Display>
-  <Edit>DocumentLibraryForm</Edit>
-  <New>DocumentLibraryForm</New>
-</FormTemplates>
-</file>
-
-<file path=customXml/item3.xml><?xml version="1.0" encoding="utf-8"?>
 <ct:contentTypeSchema xmlns:ct="http://schemas.microsoft.com/office/2006/metadata/contentType" xmlns:ma="http://schemas.microsoft.com/office/2006/metadata/properties/metaAttributes" ct:_="" ma:_="" ma:contentTypeName="Document" ma:contentTypeID="0x010100E843CC197C4EA6429DB8706FA366B0A9" ma:contentTypeVersion="16" ma:contentTypeDescription="Create a new document." ma:contentTypeScope="" ma:versionID="b4700a85abd1a74edb701ca6d3afdd96">
   <xsd:schema xmlns:xsd="http://www.w3.org/2001/XMLSchema" xmlns:xs="http://www.w3.org/2001/XMLSchema" xmlns:p="http://schemas.microsoft.com/office/2006/metadata/properties" xmlns:ns2="4b28dc4c-da69-43c9-a1ff-3a3813db799e" xmlns:ns3="23ad9178-ade2-434f-a880-cfaf139256ed" targetNamespace="http://schemas.microsoft.com/office/2006/metadata/properties" ma:root="true" ma:fieldsID="19eeb97119fa32ac520f06cf83d0de92" ns2:_="" ns3:_="">
     <xsd:import namespace="4b28dc4c-da69-43c9-a1ff-3a3813db799e"/>
@@ -11565,34 +11518,54 @@
 </ct:contentTypeSchema>
 </file>
 
-<file path=customXml/itemProps1.xml><?xml version="1.0" encoding="utf-8"?>
-<ds:datastoreItem xmlns:ds="http://schemas.openxmlformats.org/officeDocument/2006/customXml" ds:itemID="{AED196B3-28D2-4CE6-8BC6-FF9B8270B13E}">
-  <ds:schemaRefs>
-    <ds:schemaRef ds:uri="http://purl.org/dc/elements/1.1/"/>
-    <ds:schemaRef ds:uri="http://schemas.microsoft.com/office/2006/documentManagement/types"/>
-    <ds:schemaRef ds:uri="http://purl.org/dc/dcmitype/"/>
-    <ds:schemaRef ds:uri="8529ed79-734a-4657-bc3e-ffe023011016"/>
-    <ds:schemaRef ds:uri="http://purl.org/dc/terms/"/>
-    <ds:schemaRef ds:uri="http://schemas.microsoft.com/office/2006/metadata/properties"/>
-    <ds:schemaRef ds:uri="http://schemas.microsoft.com/office/infopath/2007/PartnerControls"/>
-    <ds:schemaRef ds:uri="http://schemas.openxmlformats.org/package/2006/metadata/core-properties"/>
-    <ds:schemaRef ds:uri="6673a5f0-d796-48d1-aef2-edb5346d3c37"/>
-    <ds:schemaRef ds:uri="http://www.w3.org/XML/1998/namespace"/>
-    <ds:schemaRef ds:uri="4b28dc4c-da69-43c9-a1ff-3a3813db799e"/>
-    <ds:schemaRef ds:uri="23ad9178-ade2-434f-a880-cfaf139256ed"/>
-  </ds:schemaRefs>
-</ds:datastoreItem>
+<file path=customXml/item2.xml><?xml version="1.0" encoding="utf-8"?>
+<?mso-contentType ?>
+<FormTemplates xmlns="http://schemas.microsoft.com/sharepoint/v3/contenttype/forms">
+  <Display>DocumentLibraryForm</Display>
+  <Edit>DocumentLibraryForm</Edit>
+  <New>DocumentLibraryForm</New>
+</FormTemplates>
 </file>
 
-<file path=customXml/itemProps2.xml><?xml version="1.0" encoding="utf-8"?>
-<ds:datastoreItem xmlns:ds="http://schemas.openxmlformats.org/officeDocument/2006/customXml" ds:itemID="{74FE70FB-0FCE-428C-BA58-AD39043535D1}">
-  <ds:schemaRefs>
-    <ds:schemaRef ds:uri="http://schemas.microsoft.com/sharepoint/v3/contenttype/forms"/>
-  </ds:schemaRefs>
-</ds:datastoreItem>
+<file path=customXml/item3.xml><?xml version="1.0" encoding="utf-8"?>
+<p:properties xmlns:p="http://schemas.microsoft.com/office/2006/metadata/properties" xmlns:xsi="http://www.w3.org/2001/XMLSchema-instance" xmlns:pc="http://schemas.microsoft.com/office/infopath/2007/PartnerControls">
+  <documentManagement>
+    <SharedWithUsers xmlns="4b28dc4c-da69-43c9-a1ff-3a3813db799e">
+      <UserInfo>
+        <DisplayName>Futrick, Jordan Q</DisplayName>
+        <AccountId>31</AccountId>
+        <AccountType/>
+      </UserInfo>
+      <UserInfo>
+        <DisplayName>Brown, Carrie</DisplayName>
+        <AccountId>84</AccountId>
+        <AccountType/>
+      </UserInfo>
+      <UserInfo>
+        <DisplayName>Leydig, Derek Martin</DisplayName>
+        <AccountId>38</AccountId>
+        <AccountType/>
+      </UserInfo>
+      <UserInfo>
+        <DisplayName>Jackson, Liam</DisplayName>
+        <AccountId>32</AccountId>
+        <AccountType/>
+      </UserInfo>
+      <UserInfo>
+        <DisplayName>Hey, Wolf</DisplayName>
+        <AccountId>182</AccountId>
+        <AccountType/>
+      </UserInfo>
+    </SharedWithUsers>
+    <TaxCatchAll xmlns="4b28dc4c-da69-43c9-a1ff-3a3813db799e" xsi:nil="true"/>
+    <lcf76f155ced4ddcb4097134ff3c332f xmlns="23ad9178-ade2-434f-a880-cfaf139256ed">
+      <Terms xmlns="http://schemas.microsoft.com/office/infopath/2007/PartnerControls"/>
+    </lcf76f155ced4ddcb4097134ff3c332f>
+  </documentManagement>
+</p:properties>
 </file>
 
-<file path=customXml/itemProps3.xml><?xml version="1.0" encoding="utf-8"?>
+<file path=customXml/itemProps1.xml><?xml version="1.0" encoding="utf-8"?>
 <ds:datastoreItem xmlns:ds="http://schemas.openxmlformats.org/officeDocument/2006/customXml" ds:itemID="{8DC5FBCA-8CEE-41E9-8E12-E7355B00A1CC}">
   <ds:schemaRefs>
     <ds:schemaRef ds:uri="http://schemas.microsoft.com/office/2006/metadata/contentType"/>
@@ -11611,6 +11584,31 @@
 </ds:datastoreItem>
 </file>
 
+<file path=customXml/itemProps2.xml><?xml version="1.0" encoding="utf-8"?>
+<ds:datastoreItem xmlns:ds="http://schemas.openxmlformats.org/officeDocument/2006/customXml" ds:itemID="{74FE70FB-0FCE-428C-BA58-AD39043535D1}">
+  <ds:schemaRefs>
+    <ds:schemaRef ds:uri="http://schemas.microsoft.com/sharepoint/v3/contenttype/forms"/>
+  </ds:schemaRefs>
+</ds:datastoreItem>
+</file>
+
+<file path=customXml/itemProps3.xml><?xml version="1.0" encoding="utf-8"?>
+<ds:datastoreItem xmlns:ds="http://schemas.openxmlformats.org/officeDocument/2006/customXml" ds:itemID="{AED196B3-28D2-4CE6-8BC6-FF9B8270B13E}">
+  <ds:schemaRefs>
+    <ds:schemaRef ds:uri="http://purl.org/dc/elements/1.1/"/>
+    <ds:schemaRef ds:uri="http://purl.org/dc/terms/"/>
+    <ds:schemaRef ds:uri="http://schemas.microsoft.com/office/infopath/2007/PartnerControls"/>
+    <ds:schemaRef ds:uri="http://www.w3.org/XML/1998/namespace"/>
+    <ds:schemaRef ds:uri="http://schemas.microsoft.com/office/2006/documentManagement/types"/>
+    <ds:schemaRef ds:uri="4b28dc4c-da69-43c9-a1ff-3a3813db799e"/>
+    <ds:schemaRef ds:uri="http://schemas.openxmlformats.org/package/2006/metadata/core-properties"/>
+    <ds:schemaRef ds:uri="23ad9178-ade2-434f-a880-cfaf139256ed"/>
+    <ds:schemaRef ds:uri="http://schemas.microsoft.com/office/2006/metadata/properties"/>
+    <ds:schemaRef ds:uri="http://purl.org/dc/dcmitype/"/>
+  </ds:schemaRefs>
+</ds:datastoreItem>
+</file>
+
 <file path=docMetadata/LabelInfo.xml><?xml version="1.0" encoding="utf-8"?>
 <clbl:labelList xmlns:clbl="http://schemas.microsoft.com/office/2020/mipLabelMetadata">
   <clbl:label id="{7cf48d45-3ddb-4389-a9c1-c115526eb52e}" enabled="0" method="" siteId="{7cf48d45-3ddb-4389-a9c1-c115526eb52e}" removed="1"/>

</xml_diff>